<commit_message>
added design patterns implemented to PPT
</commit_message>
<xml_diff>
--- a/39_Rated-MovieRatingSystem.pptx
+++ b/39_Rated-MovieRatingSystem.pptx
@@ -1,27 +1,27 @@
 
 <file path=ppt/presentation.xml><?xml version="1.0" encoding="utf-8"?>
-<p:presentation xmlns:a="http://schemas.openxmlformats.org/drawingml/2006/main" xmlns:r="http://schemas.openxmlformats.org/officeDocument/2006/relationships" xmlns:mc="http://schemas.openxmlformats.org/markup-compatibility/2006" xmlns:mv="urn:schemas-microsoft-com:mac:vml" xmlns:p="http://schemas.openxmlformats.org/presentationml/2006/main" xmlns:c="http://schemas.openxmlformats.org/drawingml/2006/chart" xmlns:dgm="http://schemas.openxmlformats.org/drawingml/2006/diagram" xmlns:o="urn:schemas-microsoft-com:office:office" xmlns:v="urn:schemas-microsoft-com:vml" xmlns:pvml="urn:schemas-microsoft-com:office:powerpoint" xmlns:com="http://schemas.openxmlformats.org/drawingml/2006/compatibility" xmlns:p14="http://schemas.microsoft.com/office/powerpoint/2010/main" autoCompressPictures="0" strictFirstAndLastChars="0" saveSubsetFonts="1">
+<p:presentation xmlns:a="http://schemas.openxmlformats.org/drawingml/2006/main" xmlns:r="http://schemas.openxmlformats.org/officeDocument/2006/relationships" xmlns:p="http://schemas.openxmlformats.org/presentationml/2006/main" strictFirstAndLastChars="0" saveSubsetFonts="1" autoCompressPictures="0">
   <p:sldMasterIdLst>
-    <p:sldMasterId id="2147483659" r:id="rId3"/>
+    <p:sldMasterId id="2147483659" r:id="rId1"/>
   </p:sldMasterIdLst>
   <p:notesMasterIdLst>
-    <p:notesMasterId r:id="rId4"/>
+    <p:notesMasterId r:id="rId11"/>
   </p:notesMasterIdLst>
   <p:sldIdLst>
-    <p:sldId id="256" r:id="rId5"/>
-    <p:sldId id="257" r:id="rId6"/>
-    <p:sldId id="258" r:id="rId7"/>
-    <p:sldId id="259" r:id="rId8"/>
-    <p:sldId id="260" r:id="rId9"/>
-    <p:sldId id="261" r:id="rId10"/>
-    <p:sldId id="262" r:id="rId11"/>
-    <p:sldId id="263" r:id="rId12"/>
-    <p:sldId id="264" r:id="rId13"/>
+    <p:sldId id="256" r:id="rId2"/>
+    <p:sldId id="257" r:id="rId3"/>
+    <p:sldId id="258" r:id="rId4"/>
+    <p:sldId id="259" r:id="rId5"/>
+    <p:sldId id="260" r:id="rId6"/>
+    <p:sldId id="261" r:id="rId7"/>
+    <p:sldId id="262" r:id="rId8"/>
+    <p:sldId id="263" r:id="rId9"/>
+    <p:sldId id="264" r:id="rId10"/>
   </p:sldIdLst>
-  <p:sldSz cy="5143500" cx="9144000"/>
+  <p:sldSz cx="9144000" cy="5143500" type="screen16x9"/>
   <p:notesSz cx="6858000" cy="9144000"/>
   <p:defaultTextStyle>
-    <a:defPPr lvl="0" marR="0" rtl="0" algn="l">
+    <a:defPPr marR="0" lvl="0" algn="l" rtl="0">
       <a:lnSpc>
         <a:spcPct val="100000"/>
       </a:lnSpc>
@@ -32,7 +32,7 @@
         <a:spcPts val="0"/>
       </a:spcAft>
     </a:defPPr>
-    <a:lvl1pPr lvl="0" marR="0" rtl="0" algn="l">
+    <a:lvl1pPr marR="0" lvl="0" algn="l" rtl="0">
       <a:lnSpc>
         <a:spcPct val="100000"/>
       </a:lnSpc>
@@ -43,7 +43,7 @@
         <a:spcPts val="0"/>
       </a:spcAft>
       <a:buNone/>
-      <a:defRPr b="0" i="0" sz="1400" u="none" cap="none" strike="noStrike">
+      <a:defRPr sz="1400" b="0" i="0" u="none" strike="noStrike" cap="none">
         <a:solidFill>
           <a:srgbClr val="000000"/>
         </a:solidFill>
@@ -53,7 +53,7 @@
         <a:sym typeface="Arial"/>
       </a:defRPr>
     </a:lvl1pPr>
-    <a:lvl2pPr lvl="1" marR="0" rtl="0" algn="l">
+    <a:lvl2pPr marR="0" lvl="1" algn="l" rtl="0">
       <a:lnSpc>
         <a:spcPct val="100000"/>
       </a:lnSpc>
@@ -64,7 +64,7 @@
         <a:spcPts val="0"/>
       </a:spcAft>
       <a:buNone/>
-      <a:defRPr b="0" i="0" sz="1400" u="none" cap="none" strike="noStrike">
+      <a:defRPr sz="1400" b="0" i="0" u="none" strike="noStrike" cap="none">
         <a:solidFill>
           <a:srgbClr val="000000"/>
         </a:solidFill>
@@ -74,7 +74,7 @@
         <a:sym typeface="Arial"/>
       </a:defRPr>
     </a:lvl2pPr>
-    <a:lvl3pPr lvl="2" marR="0" rtl="0" algn="l">
+    <a:lvl3pPr marR="0" lvl="2" algn="l" rtl="0">
       <a:lnSpc>
         <a:spcPct val="100000"/>
       </a:lnSpc>
@@ -85,7 +85,7 @@
         <a:spcPts val="0"/>
       </a:spcAft>
       <a:buNone/>
-      <a:defRPr b="0" i="0" sz="1400" u="none" cap="none" strike="noStrike">
+      <a:defRPr sz="1400" b="0" i="0" u="none" strike="noStrike" cap="none">
         <a:solidFill>
           <a:srgbClr val="000000"/>
         </a:solidFill>
@@ -95,7 +95,7 @@
         <a:sym typeface="Arial"/>
       </a:defRPr>
     </a:lvl3pPr>
-    <a:lvl4pPr lvl="3" marR="0" rtl="0" algn="l">
+    <a:lvl4pPr marR="0" lvl="3" algn="l" rtl="0">
       <a:lnSpc>
         <a:spcPct val="100000"/>
       </a:lnSpc>
@@ -106,7 +106,7 @@
         <a:spcPts val="0"/>
       </a:spcAft>
       <a:buNone/>
-      <a:defRPr b="0" i="0" sz="1400" u="none" cap="none" strike="noStrike">
+      <a:defRPr sz="1400" b="0" i="0" u="none" strike="noStrike" cap="none">
         <a:solidFill>
           <a:srgbClr val="000000"/>
         </a:solidFill>
@@ -116,7 +116,7 @@
         <a:sym typeface="Arial"/>
       </a:defRPr>
     </a:lvl4pPr>
-    <a:lvl5pPr lvl="4" marR="0" rtl="0" algn="l">
+    <a:lvl5pPr marR="0" lvl="4" algn="l" rtl="0">
       <a:lnSpc>
         <a:spcPct val="100000"/>
       </a:lnSpc>
@@ -127,7 +127,7 @@
         <a:spcPts val="0"/>
       </a:spcAft>
       <a:buNone/>
-      <a:defRPr b="0" i="0" sz="1400" u="none" cap="none" strike="noStrike">
+      <a:defRPr sz="1400" b="0" i="0" u="none" strike="noStrike" cap="none">
         <a:solidFill>
           <a:srgbClr val="000000"/>
         </a:solidFill>
@@ -137,7 +137,7 @@
         <a:sym typeface="Arial"/>
       </a:defRPr>
     </a:lvl5pPr>
-    <a:lvl6pPr lvl="5" marR="0" rtl="0" algn="l">
+    <a:lvl6pPr marR="0" lvl="5" algn="l" rtl="0">
       <a:lnSpc>
         <a:spcPct val="100000"/>
       </a:lnSpc>
@@ -148,7 +148,7 @@
         <a:spcPts val="0"/>
       </a:spcAft>
       <a:buNone/>
-      <a:defRPr b="0" i="0" sz="1400" u="none" cap="none" strike="noStrike">
+      <a:defRPr sz="1400" b="0" i="0" u="none" strike="noStrike" cap="none">
         <a:solidFill>
           <a:srgbClr val="000000"/>
         </a:solidFill>
@@ -158,7 +158,7 @@
         <a:sym typeface="Arial"/>
       </a:defRPr>
     </a:lvl6pPr>
-    <a:lvl7pPr lvl="6" marR="0" rtl="0" algn="l">
+    <a:lvl7pPr marR="0" lvl="6" algn="l" rtl="0">
       <a:lnSpc>
         <a:spcPct val="100000"/>
       </a:lnSpc>
@@ -169,7 +169,7 @@
         <a:spcPts val="0"/>
       </a:spcAft>
       <a:buNone/>
-      <a:defRPr b="0" i="0" sz="1400" u="none" cap="none" strike="noStrike">
+      <a:defRPr sz="1400" b="0" i="0" u="none" strike="noStrike" cap="none">
         <a:solidFill>
           <a:srgbClr val="000000"/>
         </a:solidFill>
@@ -179,7 +179,7 @@
         <a:sym typeface="Arial"/>
       </a:defRPr>
     </a:lvl7pPr>
-    <a:lvl8pPr lvl="7" marR="0" rtl="0" algn="l">
+    <a:lvl8pPr marR="0" lvl="7" algn="l" rtl="0">
       <a:lnSpc>
         <a:spcPct val="100000"/>
       </a:lnSpc>
@@ -190,7 +190,7 @@
         <a:spcPts val="0"/>
       </a:spcAft>
       <a:buNone/>
-      <a:defRPr b="0" i="0" sz="1400" u="none" cap="none" strike="noStrike">
+      <a:defRPr sz="1400" b="0" i="0" u="none" strike="noStrike" cap="none">
         <a:solidFill>
           <a:srgbClr val="000000"/>
         </a:solidFill>
@@ -200,7 +200,7 @@
         <a:sym typeface="Arial"/>
       </a:defRPr>
     </a:lvl8pPr>
-    <a:lvl9pPr lvl="8" marR="0" rtl="0" algn="l">
+    <a:lvl9pPr marR="0" lvl="8" algn="l" rtl="0">
       <a:lnSpc>
         <a:spcPct val="100000"/>
       </a:lnSpc>
@@ -211,7 +211,7 @@
         <a:spcPts val="0"/>
       </a:spcAft>
       <a:buNone/>
-      <a:defRPr b="0" i="0" sz="1400" u="none" cap="none" strike="noStrike">
+      <a:defRPr sz="1400" b="0" i="0" u="none" strike="noStrike" cap="none">
         <a:solidFill>
           <a:srgbClr val="000000"/>
         </a:solidFill>
@@ -226,11 +226,16 @@
 </file>
 
 <file path=ppt/notesMasters/notesMaster1.xml><?xml version="1.0" encoding="utf-8"?>
-<p:notesMaster xmlns:a="http://schemas.openxmlformats.org/drawingml/2006/main" xmlns:r="http://schemas.openxmlformats.org/officeDocument/2006/relationships" xmlns:mc="http://schemas.openxmlformats.org/markup-compatibility/2006" xmlns:mv="urn:schemas-microsoft-com:mac:vml" xmlns:p="http://schemas.openxmlformats.org/presentationml/2006/main" xmlns:c="http://schemas.openxmlformats.org/drawingml/2006/chart" xmlns:dgm="http://schemas.openxmlformats.org/drawingml/2006/diagram" xmlns:o="urn:schemas-microsoft-com:office:office" xmlns:v="urn:schemas-microsoft-com:vml" xmlns:pvml="urn:schemas-microsoft-com:office:powerpoint" xmlns:com="http://schemas.openxmlformats.org/drawingml/2006/compatibility" xmlns:p14="http://schemas.microsoft.com/office/powerpoint/2010/main">
+<p:notesMaster xmlns:a="http://schemas.openxmlformats.org/drawingml/2006/main" xmlns:r="http://schemas.openxmlformats.org/officeDocument/2006/relationships" xmlns:p="http://schemas.openxmlformats.org/presentationml/2006/main">
   <p:cSld>
+    <p:bg>
+      <p:bgRef idx="1001">
+        <a:schemeClr val="bg1"/>
+      </p:bgRef>
+    </p:bg>
     <p:spTree>
       <p:nvGrpSpPr>
-        <p:cNvPr id="2" name="Shape 2"/>
+        <p:cNvPr id="1" name="Shape 2"/>
         <p:cNvGrpSpPr/>
         <p:nvPr/>
       </p:nvGrpSpPr>
@@ -245,9 +250,11 @@
       <p:sp>
         <p:nvSpPr>
           <p:cNvPr id="3" name="Shape 3"/>
-          <p:cNvSpPr/>
-          <p:nvPr>
-            <p:ph idx="2" type="sldImg"/>
+          <p:cNvSpPr>
+            <a:spLocks noGrp="1" noRot="1" noChangeAspect="1"/>
+          </p:cNvSpPr>
+          <p:nvPr>
+            <p:ph type="sldImg" idx="2"/>
           </p:nvPr>
         </p:nvSpPr>
         <p:spPr>
@@ -256,8 +263,13 @@
             <a:ext cx="6096075" cy="3429000"/>
           </a:xfrm>
           <a:custGeom>
+            <a:avLst/>
+            <a:gdLst/>
+            <a:ahLst/>
+            <a:cxnLst/>
+            <a:rect l="0" t="0" r="0" b="0"/>
             <a:pathLst>
-              <a:path extrusionOk="0" h="120000" w="120000">
+              <a:path w="120000" h="120000" extrusionOk="0">
                 <a:moveTo>
                   <a:pt x="0" y="0"/>
                 </a:moveTo>
@@ -275,23 +287,25 @@
             </a:pathLst>
           </a:custGeom>
           <a:noFill/>
-          <a:ln cap="flat" cmpd="sng" w="9525">
+          <a:ln w="9525" cap="flat" cmpd="sng">
             <a:solidFill>
               <a:srgbClr val="000000"/>
             </a:solidFill>
             <a:prstDash val="solid"/>
             <a:round/>
-            <a:headEnd len="med" w="med" type="none"/>
-            <a:tailEnd len="med" w="med" type="none"/>
+            <a:headEnd type="none" w="med" len="med"/>
+            <a:tailEnd type="none" w="med" len="med"/>
           </a:ln>
         </p:spPr>
       </p:sp>
       <p:sp>
         <p:nvSpPr>
           <p:cNvPr id="4" name="Shape 4"/>
-          <p:cNvSpPr txBox="1"/>
-          <p:nvPr>
-            <p:ph idx="1" type="body"/>
+          <p:cNvSpPr txBox="1">
+            <a:spLocks noGrp="1"/>
+          </p:cNvSpPr>
+          <p:nvPr>
+            <p:ph type="body" idx="1"/>
           </p:nvPr>
         </p:nvSpPr>
         <p:spPr>
@@ -308,7 +322,7 @@
           </a:ln>
         </p:spPr>
         <p:txBody>
-          <a:bodyPr anchorCtr="0" anchor="t" bIns="91425" lIns="91425" rIns="91425" tIns="91425"/>
+          <a:bodyPr lIns="91425" tIns="91425" rIns="91425" bIns="91425" anchor="t" anchorCtr="0"/>
           <a:lstStyle>
             <a:lvl1pPr lvl="0">
               <a:spcBef>
@@ -365,21 +379,115 @@
               <a:defRPr sz="1100"/>
             </a:lvl9pPr>
           </a:lstStyle>
-          <a:p/>
+          <a:p>
+            <a:endParaRPr/>
+          </a:p>
         </p:txBody>
       </p:sp>
     </p:spTree>
   </p:cSld>
-  <p:clrMap accent1="accent1" accent2="accent2" accent3="accent3" accent4="accent4" accent5="accent5" accent6="accent6" bg1="lt1" bg2="dk2" tx1="dk1" tx2="lt2" folHlink="folHlink" hlink="hlink"/>
+  <p:clrMap bg1="lt1" tx1="dk1" bg2="dk2" tx2="lt2" accent1="accent1" accent2="accent2" accent3="accent3" accent4="accent4" accent5="accent5" accent6="accent6" hlink="hlink" folHlink="folHlink"/>
+  <p:notesStyle>
+    <a:lvl1pPr marL="0" algn="l" defTabSz="914400" rtl="0" eaLnBrk="1" latinLnBrk="0" hangingPunct="1">
+      <a:defRPr sz="1200" kern="1200">
+        <a:solidFill>
+          <a:schemeClr val="tx1"/>
+        </a:solidFill>
+        <a:latin typeface="+mn-lt"/>
+        <a:ea typeface="+mn-ea"/>
+        <a:cs typeface="+mn-cs"/>
+      </a:defRPr>
+    </a:lvl1pPr>
+    <a:lvl2pPr marL="457200" algn="l" defTabSz="914400" rtl="0" eaLnBrk="1" latinLnBrk="0" hangingPunct="1">
+      <a:defRPr sz="1200" kern="1200">
+        <a:solidFill>
+          <a:schemeClr val="tx1"/>
+        </a:solidFill>
+        <a:latin typeface="+mn-lt"/>
+        <a:ea typeface="+mn-ea"/>
+        <a:cs typeface="+mn-cs"/>
+      </a:defRPr>
+    </a:lvl2pPr>
+    <a:lvl3pPr marL="914400" algn="l" defTabSz="914400" rtl="0" eaLnBrk="1" latinLnBrk="0" hangingPunct="1">
+      <a:defRPr sz="1200" kern="1200">
+        <a:solidFill>
+          <a:schemeClr val="tx1"/>
+        </a:solidFill>
+        <a:latin typeface="+mn-lt"/>
+        <a:ea typeface="+mn-ea"/>
+        <a:cs typeface="+mn-cs"/>
+      </a:defRPr>
+    </a:lvl3pPr>
+    <a:lvl4pPr marL="1371600" algn="l" defTabSz="914400" rtl="0" eaLnBrk="1" latinLnBrk="0" hangingPunct="1">
+      <a:defRPr sz="1200" kern="1200">
+        <a:solidFill>
+          <a:schemeClr val="tx1"/>
+        </a:solidFill>
+        <a:latin typeface="+mn-lt"/>
+        <a:ea typeface="+mn-ea"/>
+        <a:cs typeface="+mn-cs"/>
+      </a:defRPr>
+    </a:lvl4pPr>
+    <a:lvl5pPr marL="1828800" algn="l" defTabSz="914400" rtl="0" eaLnBrk="1" latinLnBrk="0" hangingPunct="1">
+      <a:defRPr sz="1200" kern="1200">
+        <a:solidFill>
+          <a:schemeClr val="tx1"/>
+        </a:solidFill>
+        <a:latin typeface="+mn-lt"/>
+        <a:ea typeface="+mn-ea"/>
+        <a:cs typeface="+mn-cs"/>
+      </a:defRPr>
+    </a:lvl5pPr>
+    <a:lvl6pPr marL="2286000" algn="l" defTabSz="914400" rtl="0" eaLnBrk="1" latinLnBrk="0" hangingPunct="1">
+      <a:defRPr sz="1200" kern="1200">
+        <a:solidFill>
+          <a:schemeClr val="tx1"/>
+        </a:solidFill>
+        <a:latin typeface="+mn-lt"/>
+        <a:ea typeface="+mn-ea"/>
+        <a:cs typeface="+mn-cs"/>
+      </a:defRPr>
+    </a:lvl6pPr>
+    <a:lvl7pPr marL="2743200" algn="l" defTabSz="914400" rtl="0" eaLnBrk="1" latinLnBrk="0" hangingPunct="1">
+      <a:defRPr sz="1200" kern="1200">
+        <a:solidFill>
+          <a:schemeClr val="tx1"/>
+        </a:solidFill>
+        <a:latin typeface="+mn-lt"/>
+        <a:ea typeface="+mn-ea"/>
+        <a:cs typeface="+mn-cs"/>
+      </a:defRPr>
+    </a:lvl7pPr>
+    <a:lvl8pPr marL="3200400" algn="l" defTabSz="914400" rtl="0" eaLnBrk="1" latinLnBrk="0" hangingPunct="1">
+      <a:defRPr sz="1200" kern="1200">
+        <a:solidFill>
+          <a:schemeClr val="tx1"/>
+        </a:solidFill>
+        <a:latin typeface="+mn-lt"/>
+        <a:ea typeface="+mn-ea"/>
+        <a:cs typeface="+mn-cs"/>
+      </a:defRPr>
+    </a:lvl8pPr>
+    <a:lvl9pPr marL="3657600" algn="l" defTabSz="914400" rtl="0" eaLnBrk="1" latinLnBrk="0" hangingPunct="1">
+      <a:defRPr sz="1200" kern="1200">
+        <a:solidFill>
+          <a:schemeClr val="tx1"/>
+        </a:solidFill>
+        <a:latin typeface="+mn-lt"/>
+        <a:ea typeface="+mn-ea"/>
+        <a:cs typeface="+mn-cs"/>
+      </a:defRPr>
+    </a:lvl9pPr>
+  </p:notesStyle>
 </p:notesMaster>
 </file>
 
 <file path=ppt/notesSlides/notesSlide1.xml><?xml version="1.0" encoding="utf-8"?>
-<p:notes xmlns:a="http://schemas.openxmlformats.org/drawingml/2006/main" xmlns:r="http://schemas.openxmlformats.org/officeDocument/2006/relationships" xmlns:mc="http://schemas.openxmlformats.org/markup-compatibility/2006" xmlns:mv="urn:schemas-microsoft-com:mac:vml" xmlns:p="http://schemas.openxmlformats.org/presentationml/2006/main" xmlns:c="http://schemas.openxmlformats.org/drawingml/2006/chart" xmlns:dgm="http://schemas.openxmlformats.org/drawingml/2006/diagram" xmlns:o="urn:schemas-microsoft-com:office:office" xmlns:v="urn:schemas-microsoft-com:vml" xmlns:pvml="urn:schemas-microsoft-com:office:powerpoint" xmlns:com="http://schemas.openxmlformats.org/drawingml/2006/compatibility" xmlns:p14="http://schemas.microsoft.com/office/powerpoint/2010/main" showMasterPhAnim="0" showMasterSp="0">
+<p:notes xmlns:a="http://schemas.openxmlformats.org/drawingml/2006/main" xmlns:r="http://schemas.openxmlformats.org/officeDocument/2006/relationships" xmlns:p="http://schemas.openxmlformats.org/presentationml/2006/main" showMasterSp="0" showMasterPhAnim="0">
   <p:cSld>
     <p:spTree>
       <p:nvGrpSpPr>
-        <p:cNvPr id="50" name="Shape 50"/>
+        <p:cNvPr id="1" name="Shape 50"/>
         <p:cNvGrpSpPr/>
         <p:nvPr/>
       </p:nvGrpSpPr>
@@ -394,19 +502,26 @@
       <p:sp>
         <p:nvSpPr>
           <p:cNvPr id="51" name="Shape 51"/>
-          <p:cNvSpPr/>
-          <p:nvPr>
-            <p:ph idx="2" type="sldImg"/>
-          </p:nvPr>
-        </p:nvSpPr>
-        <p:spPr>
-          <a:xfrm>
-            <a:off x="381300" y="685800"/>
-            <a:ext cx="6096075" cy="3429000"/>
+          <p:cNvSpPr>
+            <a:spLocks noGrp="1" noRot="1" noChangeAspect="1"/>
+          </p:cNvSpPr>
+          <p:nvPr>
+            <p:ph type="sldImg" idx="2"/>
+          </p:nvPr>
+        </p:nvSpPr>
+        <p:spPr>
+          <a:xfrm>
+            <a:off x="381000" y="685800"/>
+            <a:ext cx="6096000" cy="3429000"/>
           </a:xfrm>
           <a:custGeom>
+            <a:avLst/>
+            <a:gdLst/>
+            <a:ahLst/>
+            <a:cxnLst/>
+            <a:rect l="0" t="0" r="0" b="0"/>
             <a:pathLst>
-              <a:path extrusionOk="0" h="120000" w="120000">
+              <a:path w="120000" h="120000" extrusionOk="0">
                 <a:moveTo>
                   <a:pt x="0" y="0"/>
                 </a:moveTo>
@@ -428,9 +543,11 @@
       <p:sp>
         <p:nvSpPr>
           <p:cNvPr id="52" name="Shape 52"/>
-          <p:cNvSpPr txBox="1"/>
-          <p:nvPr>
-            <p:ph idx="1" type="body"/>
+          <p:cNvSpPr txBox="1">
+            <a:spLocks noGrp="1"/>
+          </p:cNvSpPr>
+          <p:nvPr>
+            <p:ph type="body" idx="1"/>
           </p:nvPr>
         </p:nvSpPr>
         <p:spPr>
@@ -443,7 +560,7 @@
           </a:prstGeom>
         </p:spPr>
         <p:txBody>
-          <a:bodyPr anchorCtr="0" anchor="t" bIns="91425" lIns="91425" rIns="91425" tIns="91425">
+          <a:bodyPr lIns="91425" tIns="91425" rIns="91425" bIns="91425" anchor="t" anchorCtr="0">
             <a:noAutofit/>
           </a:bodyPr>
           <a:lstStyle/>
@@ -454,9 +571,6 @@
               </a:spcBef>
               <a:buNone/>
             </a:pPr>
-            <a:r>
-              <a:t/>
-            </a:r>
             <a:endParaRPr/>
           </a:p>
         </p:txBody>
@@ -470,11 +584,11 @@
 </file>
 
 <file path=ppt/notesSlides/notesSlide2.xml><?xml version="1.0" encoding="utf-8"?>
-<p:notes xmlns:a="http://schemas.openxmlformats.org/drawingml/2006/main" xmlns:r="http://schemas.openxmlformats.org/officeDocument/2006/relationships" xmlns:mc="http://schemas.openxmlformats.org/markup-compatibility/2006" xmlns:mv="urn:schemas-microsoft-com:mac:vml" xmlns:p="http://schemas.openxmlformats.org/presentationml/2006/main" xmlns:c="http://schemas.openxmlformats.org/drawingml/2006/chart" xmlns:dgm="http://schemas.openxmlformats.org/drawingml/2006/diagram" xmlns:o="urn:schemas-microsoft-com:office:office" xmlns:v="urn:schemas-microsoft-com:vml" xmlns:pvml="urn:schemas-microsoft-com:office:powerpoint" xmlns:com="http://schemas.openxmlformats.org/drawingml/2006/compatibility" xmlns:p14="http://schemas.microsoft.com/office/powerpoint/2010/main" showMasterPhAnim="0" showMasterSp="0">
+<p:notes xmlns:a="http://schemas.openxmlformats.org/drawingml/2006/main" xmlns:r="http://schemas.openxmlformats.org/officeDocument/2006/relationships" xmlns:p="http://schemas.openxmlformats.org/presentationml/2006/main" showMasterSp="0" showMasterPhAnim="0">
   <p:cSld>
     <p:spTree>
       <p:nvGrpSpPr>
-        <p:cNvPr id="56" name="Shape 56"/>
+        <p:cNvPr id="1" name="Shape 56"/>
         <p:cNvGrpSpPr/>
         <p:nvPr/>
       </p:nvGrpSpPr>
@@ -489,19 +603,26 @@
       <p:sp>
         <p:nvSpPr>
           <p:cNvPr id="57" name="Shape 57"/>
-          <p:cNvSpPr/>
-          <p:nvPr>
-            <p:ph idx="2" type="sldImg"/>
-          </p:nvPr>
-        </p:nvSpPr>
-        <p:spPr>
-          <a:xfrm>
-            <a:off x="381300" y="685800"/>
+          <p:cNvSpPr>
+            <a:spLocks noGrp="1" noRot="1" noChangeAspect="1"/>
+          </p:cNvSpPr>
+          <p:nvPr>
+            <p:ph type="sldImg" idx="2"/>
+          </p:nvPr>
+        </p:nvSpPr>
+        <p:spPr>
+          <a:xfrm>
+            <a:off x="381000" y="685800"/>
             <a:ext cx="6096000" cy="3429000"/>
           </a:xfrm>
           <a:custGeom>
+            <a:avLst/>
+            <a:gdLst/>
+            <a:ahLst/>
+            <a:cxnLst/>
+            <a:rect l="0" t="0" r="0" b="0"/>
             <a:pathLst>
-              <a:path extrusionOk="0" h="120000" w="120000">
+              <a:path w="120000" h="120000" extrusionOk="0">
                 <a:moveTo>
                   <a:pt x="0" y="0"/>
                 </a:moveTo>
@@ -523,9 +644,11 @@
       <p:sp>
         <p:nvSpPr>
           <p:cNvPr id="58" name="Shape 58"/>
-          <p:cNvSpPr txBox="1"/>
-          <p:nvPr>
-            <p:ph idx="1" type="body"/>
+          <p:cNvSpPr txBox="1">
+            <a:spLocks noGrp="1"/>
+          </p:cNvSpPr>
+          <p:nvPr>
+            <p:ph type="body" idx="1"/>
           </p:nvPr>
         </p:nvSpPr>
         <p:spPr>
@@ -538,7 +661,7 @@
           </a:prstGeom>
         </p:spPr>
         <p:txBody>
-          <a:bodyPr anchorCtr="0" anchor="t" bIns="91425" lIns="91425" rIns="91425" tIns="91425">
+          <a:bodyPr lIns="91425" tIns="91425" rIns="91425" bIns="91425" anchor="t" anchorCtr="0">
             <a:noAutofit/>
           </a:bodyPr>
           <a:lstStyle/>
@@ -549,9 +672,6 @@
               </a:spcBef>
               <a:buNone/>
             </a:pPr>
-            <a:r>
-              <a:t/>
-            </a:r>
             <a:endParaRPr/>
           </a:p>
         </p:txBody>
@@ -565,11 +685,11 @@
 </file>
 
 <file path=ppt/notesSlides/notesSlide3.xml><?xml version="1.0" encoding="utf-8"?>
-<p:notes xmlns:a="http://schemas.openxmlformats.org/drawingml/2006/main" xmlns:r="http://schemas.openxmlformats.org/officeDocument/2006/relationships" xmlns:mc="http://schemas.openxmlformats.org/markup-compatibility/2006" xmlns:mv="urn:schemas-microsoft-com:mac:vml" xmlns:p="http://schemas.openxmlformats.org/presentationml/2006/main" xmlns:c="http://schemas.openxmlformats.org/drawingml/2006/chart" xmlns:dgm="http://schemas.openxmlformats.org/drawingml/2006/diagram" xmlns:o="urn:schemas-microsoft-com:office:office" xmlns:v="urn:schemas-microsoft-com:vml" xmlns:pvml="urn:schemas-microsoft-com:office:powerpoint" xmlns:com="http://schemas.openxmlformats.org/drawingml/2006/compatibility" xmlns:p14="http://schemas.microsoft.com/office/powerpoint/2010/main" showMasterPhAnim="0" showMasterSp="0">
+<p:notes xmlns:a="http://schemas.openxmlformats.org/drawingml/2006/main" xmlns:r="http://schemas.openxmlformats.org/officeDocument/2006/relationships" xmlns:p="http://schemas.openxmlformats.org/presentationml/2006/main" showMasterSp="0" showMasterPhAnim="0">
   <p:cSld>
     <p:spTree>
       <p:nvGrpSpPr>
-        <p:cNvPr id="62" name="Shape 62"/>
+        <p:cNvPr id="1" name="Shape 62"/>
         <p:cNvGrpSpPr/>
         <p:nvPr/>
       </p:nvGrpSpPr>
@@ -584,19 +704,26 @@
       <p:sp>
         <p:nvSpPr>
           <p:cNvPr id="63" name="Shape 63"/>
-          <p:cNvSpPr/>
-          <p:nvPr>
-            <p:ph idx="2" type="sldImg"/>
-          </p:nvPr>
-        </p:nvSpPr>
-        <p:spPr>
-          <a:xfrm>
-            <a:off x="381300" y="685800"/>
+          <p:cNvSpPr>
+            <a:spLocks noGrp="1" noRot="1" noChangeAspect="1"/>
+          </p:cNvSpPr>
+          <p:nvPr>
+            <p:ph type="sldImg" idx="2"/>
+          </p:nvPr>
+        </p:nvSpPr>
+        <p:spPr>
+          <a:xfrm>
+            <a:off x="381000" y="685800"/>
             <a:ext cx="6096000" cy="3429000"/>
           </a:xfrm>
           <a:custGeom>
+            <a:avLst/>
+            <a:gdLst/>
+            <a:ahLst/>
+            <a:cxnLst/>
+            <a:rect l="0" t="0" r="0" b="0"/>
             <a:pathLst>
-              <a:path extrusionOk="0" h="120000" w="120000">
+              <a:path w="120000" h="120000" extrusionOk="0">
                 <a:moveTo>
                   <a:pt x="0" y="0"/>
                 </a:moveTo>
@@ -618,9 +745,11 @@
       <p:sp>
         <p:nvSpPr>
           <p:cNvPr id="64" name="Shape 64"/>
-          <p:cNvSpPr txBox="1"/>
-          <p:nvPr>
-            <p:ph idx="1" type="body"/>
+          <p:cNvSpPr txBox="1">
+            <a:spLocks noGrp="1"/>
+          </p:cNvSpPr>
+          <p:nvPr>
+            <p:ph type="body" idx="1"/>
           </p:nvPr>
         </p:nvSpPr>
         <p:spPr>
@@ -633,7 +762,7 @@
           </a:prstGeom>
         </p:spPr>
         <p:txBody>
-          <a:bodyPr anchorCtr="0" anchor="t" bIns="91425" lIns="91425" rIns="91425" tIns="91425">
+          <a:bodyPr lIns="91425" tIns="91425" rIns="91425" bIns="91425" anchor="t" anchorCtr="0">
             <a:noAutofit/>
           </a:bodyPr>
           <a:lstStyle/>
@@ -644,9 +773,6 @@
               </a:spcBef>
               <a:buNone/>
             </a:pPr>
-            <a:r>
-              <a:t/>
-            </a:r>
             <a:endParaRPr/>
           </a:p>
         </p:txBody>
@@ -660,11 +786,11 @@
 </file>
 
 <file path=ppt/notesSlides/notesSlide4.xml><?xml version="1.0" encoding="utf-8"?>
-<p:notes xmlns:a="http://schemas.openxmlformats.org/drawingml/2006/main" xmlns:r="http://schemas.openxmlformats.org/officeDocument/2006/relationships" xmlns:mc="http://schemas.openxmlformats.org/markup-compatibility/2006" xmlns:mv="urn:schemas-microsoft-com:mac:vml" xmlns:p="http://schemas.openxmlformats.org/presentationml/2006/main" xmlns:c="http://schemas.openxmlformats.org/drawingml/2006/chart" xmlns:dgm="http://schemas.openxmlformats.org/drawingml/2006/diagram" xmlns:o="urn:schemas-microsoft-com:office:office" xmlns:v="urn:schemas-microsoft-com:vml" xmlns:pvml="urn:schemas-microsoft-com:office:powerpoint" xmlns:com="http://schemas.openxmlformats.org/drawingml/2006/compatibility" xmlns:p14="http://schemas.microsoft.com/office/powerpoint/2010/main" showMasterPhAnim="0" showMasterSp="0">
+<p:notes xmlns:a="http://schemas.openxmlformats.org/drawingml/2006/main" xmlns:r="http://schemas.openxmlformats.org/officeDocument/2006/relationships" xmlns:p="http://schemas.openxmlformats.org/presentationml/2006/main" showMasterSp="0" showMasterPhAnim="0">
   <p:cSld>
     <p:spTree>
       <p:nvGrpSpPr>
-        <p:cNvPr id="68" name="Shape 68"/>
+        <p:cNvPr id="1" name="Shape 68"/>
         <p:cNvGrpSpPr/>
         <p:nvPr/>
       </p:nvGrpSpPr>
@@ -679,19 +805,26 @@
       <p:sp>
         <p:nvSpPr>
           <p:cNvPr id="69" name="Shape 69"/>
-          <p:cNvSpPr/>
-          <p:nvPr>
-            <p:ph idx="2" type="sldImg"/>
-          </p:nvPr>
-        </p:nvSpPr>
-        <p:spPr>
-          <a:xfrm>
-            <a:off x="381300" y="685800"/>
+          <p:cNvSpPr>
+            <a:spLocks noGrp="1" noRot="1" noChangeAspect="1"/>
+          </p:cNvSpPr>
+          <p:nvPr>
+            <p:ph type="sldImg" idx="2"/>
+          </p:nvPr>
+        </p:nvSpPr>
+        <p:spPr>
+          <a:xfrm>
+            <a:off x="381000" y="685800"/>
             <a:ext cx="6096000" cy="3429000"/>
           </a:xfrm>
           <a:custGeom>
+            <a:avLst/>
+            <a:gdLst/>
+            <a:ahLst/>
+            <a:cxnLst/>
+            <a:rect l="0" t="0" r="0" b="0"/>
             <a:pathLst>
-              <a:path extrusionOk="0" h="120000" w="120000">
+              <a:path w="120000" h="120000" extrusionOk="0">
                 <a:moveTo>
                   <a:pt x="0" y="0"/>
                 </a:moveTo>
@@ -713,9 +846,11 @@
       <p:sp>
         <p:nvSpPr>
           <p:cNvPr id="70" name="Shape 70"/>
-          <p:cNvSpPr txBox="1"/>
-          <p:nvPr>
-            <p:ph idx="1" type="body"/>
+          <p:cNvSpPr txBox="1">
+            <a:spLocks noGrp="1"/>
+          </p:cNvSpPr>
+          <p:nvPr>
+            <p:ph type="body" idx="1"/>
           </p:nvPr>
         </p:nvSpPr>
         <p:spPr>
@@ -728,7 +863,7 @@
           </a:prstGeom>
         </p:spPr>
         <p:txBody>
-          <a:bodyPr anchorCtr="0" anchor="t" bIns="91425" lIns="91425" rIns="91425" tIns="91425">
+          <a:bodyPr lIns="91425" tIns="91425" rIns="91425" bIns="91425" anchor="t" anchorCtr="0">
             <a:noAutofit/>
           </a:bodyPr>
           <a:lstStyle/>
@@ -739,9 +874,6 @@
               </a:spcBef>
               <a:buNone/>
             </a:pPr>
-            <a:r>
-              <a:t/>
-            </a:r>
             <a:endParaRPr/>
           </a:p>
         </p:txBody>
@@ -755,11 +887,11 @@
 </file>
 
 <file path=ppt/notesSlides/notesSlide5.xml><?xml version="1.0" encoding="utf-8"?>
-<p:notes xmlns:a="http://schemas.openxmlformats.org/drawingml/2006/main" xmlns:r="http://schemas.openxmlformats.org/officeDocument/2006/relationships" xmlns:mc="http://schemas.openxmlformats.org/markup-compatibility/2006" xmlns:mv="urn:schemas-microsoft-com:mac:vml" xmlns:p="http://schemas.openxmlformats.org/presentationml/2006/main" xmlns:c="http://schemas.openxmlformats.org/drawingml/2006/chart" xmlns:dgm="http://schemas.openxmlformats.org/drawingml/2006/diagram" xmlns:o="urn:schemas-microsoft-com:office:office" xmlns:v="urn:schemas-microsoft-com:vml" xmlns:pvml="urn:schemas-microsoft-com:office:powerpoint" xmlns:com="http://schemas.openxmlformats.org/drawingml/2006/compatibility" xmlns:p14="http://schemas.microsoft.com/office/powerpoint/2010/main" showMasterPhAnim="0" showMasterSp="0">
+<p:notes xmlns:a="http://schemas.openxmlformats.org/drawingml/2006/main" xmlns:r="http://schemas.openxmlformats.org/officeDocument/2006/relationships" xmlns:p="http://schemas.openxmlformats.org/presentationml/2006/main" showMasterSp="0" showMasterPhAnim="0">
   <p:cSld>
     <p:spTree>
       <p:nvGrpSpPr>
-        <p:cNvPr id="74" name="Shape 74"/>
+        <p:cNvPr id="1" name="Shape 74"/>
         <p:cNvGrpSpPr/>
         <p:nvPr/>
       </p:nvGrpSpPr>
@@ -774,19 +906,26 @@
       <p:sp>
         <p:nvSpPr>
           <p:cNvPr id="75" name="Shape 75"/>
-          <p:cNvSpPr/>
-          <p:nvPr>
-            <p:ph idx="2" type="sldImg"/>
-          </p:nvPr>
-        </p:nvSpPr>
-        <p:spPr>
-          <a:xfrm>
-            <a:off x="381300" y="685800"/>
+          <p:cNvSpPr>
+            <a:spLocks noGrp="1" noRot="1" noChangeAspect="1"/>
+          </p:cNvSpPr>
+          <p:nvPr>
+            <p:ph type="sldImg" idx="2"/>
+          </p:nvPr>
+        </p:nvSpPr>
+        <p:spPr>
+          <a:xfrm>
+            <a:off x="381000" y="685800"/>
             <a:ext cx="6096000" cy="3429000"/>
           </a:xfrm>
           <a:custGeom>
+            <a:avLst/>
+            <a:gdLst/>
+            <a:ahLst/>
+            <a:cxnLst/>
+            <a:rect l="0" t="0" r="0" b="0"/>
             <a:pathLst>
-              <a:path extrusionOk="0" h="120000" w="120000">
+              <a:path w="120000" h="120000" extrusionOk="0">
                 <a:moveTo>
                   <a:pt x="0" y="0"/>
                 </a:moveTo>
@@ -808,9 +947,11 @@
       <p:sp>
         <p:nvSpPr>
           <p:cNvPr id="76" name="Shape 76"/>
-          <p:cNvSpPr txBox="1"/>
-          <p:nvPr>
-            <p:ph idx="1" type="body"/>
+          <p:cNvSpPr txBox="1">
+            <a:spLocks noGrp="1"/>
+          </p:cNvSpPr>
+          <p:nvPr>
+            <p:ph type="body" idx="1"/>
           </p:nvPr>
         </p:nvSpPr>
         <p:spPr>
@@ -823,7 +964,7 @@
           </a:prstGeom>
         </p:spPr>
         <p:txBody>
-          <a:bodyPr anchorCtr="0" anchor="t" bIns="91425" lIns="91425" rIns="91425" tIns="91425">
+          <a:bodyPr lIns="91425" tIns="91425" rIns="91425" bIns="91425" anchor="t" anchorCtr="0">
             <a:noAutofit/>
           </a:bodyPr>
           <a:lstStyle/>
@@ -834,9 +975,6 @@
               </a:spcBef>
               <a:buNone/>
             </a:pPr>
-            <a:r>
-              <a:t/>
-            </a:r>
             <a:endParaRPr/>
           </a:p>
         </p:txBody>
@@ -850,11 +988,11 @@
 </file>
 
 <file path=ppt/notesSlides/notesSlide6.xml><?xml version="1.0" encoding="utf-8"?>
-<p:notes xmlns:a="http://schemas.openxmlformats.org/drawingml/2006/main" xmlns:r="http://schemas.openxmlformats.org/officeDocument/2006/relationships" xmlns:mc="http://schemas.openxmlformats.org/markup-compatibility/2006" xmlns:mv="urn:schemas-microsoft-com:mac:vml" xmlns:p="http://schemas.openxmlformats.org/presentationml/2006/main" xmlns:c="http://schemas.openxmlformats.org/drawingml/2006/chart" xmlns:dgm="http://schemas.openxmlformats.org/drawingml/2006/diagram" xmlns:o="urn:schemas-microsoft-com:office:office" xmlns:v="urn:schemas-microsoft-com:vml" xmlns:pvml="urn:schemas-microsoft-com:office:powerpoint" xmlns:com="http://schemas.openxmlformats.org/drawingml/2006/compatibility" xmlns:p14="http://schemas.microsoft.com/office/powerpoint/2010/main" showMasterPhAnim="0" showMasterSp="0">
+<p:notes xmlns:a="http://schemas.openxmlformats.org/drawingml/2006/main" xmlns:r="http://schemas.openxmlformats.org/officeDocument/2006/relationships" xmlns:p="http://schemas.openxmlformats.org/presentationml/2006/main" showMasterSp="0" showMasterPhAnim="0">
   <p:cSld>
     <p:spTree>
       <p:nvGrpSpPr>
-        <p:cNvPr id="80" name="Shape 80"/>
+        <p:cNvPr id="1" name="Shape 80"/>
         <p:cNvGrpSpPr/>
         <p:nvPr/>
       </p:nvGrpSpPr>
@@ -869,19 +1007,26 @@
       <p:sp>
         <p:nvSpPr>
           <p:cNvPr id="81" name="Shape 81"/>
-          <p:cNvSpPr/>
-          <p:nvPr>
-            <p:ph idx="2" type="sldImg"/>
-          </p:nvPr>
-        </p:nvSpPr>
-        <p:spPr>
-          <a:xfrm>
-            <a:off x="381300" y="685800"/>
+          <p:cNvSpPr>
+            <a:spLocks noGrp="1" noRot="1" noChangeAspect="1"/>
+          </p:cNvSpPr>
+          <p:nvPr>
+            <p:ph type="sldImg" idx="2"/>
+          </p:nvPr>
+        </p:nvSpPr>
+        <p:spPr>
+          <a:xfrm>
+            <a:off x="381000" y="685800"/>
             <a:ext cx="6096000" cy="3429000"/>
           </a:xfrm>
           <a:custGeom>
+            <a:avLst/>
+            <a:gdLst/>
+            <a:ahLst/>
+            <a:cxnLst/>
+            <a:rect l="0" t="0" r="0" b="0"/>
             <a:pathLst>
-              <a:path extrusionOk="0" h="120000" w="120000">
+              <a:path w="120000" h="120000" extrusionOk="0">
                 <a:moveTo>
                   <a:pt x="0" y="0"/>
                 </a:moveTo>
@@ -903,9 +1048,11 @@
       <p:sp>
         <p:nvSpPr>
           <p:cNvPr id="82" name="Shape 82"/>
-          <p:cNvSpPr txBox="1"/>
-          <p:nvPr>
-            <p:ph idx="1" type="body"/>
+          <p:cNvSpPr txBox="1">
+            <a:spLocks noGrp="1"/>
+          </p:cNvSpPr>
+          <p:nvPr>
+            <p:ph type="body" idx="1"/>
           </p:nvPr>
         </p:nvSpPr>
         <p:spPr>
@@ -918,7 +1065,7 @@
           </a:prstGeom>
         </p:spPr>
         <p:txBody>
-          <a:bodyPr anchorCtr="0" anchor="t" bIns="91425" lIns="91425" rIns="91425" tIns="91425">
+          <a:bodyPr lIns="91425" tIns="91425" rIns="91425" bIns="91425" anchor="t" anchorCtr="0">
             <a:noAutofit/>
           </a:bodyPr>
           <a:lstStyle/>
@@ -929,9 +1076,6 @@
               </a:spcBef>
               <a:buNone/>
             </a:pPr>
-            <a:r>
-              <a:t/>
-            </a:r>
             <a:endParaRPr/>
           </a:p>
         </p:txBody>
@@ -945,11 +1089,11 @@
 </file>
 
 <file path=ppt/notesSlides/notesSlide7.xml><?xml version="1.0" encoding="utf-8"?>
-<p:notes xmlns:a="http://schemas.openxmlformats.org/drawingml/2006/main" xmlns:r="http://schemas.openxmlformats.org/officeDocument/2006/relationships" xmlns:mc="http://schemas.openxmlformats.org/markup-compatibility/2006" xmlns:mv="urn:schemas-microsoft-com:mac:vml" xmlns:p="http://schemas.openxmlformats.org/presentationml/2006/main" xmlns:c="http://schemas.openxmlformats.org/drawingml/2006/chart" xmlns:dgm="http://schemas.openxmlformats.org/drawingml/2006/diagram" xmlns:o="urn:schemas-microsoft-com:office:office" xmlns:v="urn:schemas-microsoft-com:vml" xmlns:pvml="urn:schemas-microsoft-com:office:powerpoint" xmlns:com="http://schemas.openxmlformats.org/drawingml/2006/compatibility" xmlns:p14="http://schemas.microsoft.com/office/powerpoint/2010/main" showMasterPhAnim="0" showMasterSp="0">
+<p:notes xmlns:a="http://schemas.openxmlformats.org/drawingml/2006/main" xmlns:r="http://schemas.openxmlformats.org/officeDocument/2006/relationships" xmlns:p="http://schemas.openxmlformats.org/presentationml/2006/main" showMasterSp="0" showMasterPhAnim="0">
   <p:cSld>
     <p:spTree>
       <p:nvGrpSpPr>
-        <p:cNvPr id="86" name="Shape 86"/>
+        <p:cNvPr id="1" name="Shape 86"/>
         <p:cNvGrpSpPr/>
         <p:nvPr/>
       </p:nvGrpSpPr>
@@ -964,19 +1108,26 @@
       <p:sp>
         <p:nvSpPr>
           <p:cNvPr id="87" name="Shape 87"/>
-          <p:cNvSpPr/>
-          <p:nvPr>
-            <p:ph idx="2" type="sldImg"/>
-          </p:nvPr>
-        </p:nvSpPr>
-        <p:spPr>
-          <a:xfrm>
-            <a:off x="381300" y="685800"/>
+          <p:cNvSpPr>
+            <a:spLocks noGrp="1" noRot="1" noChangeAspect="1"/>
+          </p:cNvSpPr>
+          <p:nvPr>
+            <p:ph type="sldImg" idx="2"/>
+          </p:nvPr>
+        </p:nvSpPr>
+        <p:spPr>
+          <a:xfrm>
+            <a:off x="381000" y="685800"/>
             <a:ext cx="6096000" cy="3429000"/>
           </a:xfrm>
           <a:custGeom>
+            <a:avLst/>
+            <a:gdLst/>
+            <a:ahLst/>
+            <a:cxnLst/>
+            <a:rect l="0" t="0" r="0" b="0"/>
             <a:pathLst>
-              <a:path extrusionOk="0" h="120000" w="120000">
+              <a:path w="120000" h="120000" extrusionOk="0">
                 <a:moveTo>
                   <a:pt x="0" y="0"/>
                 </a:moveTo>
@@ -998,9 +1149,11 @@
       <p:sp>
         <p:nvSpPr>
           <p:cNvPr id="88" name="Shape 88"/>
-          <p:cNvSpPr txBox="1"/>
-          <p:nvPr>
-            <p:ph idx="1" type="body"/>
+          <p:cNvSpPr txBox="1">
+            <a:spLocks noGrp="1"/>
+          </p:cNvSpPr>
+          <p:nvPr>
+            <p:ph type="body" idx="1"/>
           </p:nvPr>
         </p:nvSpPr>
         <p:spPr>
@@ -1013,7 +1166,7 @@
           </a:prstGeom>
         </p:spPr>
         <p:txBody>
-          <a:bodyPr anchorCtr="0" anchor="t" bIns="91425" lIns="91425" rIns="91425" tIns="91425">
+          <a:bodyPr lIns="91425" tIns="91425" rIns="91425" bIns="91425" anchor="t" anchorCtr="0">
             <a:noAutofit/>
           </a:bodyPr>
           <a:lstStyle/>
@@ -1024,9 +1177,6 @@
               </a:spcBef>
               <a:buNone/>
             </a:pPr>
-            <a:r>
-              <a:t/>
-            </a:r>
             <a:endParaRPr/>
           </a:p>
         </p:txBody>
@@ -1040,11 +1190,11 @@
 </file>
 
 <file path=ppt/notesSlides/notesSlide8.xml><?xml version="1.0" encoding="utf-8"?>
-<p:notes xmlns:a="http://schemas.openxmlformats.org/drawingml/2006/main" xmlns:r="http://schemas.openxmlformats.org/officeDocument/2006/relationships" xmlns:mc="http://schemas.openxmlformats.org/markup-compatibility/2006" xmlns:mv="urn:schemas-microsoft-com:mac:vml" xmlns:p="http://schemas.openxmlformats.org/presentationml/2006/main" xmlns:c="http://schemas.openxmlformats.org/drawingml/2006/chart" xmlns:dgm="http://schemas.openxmlformats.org/drawingml/2006/diagram" xmlns:o="urn:schemas-microsoft-com:office:office" xmlns:v="urn:schemas-microsoft-com:vml" xmlns:pvml="urn:schemas-microsoft-com:office:powerpoint" xmlns:com="http://schemas.openxmlformats.org/drawingml/2006/compatibility" xmlns:p14="http://schemas.microsoft.com/office/powerpoint/2010/main" showMasterPhAnim="0" showMasterSp="0">
+<p:notes xmlns:a="http://schemas.openxmlformats.org/drawingml/2006/main" xmlns:r="http://schemas.openxmlformats.org/officeDocument/2006/relationships" xmlns:p="http://schemas.openxmlformats.org/presentationml/2006/main" showMasterSp="0" showMasterPhAnim="0">
   <p:cSld>
     <p:spTree>
       <p:nvGrpSpPr>
-        <p:cNvPr id="92" name="Shape 92"/>
+        <p:cNvPr id="1" name="Shape 92"/>
         <p:cNvGrpSpPr/>
         <p:nvPr/>
       </p:nvGrpSpPr>
@@ -1059,19 +1209,26 @@
       <p:sp>
         <p:nvSpPr>
           <p:cNvPr id="93" name="Shape 93"/>
-          <p:cNvSpPr/>
-          <p:nvPr>
-            <p:ph idx="2" type="sldImg"/>
-          </p:nvPr>
-        </p:nvSpPr>
-        <p:spPr>
-          <a:xfrm>
-            <a:off x="381300" y="685800"/>
+          <p:cNvSpPr>
+            <a:spLocks noGrp="1" noRot="1" noChangeAspect="1"/>
+          </p:cNvSpPr>
+          <p:nvPr>
+            <p:ph type="sldImg" idx="2"/>
+          </p:nvPr>
+        </p:nvSpPr>
+        <p:spPr>
+          <a:xfrm>
+            <a:off x="381000" y="685800"/>
             <a:ext cx="6096000" cy="3429000"/>
           </a:xfrm>
           <a:custGeom>
+            <a:avLst/>
+            <a:gdLst/>
+            <a:ahLst/>
+            <a:cxnLst/>
+            <a:rect l="0" t="0" r="0" b="0"/>
             <a:pathLst>
-              <a:path extrusionOk="0" h="120000" w="120000">
+              <a:path w="120000" h="120000" extrusionOk="0">
                 <a:moveTo>
                   <a:pt x="0" y="0"/>
                 </a:moveTo>
@@ -1093,9 +1250,11 @@
       <p:sp>
         <p:nvSpPr>
           <p:cNvPr id="94" name="Shape 94"/>
-          <p:cNvSpPr txBox="1"/>
-          <p:nvPr>
-            <p:ph idx="1" type="body"/>
+          <p:cNvSpPr txBox="1">
+            <a:spLocks noGrp="1"/>
+          </p:cNvSpPr>
+          <p:nvPr>
+            <p:ph type="body" idx="1"/>
           </p:nvPr>
         </p:nvSpPr>
         <p:spPr>
@@ -1108,7 +1267,7 @@
           </a:prstGeom>
         </p:spPr>
         <p:txBody>
-          <a:bodyPr anchorCtr="0" anchor="t" bIns="91425" lIns="91425" rIns="91425" tIns="91425">
+          <a:bodyPr lIns="91425" tIns="91425" rIns="91425" bIns="91425" anchor="t" anchorCtr="0">
             <a:noAutofit/>
           </a:bodyPr>
           <a:lstStyle/>
@@ -1119,9 +1278,6 @@
               </a:spcBef>
               <a:buNone/>
             </a:pPr>
-            <a:r>
-              <a:t/>
-            </a:r>
             <a:endParaRPr/>
           </a:p>
         </p:txBody>
@@ -1135,11 +1291,11 @@
 </file>
 
 <file path=ppt/notesSlides/notesSlide9.xml><?xml version="1.0" encoding="utf-8"?>
-<p:notes xmlns:a="http://schemas.openxmlformats.org/drawingml/2006/main" xmlns:r="http://schemas.openxmlformats.org/officeDocument/2006/relationships" xmlns:mc="http://schemas.openxmlformats.org/markup-compatibility/2006" xmlns:mv="urn:schemas-microsoft-com:mac:vml" xmlns:p="http://schemas.openxmlformats.org/presentationml/2006/main" xmlns:c="http://schemas.openxmlformats.org/drawingml/2006/chart" xmlns:dgm="http://schemas.openxmlformats.org/drawingml/2006/diagram" xmlns:o="urn:schemas-microsoft-com:office:office" xmlns:v="urn:schemas-microsoft-com:vml" xmlns:pvml="urn:schemas-microsoft-com:office:powerpoint" xmlns:com="http://schemas.openxmlformats.org/drawingml/2006/compatibility" xmlns:p14="http://schemas.microsoft.com/office/powerpoint/2010/main" showMasterPhAnim="0" showMasterSp="0">
+<p:notes xmlns:a="http://schemas.openxmlformats.org/drawingml/2006/main" xmlns:r="http://schemas.openxmlformats.org/officeDocument/2006/relationships" xmlns:p="http://schemas.openxmlformats.org/presentationml/2006/main" showMasterSp="0" showMasterPhAnim="0">
   <p:cSld>
     <p:spTree>
       <p:nvGrpSpPr>
-        <p:cNvPr id="98" name="Shape 98"/>
+        <p:cNvPr id="1" name="Shape 98"/>
         <p:cNvGrpSpPr/>
         <p:nvPr/>
       </p:nvGrpSpPr>
@@ -1154,19 +1310,26 @@
       <p:sp>
         <p:nvSpPr>
           <p:cNvPr id="99" name="Shape 99"/>
-          <p:cNvSpPr/>
-          <p:nvPr>
-            <p:ph idx="2" type="sldImg"/>
-          </p:nvPr>
-        </p:nvSpPr>
-        <p:spPr>
-          <a:xfrm>
-            <a:off x="381300" y="685800"/>
+          <p:cNvSpPr>
+            <a:spLocks noGrp="1" noRot="1" noChangeAspect="1"/>
+          </p:cNvSpPr>
+          <p:nvPr>
+            <p:ph type="sldImg" idx="2"/>
+          </p:nvPr>
+        </p:nvSpPr>
+        <p:spPr>
+          <a:xfrm>
+            <a:off x="381000" y="685800"/>
             <a:ext cx="6096000" cy="3429000"/>
           </a:xfrm>
           <a:custGeom>
+            <a:avLst/>
+            <a:gdLst/>
+            <a:ahLst/>
+            <a:cxnLst/>
+            <a:rect l="0" t="0" r="0" b="0"/>
             <a:pathLst>
-              <a:path extrusionOk="0" h="120000" w="120000">
+              <a:path w="120000" h="120000" extrusionOk="0">
                 <a:moveTo>
                   <a:pt x="0" y="0"/>
                 </a:moveTo>
@@ -1188,9 +1351,11 @@
       <p:sp>
         <p:nvSpPr>
           <p:cNvPr id="100" name="Shape 100"/>
-          <p:cNvSpPr txBox="1"/>
-          <p:nvPr>
-            <p:ph idx="1" type="body"/>
+          <p:cNvSpPr txBox="1">
+            <a:spLocks noGrp="1"/>
+          </p:cNvSpPr>
+          <p:nvPr>
+            <p:ph type="body" idx="1"/>
           </p:nvPr>
         </p:nvSpPr>
         <p:spPr>
@@ -1203,7 +1368,7 @@
           </a:prstGeom>
         </p:spPr>
         <p:txBody>
-          <a:bodyPr anchorCtr="0" anchor="t" bIns="91425" lIns="91425" rIns="91425" tIns="91425">
+          <a:bodyPr lIns="91425" tIns="91425" rIns="91425" bIns="91425" anchor="t" anchorCtr="0">
             <a:noAutofit/>
           </a:bodyPr>
           <a:lstStyle/>
@@ -1214,9 +1379,6 @@
               </a:spcBef>
               <a:buNone/>
             </a:pPr>
-            <a:r>
-              <a:t/>
-            </a:r>
             <a:endParaRPr/>
           </a:p>
         </p:txBody>
@@ -1230,11 +1392,11 @@
 </file>
 
 <file path=ppt/slideLayouts/slideLayout1.xml><?xml version="1.0" encoding="utf-8"?>
-<p:sldLayout xmlns:a="http://schemas.openxmlformats.org/drawingml/2006/main" xmlns:r="http://schemas.openxmlformats.org/officeDocument/2006/relationships" xmlns:mc="http://schemas.openxmlformats.org/markup-compatibility/2006" xmlns:mv="urn:schemas-microsoft-com:mac:vml" xmlns:p="http://schemas.openxmlformats.org/presentationml/2006/main" xmlns:c="http://schemas.openxmlformats.org/drawingml/2006/chart" xmlns:dgm="http://schemas.openxmlformats.org/drawingml/2006/diagram" xmlns:o="urn:schemas-microsoft-com:office:office" xmlns:v="urn:schemas-microsoft-com:vml" xmlns:pvml="urn:schemas-microsoft-com:office:powerpoint" xmlns:com="http://schemas.openxmlformats.org/drawingml/2006/compatibility" xmlns:p14="http://schemas.microsoft.com/office/powerpoint/2010/main" type="title">
+<p:sldLayout xmlns:a="http://schemas.openxmlformats.org/drawingml/2006/main" xmlns:r="http://schemas.openxmlformats.org/officeDocument/2006/relationships" xmlns:p="http://schemas.openxmlformats.org/presentationml/2006/main" type="title">
   <p:cSld name="Title slide">
     <p:spTree>
       <p:nvGrpSpPr>
-        <p:cNvPr id="9" name="Shape 9"/>
+        <p:cNvPr id="1" name="Shape 9"/>
         <p:cNvGrpSpPr/>
         <p:nvPr/>
       </p:nvGrpSpPr>
@@ -1249,7 +1411,9 @@
       <p:sp>
         <p:nvSpPr>
           <p:cNvPr id="10" name="Shape 10"/>
-          <p:cNvSpPr txBox="1"/>
+          <p:cNvSpPr txBox="1">
+            <a:spLocks noGrp="1"/>
+          </p:cNvSpPr>
           <p:nvPr>
             <p:ph type="ctrTitle"/>
           </p:nvPr>
@@ -1264,7 +1428,7 @@
           </a:prstGeom>
         </p:spPr>
         <p:txBody>
-          <a:bodyPr anchorCtr="0" anchor="b" bIns="91425" lIns="91425" rIns="91425" tIns="91425"/>
+          <a:bodyPr lIns="91425" tIns="91425" rIns="91425" bIns="91425" anchor="b" anchorCtr="0"/>
           <a:lstStyle>
             <a:lvl1pPr lvl="0" algn="ctr">
               <a:spcBef>
@@ -1330,15 +1494,19 @@
               <a:defRPr sz="5200"/>
             </a:lvl9pPr>
           </a:lstStyle>
-          <a:p/>
+          <a:p>
+            <a:endParaRPr/>
+          </a:p>
         </p:txBody>
       </p:sp>
       <p:sp>
         <p:nvSpPr>
           <p:cNvPr id="11" name="Shape 11"/>
-          <p:cNvSpPr txBox="1"/>
-          <p:nvPr>
-            <p:ph idx="1" type="subTitle"/>
+          <p:cNvSpPr txBox="1">
+            <a:spLocks noGrp="1"/>
+          </p:cNvSpPr>
+          <p:nvPr>
+            <p:ph type="subTitle" idx="1"/>
           </p:nvPr>
         </p:nvSpPr>
         <p:spPr>
@@ -1351,7 +1519,7 @@
           </a:prstGeom>
         </p:spPr>
         <p:txBody>
-          <a:bodyPr anchorCtr="0" anchor="t" bIns="91425" lIns="91425" rIns="91425" tIns="91425"/>
+          <a:bodyPr lIns="91425" tIns="91425" rIns="91425" bIns="91425" anchor="t" anchorCtr="0"/>
           <a:lstStyle>
             <a:lvl1pPr lvl="0" algn="ctr">
               <a:lnSpc>
@@ -1480,15 +1648,19 @@
               <a:defRPr sz="2800"/>
             </a:lvl9pPr>
           </a:lstStyle>
-          <a:p/>
+          <a:p>
+            <a:endParaRPr/>
+          </a:p>
         </p:txBody>
       </p:sp>
       <p:sp>
         <p:nvSpPr>
           <p:cNvPr id="12" name="Shape 12"/>
-          <p:cNvSpPr txBox="1"/>
-          <p:nvPr>
-            <p:ph idx="12" type="sldNum"/>
+          <p:cNvSpPr txBox="1">
+            <a:spLocks noGrp="1"/>
+          </p:cNvSpPr>
+          <p:nvPr>
+            <p:ph type="sldNum" idx="12"/>
           </p:nvPr>
         </p:nvSpPr>
         <p:spPr>
@@ -1501,7 +1673,7 @@
           </a:prstGeom>
         </p:spPr>
         <p:txBody>
-          <a:bodyPr anchorCtr="0" anchor="ctr" bIns="91425" lIns="91425" rIns="91425" tIns="91425">
+          <a:bodyPr lIns="91425" tIns="91425" rIns="91425" bIns="91425" anchor="ctr" anchorCtr="0">
             <a:noAutofit/>
           </a:bodyPr>
           <a:lstStyle/>
@@ -1516,6 +1688,7 @@
               <a:rPr lang="en"/>
               <a:t>‹#›</a:t>
             </a:fld>
+            <a:endParaRPr lang="en"/>
           </a:p>
         </p:txBody>
       </p:sp>
@@ -1528,11 +1701,11 @@
 </file>
 
 <file path=ppt/slideLayouts/slideLayout10.xml><?xml version="1.0" encoding="utf-8"?>
-<p:sldLayout xmlns:a="http://schemas.openxmlformats.org/drawingml/2006/main" xmlns:r="http://schemas.openxmlformats.org/officeDocument/2006/relationships" xmlns:mc="http://schemas.openxmlformats.org/markup-compatibility/2006" xmlns:mv="urn:schemas-microsoft-com:mac:vml" xmlns:p="http://schemas.openxmlformats.org/presentationml/2006/main" xmlns:c="http://schemas.openxmlformats.org/drawingml/2006/chart" xmlns:dgm="http://schemas.openxmlformats.org/drawingml/2006/diagram" xmlns:o="urn:schemas-microsoft-com:office:office" xmlns:v="urn:schemas-microsoft-com:vml" xmlns:pvml="urn:schemas-microsoft-com:office:powerpoint" xmlns:com="http://schemas.openxmlformats.org/drawingml/2006/compatibility" xmlns:p14="http://schemas.microsoft.com/office/powerpoint/2010/main">
+<p:sldLayout xmlns:a="http://schemas.openxmlformats.org/drawingml/2006/main" xmlns:r="http://schemas.openxmlformats.org/officeDocument/2006/relationships" xmlns:p="http://schemas.openxmlformats.org/presentationml/2006/main">
   <p:cSld name="Big number">
     <p:spTree>
       <p:nvGrpSpPr>
-        <p:cNvPr id="44" name="Shape 44"/>
+        <p:cNvPr id="1" name="Shape 44"/>
         <p:cNvGrpSpPr/>
         <p:nvPr/>
       </p:nvGrpSpPr>
@@ -1547,7 +1720,9 @@
       <p:sp>
         <p:nvSpPr>
           <p:cNvPr id="45" name="Shape 45"/>
-          <p:cNvSpPr txBox="1"/>
+          <p:cNvSpPr txBox="1">
+            <a:spLocks noGrp="1"/>
+          </p:cNvSpPr>
           <p:nvPr>
             <p:ph type="title"/>
           </p:nvPr>
@@ -1562,7 +1737,7 @@
           </a:prstGeom>
         </p:spPr>
         <p:txBody>
-          <a:bodyPr anchorCtr="0" anchor="b" bIns="91425" lIns="91425" rIns="91425" tIns="91425"/>
+          <a:bodyPr lIns="91425" tIns="91425" rIns="91425" bIns="91425" anchor="b" anchorCtr="0"/>
           <a:lstStyle>
             <a:lvl1pPr lvl="0" algn="ctr">
               <a:spcBef>
@@ -1628,15 +1803,19 @@
               <a:defRPr sz="12000"/>
             </a:lvl9pPr>
           </a:lstStyle>
-          <a:p/>
+          <a:p>
+            <a:endParaRPr/>
+          </a:p>
         </p:txBody>
       </p:sp>
       <p:sp>
         <p:nvSpPr>
           <p:cNvPr id="46" name="Shape 46"/>
-          <p:cNvSpPr txBox="1"/>
-          <p:nvPr>
-            <p:ph idx="1" type="body"/>
+          <p:cNvSpPr txBox="1">
+            <a:spLocks noGrp="1"/>
+          </p:cNvSpPr>
+          <p:nvPr>
+            <p:ph type="body" idx="1"/>
           </p:nvPr>
         </p:nvSpPr>
         <p:spPr>
@@ -1649,7 +1828,7 @@
           </a:prstGeom>
         </p:spPr>
         <p:txBody>
-          <a:bodyPr anchorCtr="0" anchor="t" bIns="91425" lIns="91425" rIns="91425" tIns="91425"/>
+          <a:bodyPr lIns="91425" tIns="91425" rIns="91425" bIns="91425" anchor="t" anchorCtr="0"/>
           <a:lstStyle>
             <a:lvl1pPr lvl="0" algn="ctr">
               <a:spcBef>
@@ -1706,15 +1885,19 @@
               <a:defRPr/>
             </a:lvl9pPr>
           </a:lstStyle>
-          <a:p/>
+          <a:p>
+            <a:endParaRPr/>
+          </a:p>
         </p:txBody>
       </p:sp>
       <p:sp>
         <p:nvSpPr>
           <p:cNvPr id="47" name="Shape 47"/>
-          <p:cNvSpPr txBox="1"/>
-          <p:nvPr>
-            <p:ph idx="12" type="sldNum"/>
+          <p:cNvSpPr txBox="1">
+            <a:spLocks noGrp="1"/>
+          </p:cNvSpPr>
+          <p:nvPr>
+            <p:ph type="sldNum" idx="12"/>
           </p:nvPr>
         </p:nvSpPr>
         <p:spPr>
@@ -1727,7 +1910,7 @@
           </a:prstGeom>
         </p:spPr>
         <p:txBody>
-          <a:bodyPr anchorCtr="0" anchor="ctr" bIns="91425" lIns="91425" rIns="91425" tIns="91425">
+          <a:bodyPr lIns="91425" tIns="91425" rIns="91425" bIns="91425" anchor="ctr" anchorCtr="0">
             <a:noAutofit/>
           </a:bodyPr>
           <a:lstStyle/>
@@ -1742,6 +1925,7 @@
               <a:rPr lang="en"/>
               <a:t>‹#›</a:t>
             </a:fld>
+            <a:endParaRPr lang="en"/>
           </a:p>
         </p:txBody>
       </p:sp>
@@ -1754,11 +1938,11 @@
 </file>
 
 <file path=ppt/slideLayouts/slideLayout11.xml><?xml version="1.0" encoding="utf-8"?>
-<p:sldLayout xmlns:a="http://schemas.openxmlformats.org/drawingml/2006/main" xmlns:r="http://schemas.openxmlformats.org/officeDocument/2006/relationships" xmlns:mc="http://schemas.openxmlformats.org/markup-compatibility/2006" xmlns:mv="urn:schemas-microsoft-com:mac:vml" xmlns:p="http://schemas.openxmlformats.org/presentationml/2006/main" xmlns:c="http://schemas.openxmlformats.org/drawingml/2006/chart" xmlns:dgm="http://schemas.openxmlformats.org/drawingml/2006/diagram" xmlns:o="urn:schemas-microsoft-com:office:office" xmlns:v="urn:schemas-microsoft-com:vml" xmlns:pvml="urn:schemas-microsoft-com:office:powerpoint" xmlns:com="http://schemas.openxmlformats.org/drawingml/2006/compatibility" xmlns:p14="http://schemas.microsoft.com/office/powerpoint/2010/main" type="blank">
+<p:sldLayout xmlns:a="http://schemas.openxmlformats.org/drawingml/2006/main" xmlns:r="http://schemas.openxmlformats.org/officeDocument/2006/relationships" xmlns:p="http://schemas.openxmlformats.org/presentationml/2006/main" type="blank">
   <p:cSld name="Blank">
     <p:spTree>
       <p:nvGrpSpPr>
-        <p:cNvPr id="48" name="Shape 48"/>
+        <p:cNvPr id="1" name="Shape 48"/>
         <p:cNvGrpSpPr/>
         <p:nvPr/>
       </p:nvGrpSpPr>
@@ -1773,9 +1957,11 @@
       <p:sp>
         <p:nvSpPr>
           <p:cNvPr id="49" name="Shape 49"/>
-          <p:cNvSpPr txBox="1"/>
-          <p:nvPr>
-            <p:ph idx="12" type="sldNum"/>
+          <p:cNvSpPr txBox="1">
+            <a:spLocks noGrp="1"/>
+          </p:cNvSpPr>
+          <p:nvPr>
+            <p:ph type="sldNum" idx="12"/>
           </p:nvPr>
         </p:nvSpPr>
         <p:spPr>
@@ -1788,7 +1974,7 @@
           </a:prstGeom>
         </p:spPr>
         <p:txBody>
-          <a:bodyPr anchorCtr="0" anchor="ctr" bIns="91425" lIns="91425" rIns="91425" tIns="91425">
+          <a:bodyPr lIns="91425" tIns="91425" rIns="91425" bIns="91425" anchor="ctr" anchorCtr="0">
             <a:noAutofit/>
           </a:bodyPr>
           <a:lstStyle/>
@@ -1803,6 +1989,7 @@
               <a:rPr lang="en"/>
               <a:t>‹#›</a:t>
             </a:fld>
+            <a:endParaRPr lang="en"/>
           </a:p>
         </p:txBody>
       </p:sp>
@@ -1815,11 +2002,11 @@
 </file>
 
 <file path=ppt/slideLayouts/slideLayout2.xml><?xml version="1.0" encoding="utf-8"?>
-<p:sldLayout xmlns:a="http://schemas.openxmlformats.org/drawingml/2006/main" xmlns:r="http://schemas.openxmlformats.org/officeDocument/2006/relationships" xmlns:mc="http://schemas.openxmlformats.org/markup-compatibility/2006" xmlns:mv="urn:schemas-microsoft-com:mac:vml" xmlns:p="http://schemas.openxmlformats.org/presentationml/2006/main" xmlns:c="http://schemas.openxmlformats.org/drawingml/2006/chart" xmlns:dgm="http://schemas.openxmlformats.org/drawingml/2006/diagram" xmlns:o="urn:schemas-microsoft-com:office:office" xmlns:v="urn:schemas-microsoft-com:vml" xmlns:pvml="urn:schemas-microsoft-com:office:powerpoint" xmlns:com="http://schemas.openxmlformats.org/drawingml/2006/compatibility" xmlns:p14="http://schemas.microsoft.com/office/powerpoint/2010/main" type="secHead">
+<p:sldLayout xmlns:a="http://schemas.openxmlformats.org/drawingml/2006/main" xmlns:r="http://schemas.openxmlformats.org/officeDocument/2006/relationships" xmlns:p="http://schemas.openxmlformats.org/presentationml/2006/main" type="secHead">
   <p:cSld name="Section header">
     <p:spTree>
       <p:nvGrpSpPr>
-        <p:cNvPr id="13" name="Shape 13"/>
+        <p:cNvPr id="1" name="Shape 13"/>
         <p:cNvGrpSpPr/>
         <p:nvPr/>
       </p:nvGrpSpPr>
@@ -1834,7 +2021,9 @@
       <p:sp>
         <p:nvSpPr>
           <p:cNvPr id="14" name="Shape 14"/>
-          <p:cNvSpPr txBox="1"/>
+          <p:cNvSpPr txBox="1">
+            <a:spLocks noGrp="1"/>
+          </p:cNvSpPr>
           <p:nvPr>
             <p:ph type="title"/>
           </p:nvPr>
@@ -1849,7 +2038,7 @@
           </a:prstGeom>
         </p:spPr>
         <p:txBody>
-          <a:bodyPr anchorCtr="0" anchor="ctr" bIns="91425" lIns="91425" rIns="91425" tIns="91425"/>
+          <a:bodyPr lIns="91425" tIns="91425" rIns="91425" bIns="91425" anchor="ctr" anchorCtr="0"/>
           <a:lstStyle>
             <a:lvl1pPr lvl="0" algn="ctr">
               <a:spcBef>
@@ -1915,15 +2104,19 @@
               <a:defRPr sz="3600"/>
             </a:lvl9pPr>
           </a:lstStyle>
-          <a:p/>
+          <a:p>
+            <a:endParaRPr/>
+          </a:p>
         </p:txBody>
       </p:sp>
       <p:sp>
         <p:nvSpPr>
           <p:cNvPr id="15" name="Shape 15"/>
-          <p:cNvSpPr txBox="1"/>
-          <p:nvPr>
-            <p:ph idx="12" type="sldNum"/>
+          <p:cNvSpPr txBox="1">
+            <a:spLocks noGrp="1"/>
+          </p:cNvSpPr>
+          <p:nvPr>
+            <p:ph type="sldNum" idx="12"/>
           </p:nvPr>
         </p:nvSpPr>
         <p:spPr>
@@ -1936,7 +2129,7 @@
           </a:prstGeom>
         </p:spPr>
         <p:txBody>
-          <a:bodyPr anchorCtr="0" anchor="ctr" bIns="91425" lIns="91425" rIns="91425" tIns="91425">
+          <a:bodyPr lIns="91425" tIns="91425" rIns="91425" bIns="91425" anchor="ctr" anchorCtr="0">
             <a:noAutofit/>
           </a:bodyPr>
           <a:lstStyle/>
@@ -1951,6 +2144,7 @@
               <a:rPr lang="en"/>
               <a:t>‹#›</a:t>
             </a:fld>
+            <a:endParaRPr lang="en"/>
           </a:p>
         </p:txBody>
       </p:sp>
@@ -1963,11 +2157,11 @@
 </file>
 
 <file path=ppt/slideLayouts/slideLayout3.xml><?xml version="1.0" encoding="utf-8"?>
-<p:sldLayout xmlns:a="http://schemas.openxmlformats.org/drawingml/2006/main" xmlns:r="http://schemas.openxmlformats.org/officeDocument/2006/relationships" xmlns:mc="http://schemas.openxmlformats.org/markup-compatibility/2006" xmlns:mv="urn:schemas-microsoft-com:mac:vml" xmlns:p="http://schemas.openxmlformats.org/presentationml/2006/main" xmlns:c="http://schemas.openxmlformats.org/drawingml/2006/chart" xmlns:dgm="http://schemas.openxmlformats.org/drawingml/2006/diagram" xmlns:o="urn:schemas-microsoft-com:office:office" xmlns:v="urn:schemas-microsoft-com:vml" xmlns:pvml="urn:schemas-microsoft-com:office:powerpoint" xmlns:com="http://schemas.openxmlformats.org/drawingml/2006/compatibility" xmlns:p14="http://schemas.microsoft.com/office/powerpoint/2010/main" type="tx">
+<p:sldLayout xmlns:a="http://schemas.openxmlformats.org/drawingml/2006/main" xmlns:r="http://schemas.openxmlformats.org/officeDocument/2006/relationships" xmlns:p="http://schemas.openxmlformats.org/presentationml/2006/main" type="tx">
   <p:cSld name="Title and body">
     <p:spTree>
       <p:nvGrpSpPr>
-        <p:cNvPr id="16" name="Shape 16"/>
+        <p:cNvPr id="1" name="Shape 16"/>
         <p:cNvGrpSpPr/>
         <p:nvPr/>
       </p:nvGrpSpPr>
@@ -1982,7 +2176,9 @@
       <p:sp>
         <p:nvSpPr>
           <p:cNvPr id="17" name="Shape 17"/>
-          <p:cNvSpPr txBox="1"/>
+          <p:cNvSpPr txBox="1">
+            <a:spLocks noGrp="1"/>
+          </p:cNvSpPr>
           <p:nvPr>
             <p:ph type="title"/>
           </p:nvPr>
@@ -1997,7 +2193,7 @@
           </a:prstGeom>
         </p:spPr>
         <p:txBody>
-          <a:bodyPr anchorCtr="0" anchor="t" bIns="91425" lIns="91425" rIns="91425" tIns="91425"/>
+          <a:bodyPr lIns="91425" tIns="91425" rIns="91425" bIns="91425" anchor="t" anchorCtr="0"/>
           <a:lstStyle>
             <a:lvl1pPr lvl="0">
               <a:spcBef>
@@ -2054,15 +2250,19 @@
               <a:defRPr/>
             </a:lvl9pPr>
           </a:lstStyle>
-          <a:p/>
+          <a:p>
+            <a:endParaRPr/>
+          </a:p>
         </p:txBody>
       </p:sp>
       <p:sp>
         <p:nvSpPr>
           <p:cNvPr id="18" name="Shape 18"/>
-          <p:cNvSpPr txBox="1"/>
-          <p:nvPr>
-            <p:ph idx="1" type="body"/>
+          <p:cNvSpPr txBox="1">
+            <a:spLocks noGrp="1"/>
+          </p:cNvSpPr>
+          <p:nvPr>
+            <p:ph type="body" idx="1"/>
           </p:nvPr>
         </p:nvSpPr>
         <p:spPr>
@@ -2075,7 +2275,7 @@
           </a:prstGeom>
         </p:spPr>
         <p:txBody>
-          <a:bodyPr anchorCtr="0" anchor="t" bIns="91425" lIns="91425" rIns="91425" tIns="91425"/>
+          <a:bodyPr lIns="91425" tIns="91425" rIns="91425" bIns="91425" anchor="t" anchorCtr="0"/>
           <a:lstStyle>
             <a:lvl1pPr lvl="0">
               <a:spcBef>
@@ -2132,15 +2332,19 @@
               <a:defRPr/>
             </a:lvl9pPr>
           </a:lstStyle>
-          <a:p/>
+          <a:p>
+            <a:endParaRPr/>
+          </a:p>
         </p:txBody>
       </p:sp>
       <p:sp>
         <p:nvSpPr>
           <p:cNvPr id="19" name="Shape 19"/>
-          <p:cNvSpPr txBox="1"/>
-          <p:nvPr>
-            <p:ph idx="12" type="sldNum"/>
+          <p:cNvSpPr txBox="1">
+            <a:spLocks noGrp="1"/>
+          </p:cNvSpPr>
+          <p:nvPr>
+            <p:ph type="sldNum" idx="12"/>
           </p:nvPr>
         </p:nvSpPr>
         <p:spPr>
@@ -2153,7 +2357,7 @@
           </a:prstGeom>
         </p:spPr>
         <p:txBody>
-          <a:bodyPr anchorCtr="0" anchor="ctr" bIns="91425" lIns="91425" rIns="91425" tIns="91425">
+          <a:bodyPr lIns="91425" tIns="91425" rIns="91425" bIns="91425" anchor="ctr" anchorCtr="0">
             <a:noAutofit/>
           </a:bodyPr>
           <a:lstStyle/>
@@ -2168,6 +2372,7 @@
               <a:rPr lang="en"/>
               <a:t>‹#›</a:t>
             </a:fld>
+            <a:endParaRPr lang="en"/>
           </a:p>
         </p:txBody>
       </p:sp>
@@ -2180,11 +2385,11 @@
 </file>
 
 <file path=ppt/slideLayouts/slideLayout4.xml><?xml version="1.0" encoding="utf-8"?>
-<p:sldLayout xmlns:a="http://schemas.openxmlformats.org/drawingml/2006/main" xmlns:r="http://schemas.openxmlformats.org/officeDocument/2006/relationships" xmlns:mc="http://schemas.openxmlformats.org/markup-compatibility/2006" xmlns:mv="urn:schemas-microsoft-com:mac:vml" xmlns:p="http://schemas.openxmlformats.org/presentationml/2006/main" xmlns:c="http://schemas.openxmlformats.org/drawingml/2006/chart" xmlns:dgm="http://schemas.openxmlformats.org/drawingml/2006/diagram" xmlns:o="urn:schemas-microsoft-com:office:office" xmlns:v="urn:schemas-microsoft-com:vml" xmlns:pvml="urn:schemas-microsoft-com:office:powerpoint" xmlns:com="http://schemas.openxmlformats.org/drawingml/2006/compatibility" xmlns:p14="http://schemas.microsoft.com/office/powerpoint/2010/main" type="twoColTx">
+<p:sldLayout xmlns:a="http://schemas.openxmlformats.org/drawingml/2006/main" xmlns:r="http://schemas.openxmlformats.org/officeDocument/2006/relationships" xmlns:p="http://schemas.openxmlformats.org/presentationml/2006/main" type="twoColTx">
   <p:cSld name="Title and two columns">
     <p:spTree>
       <p:nvGrpSpPr>
-        <p:cNvPr id="20" name="Shape 20"/>
+        <p:cNvPr id="1" name="Shape 20"/>
         <p:cNvGrpSpPr/>
         <p:nvPr/>
       </p:nvGrpSpPr>
@@ -2199,7 +2404,9 @@
       <p:sp>
         <p:nvSpPr>
           <p:cNvPr id="21" name="Shape 21"/>
-          <p:cNvSpPr txBox="1"/>
+          <p:cNvSpPr txBox="1">
+            <a:spLocks noGrp="1"/>
+          </p:cNvSpPr>
           <p:nvPr>
             <p:ph type="title"/>
           </p:nvPr>
@@ -2214,7 +2421,7 @@
           </a:prstGeom>
         </p:spPr>
         <p:txBody>
-          <a:bodyPr anchorCtr="0" anchor="t" bIns="91425" lIns="91425" rIns="91425" tIns="91425"/>
+          <a:bodyPr lIns="91425" tIns="91425" rIns="91425" bIns="91425" anchor="t" anchorCtr="0"/>
           <a:lstStyle>
             <a:lvl1pPr lvl="0">
               <a:spcBef>
@@ -2271,15 +2478,19 @@
               <a:defRPr/>
             </a:lvl9pPr>
           </a:lstStyle>
-          <a:p/>
+          <a:p>
+            <a:endParaRPr/>
+          </a:p>
         </p:txBody>
       </p:sp>
       <p:sp>
         <p:nvSpPr>
           <p:cNvPr id="22" name="Shape 22"/>
-          <p:cNvSpPr txBox="1"/>
-          <p:nvPr>
-            <p:ph idx="1" type="body"/>
+          <p:cNvSpPr txBox="1">
+            <a:spLocks noGrp="1"/>
+          </p:cNvSpPr>
+          <p:nvPr>
+            <p:ph type="body" idx="1"/>
           </p:nvPr>
         </p:nvSpPr>
         <p:spPr>
@@ -2292,7 +2503,7 @@
           </a:prstGeom>
         </p:spPr>
         <p:txBody>
-          <a:bodyPr anchorCtr="0" anchor="t" bIns="91425" lIns="91425" rIns="91425" tIns="91425"/>
+          <a:bodyPr lIns="91425" tIns="91425" rIns="91425" bIns="91425" anchor="t" anchorCtr="0"/>
           <a:lstStyle>
             <a:lvl1pPr lvl="0">
               <a:spcBef>
@@ -2358,15 +2569,19 @@
               <a:defRPr sz="1200"/>
             </a:lvl9pPr>
           </a:lstStyle>
-          <a:p/>
+          <a:p>
+            <a:endParaRPr/>
+          </a:p>
         </p:txBody>
       </p:sp>
       <p:sp>
         <p:nvSpPr>
           <p:cNvPr id="23" name="Shape 23"/>
-          <p:cNvSpPr txBox="1"/>
-          <p:nvPr>
-            <p:ph idx="2" type="body"/>
+          <p:cNvSpPr txBox="1">
+            <a:spLocks noGrp="1"/>
+          </p:cNvSpPr>
+          <p:nvPr>
+            <p:ph type="body" idx="2"/>
           </p:nvPr>
         </p:nvSpPr>
         <p:spPr>
@@ -2379,7 +2594,7 @@
           </a:prstGeom>
         </p:spPr>
         <p:txBody>
-          <a:bodyPr anchorCtr="0" anchor="t" bIns="91425" lIns="91425" rIns="91425" tIns="91425"/>
+          <a:bodyPr lIns="91425" tIns="91425" rIns="91425" bIns="91425" anchor="t" anchorCtr="0"/>
           <a:lstStyle>
             <a:lvl1pPr lvl="0">
               <a:spcBef>
@@ -2445,15 +2660,19 @@
               <a:defRPr sz="1200"/>
             </a:lvl9pPr>
           </a:lstStyle>
-          <a:p/>
+          <a:p>
+            <a:endParaRPr/>
+          </a:p>
         </p:txBody>
       </p:sp>
       <p:sp>
         <p:nvSpPr>
           <p:cNvPr id="24" name="Shape 24"/>
-          <p:cNvSpPr txBox="1"/>
-          <p:nvPr>
-            <p:ph idx="12" type="sldNum"/>
+          <p:cNvSpPr txBox="1">
+            <a:spLocks noGrp="1"/>
+          </p:cNvSpPr>
+          <p:nvPr>
+            <p:ph type="sldNum" idx="12"/>
           </p:nvPr>
         </p:nvSpPr>
         <p:spPr>
@@ -2466,7 +2685,7 @@
           </a:prstGeom>
         </p:spPr>
         <p:txBody>
-          <a:bodyPr anchorCtr="0" anchor="ctr" bIns="91425" lIns="91425" rIns="91425" tIns="91425">
+          <a:bodyPr lIns="91425" tIns="91425" rIns="91425" bIns="91425" anchor="ctr" anchorCtr="0">
             <a:noAutofit/>
           </a:bodyPr>
           <a:lstStyle/>
@@ -2481,6 +2700,7 @@
               <a:rPr lang="en"/>
               <a:t>‹#›</a:t>
             </a:fld>
+            <a:endParaRPr lang="en"/>
           </a:p>
         </p:txBody>
       </p:sp>
@@ -2493,11 +2713,11 @@
 </file>
 
 <file path=ppt/slideLayouts/slideLayout5.xml><?xml version="1.0" encoding="utf-8"?>
-<p:sldLayout xmlns:a="http://schemas.openxmlformats.org/drawingml/2006/main" xmlns:r="http://schemas.openxmlformats.org/officeDocument/2006/relationships" xmlns:mc="http://schemas.openxmlformats.org/markup-compatibility/2006" xmlns:mv="urn:schemas-microsoft-com:mac:vml" xmlns:p="http://schemas.openxmlformats.org/presentationml/2006/main" xmlns:c="http://schemas.openxmlformats.org/drawingml/2006/chart" xmlns:dgm="http://schemas.openxmlformats.org/drawingml/2006/diagram" xmlns:o="urn:schemas-microsoft-com:office:office" xmlns:v="urn:schemas-microsoft-com:vml" xmlns:pvml="urn:schemas-microsoft-com:office:powerpoint" xmlns:com="http://schemas.openxmlformats.org/drawingml/2006/compatibility" xmlns:p14="http://schemas.microsoft.com/office/powerpoint/2010/main" type="titleOnly">
+<p:sldLayout xmlns:a="http://schemas.openxmlformats.org/drawingml/2006/main" xmlns:r="http://schemas.openxmlformats.org/officeDocument/2006/relationships" xmlns:p="http://schemas.openxmlformats.org/presentationml/2006/main" type="titleOnly">
   <p:cSld name="Title only">
     <p:spTree>
       <p:nvGrpSpPr>
-        <p:cNvPr id="25" name="Shape 25"/>
+        <p:cNvPr id="1" name="Shape 25"/>
         <p:cNvGrpSpPr/>
         <p:nvPr/>
       </p:nvGrpSpPr>
@@ -2512,7 +2732,9 @@
       <p:sp>
         <p:nvSpPr>
           <p:cNvPr id="26" name="Shape 26"/>
-          <p:cNvSpPr txBox="1"/>
+          <p:cNvSpPr txBox="1">
+            <a:spLocks noGrp="1"/>
+          </p:cNvSpPr>
           <p:nvPr>
             <p:ph type="title"/>
           </p:nvPr>
@@ -2527,7 +2749,7 @@
           </a:prstGeom>
         </p:spPr>
         <p:txBody>
-          <a:bodyPr anchorCtr="0" anchor="t" bIns="91425" lIns="91425" rIns="91425" tIns="91425"/>
+          <a:bodyPr lIns="91425" tIns="91425" rIns="91425" bIns="91425" anchor="t" anchorCtr="0"/>
           <a:lstStyle>
             <a:lvl1pPr lvl="0">
               <a:spcBef>
@@ -2584,15 +2806,19 @@
               <a:defRPr/>
             </a:lvl9pPr>
           </a:lstStyle>
-          <a:p/>
+          <a:p>
+            <a:endParaRPr/>
+          </a:p>
         </p:txBody>
       </p:sp>
       <p:sp>
         <p:nvSpPr>
           <p:cNvPr id="27" name="Shape 27"/>
-          <p:cNvSpPr txBox="1"/>
-          <p:nvPr>
-            <p:ph idx="12" type="sldNum"/>
+          <p:cNvSpPr txBox="1">
+            <a:spLocks noGrp="1"/>
+          </p:cNvSpPr>
+          <p:nvPr>
+            <p:ph type="sldNum" idx="12"/>
           </p:nvPr>
         </p:nvSpPr>
         <p:spPr>
@@ -2605,7 +2831,7 @@
           </a:prstGeom>
         </p:spPr>
         <p:txBody>
-          <a:bodyPr anchorCtr="0" anchor="ctr" bIns="91425" lIns="91425" rIns="91425" tIns="91425">
+          <a:bodyPr lIns="91425" tIns="91425" rIns="91425" bIns="91425" anchor="ctr" anchorCtr="0">
             <a:noAutofit/>
           </a:bodyPr>
           <a:lstStyle/>
@@ -2620,6 +2846,7 @@
               <a:rPr lang="en"/>
               <a:t>‹#›</a:t>
             </a:fld>
+            <a:endParaRPr lang="en"/>
           </a:p>
         </p:txBody>
       </p:sp>
@@ -2632,11 +2859,11 @@
 </file>
 
 <file path=ppt/slideLayouts/slideLayout6.xml><?xml version="1.0" encoding="utf-8"?>
-<p:sldLayout xmlns:a="http://schemas.openxmlformats.org/drawingml/2006/main" xmlns:r="http://schemas.openxmlformats.org/officeDocument/2006/relationships" xmlns:mc="http://schemas.openxmlformats.org/markup-compatibility/2006" xmlns:mv="urn:schemas-microsoft-com:mac:vml" xmlns:p="http://schemas.openxmlformats.org/presentationml/2006/main" xmlns:c="http://schemas.openxmlformats.org/drawingml/2006/chart" xmlns:dgm="http://schemas.openxmlformats.org/drawingml/2006/diagram" xmlns:o="urn:schemas-microsoft-com:office:office" xmlns:v="urn:schemas-microsoft-com:vml" xmlns:pvml="urn:schemas-microsoft-com:office:powerpoint" xmlns:com="http://schemas.openxmlformats.org/drawingml/2006/compatibility" xmlns:p14="http://schemas.microsoft.com/office/powerpoint/2010/main">
+<p:sldLayout xmlns:a="http://schemas.openxmlformats.org/drawingml/2006/main" xmlns:r="http://schemas.openxmlformats.org/officeDocument/2006/relationships" xmlns:p="http://schemas.openxmlformats.org/presentationml/2006/main">
   <p:cSld name="One column text">
     <p:spTree>
       <p:nvGrpSpPr>
-        <p:cNvPr id="28" name="Shape 28"/>
+        <p:cNvPr id="1" name="Shape 28"/>
         <p:cNvGrpSpPr/>
         <p:nvPr/>
       </p:nvGrpSpPr>
@@ -2651,7 +2878,9 @@
       <p:sp>
         <p:nvSpPr>
           <p:cNvPr id="29" name="Shape 29"/>
-          <p:cNvSpPr txBox="1"/>
+          <p:cNvSpPr txBox="1">
+            <a:spLocks noGrp="1"/>
+          </p:cNvSpPr>
           <p:nvPr>
             <p:ph type="title"/>
           </p:nvPr>
@@ -2666,7 +2895,7 @@
           </a:prstGeom>
         </p:spPr>
         <p:txBody>
-          <a:bodyPr anchorCtr="0" anchor="b" bIns="91425" lIns="91425" rIns="91425" tIns="91425"/>
+          <a:bodyPr lIns="91425" tIns="91425" rIns="91425" bIns="91425" anchor="b" anchorCtr="0"/>
           <a:lstStyle>
             <a:lvl1pPr lvl="0">
               <a:spcBef>
@@ -2732,15 +2961,19 @@
               <a:defRPr sz="2400"/>
             </a:lvl9pPr>
           </a:lstStyle>
-          <a:p/>
+          <a:p>
+            <a:endParaRPr/>
+          </a:p>
         </p:txBody>
       </p:sp>
       <p:sp>
         <p:nvSpPr>
           <p:cNvPr id="30" name="Shape 30"/>
-          <p:cNvSpPr txBox="1"/>
-          <p:nvPr>
-            <p:ph idx="1" type="body"/>
+          <p:cNvSpPr txBox="1">
+            <a:spLocks noGrp="1"/>
+          </p:cNvSpPr>
+          <p:nvPr>
+            <p:ph type="body" idx="1"/>
           </p:nvPr>
         </p:nvSpPr>
         <p:spPr>
@@ -2753,7 +2986,7 @@
           </a:prstGeom>
         </p:spPr>
         <p:txBody>
-          <a:bodyPr anchorCtr="0" anchor="t" bIns="91425" lIns="91425" rIns="91425" tIns="91425"/>
+          <a:bodyPr lIns="91425" tIns="91425" rIns="91425" bIns="91425" anchor="t" anchorCtr="0"/>
           <a:lstStyle>
             <a:lvl1pPr lvl="0">
               <a:spcBef>
@@ -2819,15 +3052,19 @@
               <a:defRPr sz="1200"/>
             </a:lvl9pPr>
           </a:lstStyle>
-          <a:p/>
+          <a:p>
+            <a:endParaRPr/>
+          </a:p>
         </p:txBody>
       </p:sp>
       <p:sp>
         <p:nvSpPr>
           <p:cNvPr id="31" name="Shape 31"/>
-          <p:cNvSpPr txBox="1"/>
-          <p:nvPr>
-            <p:ph idx="12" type="sldNum"/>
+          <p:cNvSpPr txBox="1">
+            <a:spLocks noGrp="1"/>
+          </p:cNvSpPr>
+          <p:nvPr>
+            <p:ph type="sldNum" idx="12"/>
           </p:nvPr>
         </p:nvSpPr>
         <p:spPr>
@@ -2840,7 +3077,7 @@
           </a:prstGeom>
         </p:spPr>
         <p:txBody>
-          <a:bodyPr anchorCtr="0" anchor="ctr" bIns="91425" lIns="91425" rIns="91425" tIns="91425">
+          <a:bodyPr lIns="91425" tIns="91425" rIns="91425" bIns="91425" anchor="ctr" anchorCtr="0">
             <a:noAutofit/>
           </a:bodyPr>
           <a:lstStyle/>
@@ -2855,6 +3092,7 @@
               <a:rPr lang="en"/>
               <a:t>‹#›</a:t>
             </a:fld>
+            <a:endParaRPr lang="en"/>
           </a:p>
         </p:txBody>
       </p:sp>
@@ -2867,11 +3105,11 @@
 </file>
 
 <file path=ppt/slideLayouts/slideLayout7.xml><?xml version="1.0" encoding="utf-8"?>
-<p:sldLayout xmlns:a="http://schemas.openxmlformats.org/drawingml/2006/main" xmlns:r="http://schemas.openxmlformats.org/officeDocument/2006/relationships" xmlns:mc="http://schemas.openxmlformats.org/markup-compatibility/2006" xmlns:mv="urn:schemas-microsoft-com:mac:vml" xmlns:p="http://schemas.openxmlformats.org/presentationml/2006/main" xmlns:c="http://schemas.openxmlformats.org/drawingml/2006/chart" xmlns:dgm="http://schemas.openxmlformats.org/drawingml/2006/diagram" xmlns:o="urn:schemas-microsoft-com:office:office" xmlns:v="urn:schemas-microsoft-com:vml" xmlns:pvml="urn:schemas-microsoft-com:office:powerpoint" xmlns:com="http://schemas.openxmlformats.org/drawingml/2006/compatibility" xmlns:p14="http://schemas.microsoft.com/office/powerpoint/2010/main">
+<p:sldLayout xmlns:a="http://schemas.openxmlformats.org/drawingml/2006/main" xmlns:r="http://schemas.openxmlformats.org/officeDocument/2006/relationships" xmlns:p="http://schemas.openxmlformats.org/presentationml/2006/main">
   <p:cSld name="Main point">
     <p:spTree>
       <p:nvGrpSpPr>
-        <p:cNvPr id="32" name="Shape 32"/>
+        <p:cNvPr id="1" name="Shape 32"/>
         <p:cNvGrpSpPr/>
         <p:nvPr/>
       </p:nvGrpSpPr>
@@ -2886,7 +3124,9 @@
       <p:sp>
         <p:nvSpPr>
           <p:cNvPr id="33" name="Shape 33"/>
-          <p:cNvSpPr txBox="1"/>
+          <p:cNvSpPr txBox="1">
+            <a:spLocks noGrp="1"/>
+          </p:cNvSpPr>
           <p:nvPr>
             <p:ph type="title"/>
           </p:nvPr>
@@ -2901,7 +3141,7 @@
           </a:prstGeom>
         </p:spPr>
         <p:txBody>
-          <a:bodyPr anchorCtr="0" anchor="ctr" bIns="91425" lIns="91425" rIns="91425" tIns="91425"/>
+          <a:bodyPr lIns="91425" tIns="91425" rIns="91425" bIns="91425" anchor="ctr" anchorCtr="0"/>
           <a:lstStyle>
             <a:lvl1pPr lvl="0">
               <a:spcBef>
@@ -2967,15 +3207,19 @@
               <a:defRPr sz="4800"/>
             </a:lvl9pPr>
           </a:lstStyle>
-          <a:p/>
+          <a:p>
+            <a:endParaRPr/>
+          </a:p>
         </p:txBody>
       </p:sp>
       <p:sp>
         <p:nvSpPr>
           <p:cNvPr id="34" name="Shape 34"/>
-          <p:cNvSpPr txBox="1"/>
-          <p:nvPr>
-            <p:ph idx="12" type="sldNum"/>
+          <p:cNvSpPr txBox="1">
+            <a:spLocks noGrp="1"/>
+          </p:cNvSpPr>
+          <p:nvPr>
+            <p:ph type="sldNum" idx="12"/>
           </p:nvPr>
         </p:nvSpPr>
         <p:spPr>
@@ -2988,7 +3232,7 @@
           </a:prstGeom>
         </p:spPr>
         <p:txBody>
-          <a:bodyPr anchorCtr="0" anchor="ctr" bIns="91425" lIns="91425" rIns="91425" tIns="91425">
+          <a:bodyPr lIns="91425" tIns="91425" rIns="91425" bIns="91425" anchor="ctr" anchorCtr="0">
             <a:noAutofit/>
           </a:bodyPr>
           <a:lstStyle/>
@@ -3003,6 +3247,7 @@
               <a:rPr lang="en"/>
               <a:t>‹#›</a:t>
             </a:fld>
+            <a:endParaRPr lang="en"/>
           </a:p>
         </p:txBody>
       </p:sp>
@@ -3015,11 +3260,11 @@
 </file>
 
 <file path=ppt/slideLayouts/slideLayout8.xml><?xml version="1.0" encoding="utf-8"?>
-<p:sldLayout xmlns:a="http://schemas.openxmlformats.org/drawingml/2006/main" xmlns:r="http://schemas.openxmlformats.org/officeDocument/2006/relationships" xmlns:mc="http://schemas.openxmlformats.org/markup-compatibility/2006" xmlns:mv="urn:schemas-microsoft-com:mac:vml" xmlns:p="http://schemas.openxmlformats.org/presentationml/2006/main" xmlns:c="http://schemas.openxmlformats.org/drawingml/2006/chart" xmlns:dgm="http://schemas.openxmlformats.org/drawingml/2006/diagram" xmlns:o="urn:schemas-microsoft-com:office:office" xmlns:v="urn:schemas-microsoft-com:vml" xmlns:pvml="urn:schemas-microsoft-com:office:powerpoint" xmlns:com="http://schemas.openxmlformats.org/drawingml/2006/compatibility" xmlns:p14="http://schemas.microsoft.com/office/powerpoint/2010/main">
+<p:sldLayout xmlns:a="http://schemas.openxmlformats.org/drawingml/2006/main" xmlns:r="http://schemas.openxmlformats.org/officeDocument/2006/relationships" xmlns:p="http://schemas.openxmlformats.org/presentationml/2006/main">
   <p:cSld name="Section title and description">
     <p:spTree>
       <p:nvGrpSpPr>
-        <p:cNvPr id="35" name="Shape 35"/>
+        <p:cNvPr id="1" name="Shape 35"/>
         <p:cNvGrpSpPr/>
         <p:nvPr/>
       </p:nvGrpSpPr>
@@ -3053,7 +3298,7 @@
           </a:ln>
         </p:spPr>
         <p:txBody>
-          <a:bodyPr anchorCtr="0" anchor="ctr" bIns="91425" lIns="91425" rIns="91425" tIns="91425">
+          <a:bodyPr lIns="91425" tIns="91425" rIns="91425" bIns="91425" anchor="ctr" anchorCtr="0">
             <a:noAutofit/>
           </a:bodyPr>
           <a:lstStyle/>
@@ -3064,9 +3309,6 @@
               </a:spcBef>
               <a:buNone/>
             </a:pPr>
-            <a:r>
-              <a:t/>
-            </a:r>
             <a:endParaRPr/>
           </a:p>
         </p:txBody>
@@ -3074,7 +3316,9 @@
       <p:sp>
         <p:nvSpPr>
           <p:cNvPr id="37" name="Shape 37"/>
-          <p:cNvSpPr txBox="1"/>
+          <p:cNvSpPr txBox="1">
+            <a:spLocks noGrp="1"/>
+          </p:cNvSpPr>
           <p:nvPr>
             <p:ph type="title"/>
           </p:nvPr>
@@ -3089,7 +3333,7 @@
           </a:prstGeom>
         </p:spPr>
         <p:txBody>
-          <a:bodyPr anchorCtr="0" anchor="b" bIns="91425" lIns="91425" rIns="91425" tIns="91425"/>
+          <a:bodyPr lIns="91425" tIns="91425" rIns="91425" bIns="91425" anchor="b" anchorCtr="0"/>
           <a:lstStyle>
             <a:lvl1pPr lvl="0" algn="ctr">
               <a:spcBef>
@@ -3155,15 +3399,19 @@
               <a:defRPr sz="4200"/>
             </a:lvl9pPr>
           </a:lstStyle>
-          <a:p/>
+          <a:p>
+            <a:endParaRPr/>
+          </a:p>
         </p:txBody>
       </p:sp>
       <p:sp>
         <p:nvSpPr>
           <p:cNvPr id="38" name="Shape 38"/>
-          <p:cNvSpPr txBox="1"/>
-          <p:nvPr>
-            <p:ph idx="1" type="subTitle"/>
+          <p:cNvSpPr txBox="1">
+            <a:spLocks noGrp="1"/>
+          </p:cNvSpPr>
+          <p:nvPr>
+            <p:ph type="subTitle" idx="1"/>
           </p:nvPr>
         </p:nvSpPr>
         <p:spPr>
@@ -3176,7 +3424,7 @@
           </a:prstGeom>
         </p:spPr>
         <p:txBody>
-          <a:bodyPr anchorCtr="0" anchor="t" bIns="91425" lIns="91425" rIns="91425" tIns="91425"/>
+          <a:bodyPr lIns="91425" tIns="91425" rIns="91425" bIns="91425" anchor="t" anchorCtr="0"/>
           <a:lstStyle>
             <a:lvl1pPr lvl="0" algn="ctr">
               <a:lnSpc>
@@ -3305,15 +3553,19 @@
               <a:defRPr sz="2100"/>
             </a:lvl9pPr>
           </a:lstStyle>
-          <a:p/>
+          <a:p>
+            <a:endParaRPr/>
+          </a:p>
         </p:txBody>
       </p:sp>
       <p:sp>
         <p:nvSpPr>
           <p:cNvPr id="39" name="Shape 39"/>
-          <p:cNvSpPr txBox="1"/>
-          <p:nvPr>
-            <p:ph idx="2" type="body"/>
+          <p:cNvSpPr txBox="1">
+            <a:spLocks noGrp="1"/>
+          </p:cNvSpPr>
+          <p:nvPr>
+            <p:ph type="body" idx="2"/>
           </p:nvPr>
         </p:nvSpPr>
         <p:spPr>
@@ -3326,7 +3578,7 @@
           </a:prstGeom>
         </p:spPr>
         <p:txBody>
-          <a:bodyPr anchorCtr="0" anchor="ctr" bIns="91425" lIns="91425" rIns="91425" tIns="91425"/>
+          <a:bodyPr lIns="91425" tIns="91425" rIns="91425" bIns="91425" anchor="ctr" anchorCtr="0"/>
           <a:lstStyle>
             <a:lvl1pPr lvl="0">
               <a:spcBef>
@@ -3383,15 +3635,19 @@
               <a:defRPr/>
             </a:lvl9pPr>
           </a:lstStyle>
-          <a:p/>
+          <a:p>
+            <a:endParaRPr/>
+          </a:p>
         </p:txBody>
       </p:sp>
       <p:sp>
         <p:nvSpPr>
           <p:cNvPr id="40" name="Shape 40"/>
-          <p:cNvSpPr txBox="1"/>
-          <p:nvPr>
-            <p:ph idx="12" type="sldNum"/>
+          <p:cNvSpPr txBox="1">
+            <a:spLocks noGrp="1"/>
+          </p:cNvSpPr>
+          <p:nvPr>
+            <p:ph type="sldNum" idx="12"/>
           </p:nvPr>
         </p:nvSpPr>
         <p:spPr>
@@ -3404,7 +3660,7 @@
           </a:prstGeom>
         </p:spPr>
         <p:txBody>
-          <a:bodyPr anchorCtr="0" anchor="ctr" bIns="91425" lIns="91425" rIns="91425" tIns="91425">
+          <a:bodyPr lIns="91425" tIns="91425" rIns="91425" bIns="91425" anchor="ctr" anchorCtr="0">
             <a:noAutofit/>
           </a:bodyPr>
           <a:lstStyle/>
@@ -3419,6 +3675,7 @@
               <a:rPr lang="en"/>
               <a:t>‹#›</a:t>
             </a:fld>
+            <a:endParaRPr lang="en"/>
           </a:p>
         </p:txBody>
       </p:sp>
@@ -3431,11 +3688,11 @@
 </file>
 
 <file path=ppt/slideLayouts/slideLayout9.xml><?xml version="1.0" encoding="utf-8"?>
-<p:sldLayout xmlns:a="http://schemas.openxmlformats.org/drawingml/2006/main" xmlns:r="http://schemas.openxmlformats.org/officeDocument/2006/relationships" xmlns:mc="http://schemas.openxmlformats.org/markup-compatibility/2006" xmlns:mv="urn:schemas-microsoft-com:mac:vml" xmlns:p="http://schemas.openxmlformats.org/presentationml/2006/main" xmlns:c="http://schemas.openxmlformats.org/drawingml/2006/chart" xmlns:dgm="http://schemas.openxmlformats.org/drawingml/2006/diagram" xmlns:o="urn:schemas-microsoft-com:office:office" xmlns:v="urn:schemas-microsoft-com:vml" xmlns:pvml="urn:schemas-microsoft-com:office:powerpoint" xmlns:com="http://schemas.openxmlformats.org/drawingml/2006/compatibility" xmlns:p14="http://schemas.microsoft.com/office/powerpoint/2010/main">
+<p:sldLayout xmlns:a="http://schemas.openxmlformats.org/drawingml/2006/main" xmlns:r="http://schemas.openxmlformats.org/officeDocument/2006/relationships" xmlns:p="http://schemas.openxmlformats.org/presentationml/2006/main">
   <p:cSld name="Caption">
     <p:spTree>
       <p:nvGrpSpPr>
-        <p:cNvPr id="41" name="Shape 41"/>
+        <p:cNvPr id="1" name="Shape 41"/>
         <p:cNvGrpSpPr/>
         <p:nvPr/>
       </p:nvGrpSpPr>
@@ -3450,9 +3707,11 @@
       <p:sp>
         <p:nvSpPr>
           <p:cNvPr id="42" name="Shape 42"/>
-          <p:cNvSpPr txBox="1"/>
-          <p:nvPr>
-            <p:ph idx="1" type="body"/>
+          <p:cNvSpPr txBox="1">
+            <a:spLocks noGrp="1"/>
+          </p:cNvSpPr>
+          <p:nvPr>
+            <p:ph type="body" idx="1"/>
           </p:nvPr>
         </p:nvSpPr>
         <p:spPr>
@@ -3465,7 +3724,7 @@
           </a:prstGeom>
         </p:spPr>
         <p:txBody>
-          <a:bodyPr anchorCtr="0" anchor="ctr" bIns="91425" lIns="91425" rIns="91425" tIns="91425"/>
+          <a:bodyPr lIns="91425" tIns="91425" rIns="91425" bIns="91425" anchor="ctr" anchorCtr="0"/>
           <a:lstStyle>
             <a:lvl1pPr lvl="0">
               <a:lnSpc>
@@ -3481,15 +3740,19 @@
               <a:defRPr/>
             </a:lvl1pPr>
           </a:lstStyle>
-          <a:p/>
+          <a:p>
+            <a:endParaRPr/>
+          </a:p>
         </p:txBody>
       </p:sp>
       <p:sp>
         <p:nvSpPr>
           <p:cNvPr id="43" name="Shape 43"/>
-          <p:cNvSpPr txBox="1"/>
-          <p:nvPr>
-            <p:ph idx="12" type="sldNum"/>
+          <p:cNvSpPr txBox="1">
+            <a:spLocks noGrp="1"/>
+          </p:cNvSpPr>
+          <p:nvPr>
+            <p:ph type="sldNum" idx="12"/>
           </p:nvPr>
         </p:nvSpPr>
         <p:spPr>
@@ -3502,7 +3765,7 @@
           </a:prstGeom>
         </p:spPr>
         <p:txBody>
-          <a:bodyPr anchorCtr="0" anchor="ctr" bIns="91425" lIns="91425" rIns="91425" tIns="91425">
+          <a:bodyPr lIns="91425" tIns="91425" rIns="91425" bIns="91425" anchor="ctr" anchorCtr="0">
             <a:noAutofit/>
           </a:bodyPr>
           <a:lstStyle/>
@@ -3517,6 +3780,7 @@
               <a:rPr lang="en"/>
               <a:t>‹#›</a:t>
             </a:fld>
+            <a:endParaRPr lang="en"/>
           </a:p>
         </p:txBody>
       </p:sp>
@@ -3529,18 +3793,19 @@
 </file>
 
 <file path=ppt/slideMasters/slideMaster1.xml><?xml version="1.0" encoding="utf-8"?>
-<p:sldMaster xmlns:a="http://schemas.openxmlformats.org/drawingml/2006/main" xmlns:r="http://schemas.openxmlformats.org/officeDocument/2006/relationships" xmlns:mc="http://schemas.openxmlformats.org/markup-compatibility/2006" xmlns:mv="urn:schemas-microsoft-com:mac:vml" xmlns:p="http://schemas.openxmlformats.org/presentationml/2006/main" xmlns:c="http://schemas.openxmlformats.org/drawingml/2006/chart" xmlns:dgm="http://schemas.openxmlformats.org/drawingml/2006/diagram" xmlns:o="urn:schemas-microsoft-com:office:office" xmlns:v="urn:schemas-microsoft-com:vml" xmlns:pvml="urn:schemas-microsoft-com:office:powerpoint" xmlns:com="http://schemas.openxmlformats.org/drawingml/2006/compatibility" xmlns:p14="http://schemas.microsoft.com/office/powerpoint/2010/main">
+<p:sldMaster xmlns:a="http://schemas.openxmlformats.org/drawingml/2006/main" xmlns:r="http://schemas.openxmlformats.org/officeDocument/2006/relationships" xmlns:p="http://schemas.openxmlformats.org/presentationml/2006/main">
   <p:cSld>
     <p:bg>
       <p:bgPr>
         <a:solidFill>
           <a:schemeClr val="lt1"/>
         </a:solidFill>
+        <a:effectLst/>
       </p:bgPr>
     </p:bg>
     <p:spTree>
       <p:nvGrpSpPr>
-        <p:cNvPr id="5" name="Shape 5"/>
+        <p:cNvPr id="1" name="Shape 5"/>
         <p:cNvGrpSpPr/>
         <p:nvPr/>
       </p:nvGrpSpPr>
@@ -3555,7 +3820,9 @@
       <p:sp>
         <p:nvSpPr>
           <p:cNvPr id="6" name="Shape 6"/>
-          <p:cNvSpPr txBox="1"/>
+          <p:cNvSpPr txBox="1">
+            <a:spLocks noGrp="1"/>
+          </p:cNvSpPr>
           <p:nvPr>
             <p:ph type="title"/>
           </p:nvPr>
@@ -3574,7 +3841,7 @@
           </a:ln>
         </p:spPr>
         <p:txBody>
-          <a:bodyPr anchorCtr="0" anchor="t" bIns="91425" lIns="91425" rIns="91425" tIns="91425"/>
+          <a:bodyPr lIns="91425" tIns="91425" rIns="91425" bIns="91425" anchor="t" anchorCtr="0"/>
           <a:lstStyle>
             <a:lvl1pPr lvl="0">
               <a:spcBef>
@@ -3712,15 +3979,19 @@
               </a:defRPr>
             </a:lvl9pPr>
           </a:lstStyle>
-          <a:p/>
+          <a:p>
+            <a:endParaRPr/>
+          </a:p>
         </p:txBody>
       </p:sp>
       <p:sp>
         <p:nvSpPr>
           <p:cNvPr id="7" name="Shape 7"/>
-          <p:cNvSpPr txBox="1"/>
-          <p:nvPr>
-            <p:ph idx="1" type="body"/>
+          <p:cNvSpPr txBox="1">
+            <a:spLocks noGrp="1"/>
+          </p:cNvSpPr>
+          <p:nvPr>
+            <p:ph type="body" idx="1"/>
           </p:nvPr>
         </p:nvSpPr>
         <p:spPr>
@@ -3737,7 +4008,7 @@
           </a:ln>
         </p:spPr>
         <p:txBody>
-          <a:bodyPr anchorCtr="0" anchor="t" bIns="91425" lIns="91425" rIns="91425" tIns="91425"/>
+          <a:bodyPr lIns="91425" tIns="91425" rIns="91425" bIns="91425" anchor="t" anchorCtr="0"/>
           <a:lstStyle>
             <a:lvl1pPr lvl="0">
               <a:lnSpc>
@@ -3912,15 +4183,19 @@
               </a:defRPr>
             </a:lvl9pPr>
           </a:lstStyle>
-          <a:p/>
+          <a:p>
+            <a:endParaRPr/>
+          </a:p>
         </p:txBody>
       </p:sp>
       <p:sp>
         <p:nvSpPr>
           <p:cNvPr id="8" name="Shape 8"/>
-          <p:cNvSpPr txBox="1"/>
-          <p:nvPr>
-            <p:ph idx="12" type="sldNum"/>
+          <p:cNvSpPr txBox="1">
+            <a:spLocks noGrp="1"/>
+          </p:cNvSpPr>
+          <p:nvPr>
+            <p:ph type="sldNum" idx="12"/>
           </p:nvPr>
         </p:nvSpPr>
         <p:spPr>
@@ -3937,7 +4212,7 @@
           </a:ln>
         </p:spPr>
         <p:txBody>
-          <a:bodyPr anchorCtr="0" anchor="ctr" bIns="91425" lIns="91425" rIns="91425" tIns="91425">
+          <a:bodyPr lIns="91425" tIns="91425" rIns="91425" bIns="91425" anchor="ctr" anchorCtr="0">
             <a:noAutofit/>
           </a:bodyPr>
           <a:lstStyle/>
@@ -3956,12 +4231,17 @@
               </a:rPr>
               <a:t>‹#›</a:t>
             </a:fld>
+            <a:endParaRPr lang="en" sz="1000">
+              <a:solidFill>
+                <a:schemeClr val="dk2"/>
+              </a:solidFill>
+            </a:endParaRPr>
           </a:p>
         </p:txBody>
       </p:sp>
     </p:spTree>
   </p:cSld>
-  <p:clrMap accent1="accent1" accent2="accent2" accent3="accent3" accent4="accent4" accent5="accent5" accent6="accent6" bg1="lt1" bg2="dk2" tx1="dk1" tx2="lt2" folHlink="folHlink" hlink="hlink"/>
+  <p:clrMap bg1="lt1" tx1="dk1" bg2="dk2" tx2="lt2" accent1="accent1" accent2="accent2" accent3="accent3" accent4="accent4" accent5="accent5" accent6="accent6" hlink="hlink" folHlink="folHlink"/>
   <p:sldLayoutIdLst>
     <p:sldLayoutId id="2147483648" r:id="rId1"/>
     <p:sldLayoutId id="2147483649" r:id="rId2"/>
@@ -3975,10 +4255,10 @@
     <p:sldLayoutId id="2147483657" r:id="rId10"/>
     <p:sldLayoutId id="2147483658" r:id="rId11"/>
   </p:sldLayoutIdLst>
-  <p:hf dt="0" ftr="0" hdr="0" sldNum="0"/>
+  <p:hf sldNum="0" hdr="0" ftr="0" dt="0"/>
   <p:txStyles>
     <p:titleStyle>
-      <a:defPPr lvl="0" marR="0" rtl="0" algn="l">
+      <a:defPPr marR="0" lvl="0" algn="l" rtl="0">
         <a:lnSpc>
           <a:spcPct val="100000"/>
         </a:lnSpc>
@@ -3989,7 +4269,7 @@
           <a:spcPts val="0"/>
         </a:spcAft>
       </a:defPPr>
-      <a:lvl1pPr lvl="0" marR="0" rtl="0" algn="l">
+      <a:lvl1pPr marR="0" lvl="0" algn="l" rtl="0">
         <a:lnSpc>
           <a:spcPct val="100000"/>
         </a:lnSpc>
@@ -4000,7 +4280,7 @@
           <a:spcPts val="0"/>
         </a:spcAft>
         <a:buNone/>
-        <a:defRPr b="0" i="0" sz="1400" u="none" cap="none" strike="noStrike">
+        <a:defRPr sz="1400" b="0" i="0" u="none" strike="noStrike" cap="none">
           <a:solidFill>
             <a:srgbClr val="000000"/>
           </a:solidFill>
@@ -4012,7 +4292,7 @@
       </a:lvl1pPr>
     </p:titleStyle>
     <p:bodyStyle>
-      <a:defPPr lvl="0" marR="0" rtl="0" algn="l">
+      <a:defPPr marR="0" lvl="0" algn="l" rtl="0">
         <a:lnSpc>
           <a:spcPct val="100000"/>
         </a:lnSpc>
@@ -4023,7 +4303,7 @@
           <a:spcPts val="0"/>
         </a:spcAft>
       </a:defPPr>
-      <a:lvl1pPr lvl="0" marR="0" rtl="0" algn="l">
+      <a:lvl1pPr marR="0" lvl="0" algn="l" rtl="0">
         <a:lnSpc>
           <a:spcPct val="100000"/>
         </a:lnSpc>
@@ -4034,7 +4314,7 @@
           <a:spcPts val="0"/>
         </a:spcAft>
         <a:buNone/>
-        <a:defRPr b="0" i="0" sz="1400" u="none" cap="none" strike="noStrike">
+        <a:defRPr sz="1400" b="0" i="0" u="none" strike="noStrike" cap="none">
           <a:solidFill>
             <a:srgbClr val="000000"/>
           </a:solidFill>
@@ -4044,7 +4324,7 @@
           <a:sym typeface="Arial"/>
         </a:defRPr>
       </a:lvl1pPr>
-      <a:lvl2pPr lvl="1" marR="0" rtl="0" algn="l">
+      <a:lvl2pPr marR="0" lvl="1" algn="l" rtl="0">
         <a:lnSpc>
           <a:spcPct val="100000"/>
         </a:lnSpc>
@@ -4055,7 +4335,7 @@
           <a:spcPts val="0"/>
         </a:spcAft>
         <a:buNone/>
-        <a:defRPr b="0" i="0" sz="1400" u="none" cap="none" strike="noStrike">
+        <a:defRPr sz="1400" b="0" i="0" u="none" strike="noStrike" cap="none">
           <a:solidFill>
             <a:srgbClr val="000000"/>
           </a:solidFill>
@@ -4065,7 +4345,7 @@
           <a:sym typeface="Arial"/>
         </a:defRPr>
       </a:lvl2pPr>
-      <a:lvl3pPr lvl="2" marR="0" rtl="0" algn="l">
+      <a:lvl3pPr marR="0" lvl="2" algn="l" rtl="0">
         <a:lnSpc>
           <a:spcPct val="100000"/>
         </a:lnSpc>
@@ -4076,7 +4356,7 @@
           <a:spcPts val="0"/>
         </a:spcAft>
         <a:buNone/>
-        <a:defRPr b="0" i="0" sz="1400" u="none" cap="none" strike="noStrike">
+        <a:defRPr sz="1400" b="0" i="0" u="none" strike="noStrike" cap="none">
           <a:solidFill>
             <a:srgbClr val="000000"/>
           </a:solidFill>
@@ -4086,7 +4366,7 @@
           <a:sym typeface="Arial"/>
         </a:defRPr>
       </a:lvl3pPr>
-      <a:lvl4pPr lvl="3" marR="0" rtl="0" algn="l">
+      <a:lvl4pPr marR="0" lvl="3" algn="l" rtl="0">
         <a:lnSpc>
           <a:spcPct val="100000"/>
         </a:lnSpc>
@@ -4097,7 +4377,7 @@
           <a:spcPts val="0"/>
         </a:spcAft>
         <a:buNone/>
-        <a:defRPr b="0" i="0" sz="1400" u="none" cap="none" strike="noStrike">
+        <a:defRPr sz="1400" b="0" i="0" u="none" strike="noStrike" cap="none">
           <a:solidFill>
             <a:srgbClr val="000000"/>
           </a:solidFill>
@@ -4107,7 +4387,7 @@
           <a:sym typeface="Arial"/>
         </a:defRPr>
       </a:lvl4pPr>
-      <a:lvl5pPr lvl="4" marR="0" rtl="0" algn="l">
+      <a:lvl5pPr marR="0" lvl="4" algn="l" rtl="0">
         <a:lnSpc>
           <a:spcPct val="100000"/>
         </a:lnSpc>
@@ -4118,7 +4398,7 @@
           <a:spcPts val="0"/>
         </a:spcAft>
         <a:buNone/>
-        <a:defRPr b="0" i="0" sz="1400" u="none" cap="none" strike="noStrike">
+        <a:defRPr sz="1400" b="0" i="0" u="none" strike="noStrike" cap="none">
           <a:solidFill>
             <a:srgbClr val="000000"/>
           </a:solidFill>
@@ -4128,7 +4408,7 @@
           <a:sym typeface="Arial"/>
         </a:defRPr>
       </a:lvl5pPr>
-      <a:lvl6pPr lvl="5" marR="0" rtl="0" algn="l">
+      <a:lvl6pPr marR="0" lvl="5" algn="l" rtl="0">
         <a:lnSpc>
           <a:spcPct val="100000"/>
         </a:lnSpc>
@@ -4139,7 +4419,7 @@
           <a:spcPts val="0"/>
         </a:spcAft>
         <a:buNone/>
-        <a:defRPr b="0" i="0" sz="1400" u="none" cap="none" strike="noStrike">
+        <a:defRPr sz="1400" b="0" i="0" u="none" strike="noStrike" cap="none">
           <a:solidFill>
             <a:srgbClr val="000000"/>
           </a:solidFill>
@@ -4149,7 +4429,7 @@
           <a:sym typeface="Arial"/>
         </a:defRPr>
       </a:lvl6pPr>
-      <a:lvl7pPr lvl="6" marR="0" rtl="0" algn="l">
+      <a:lvl7pPr marR="0" lvl="6" algn="l" rtl="0">
         <a:lnSpc>
           <a:spcPct val="100000"/>
         </a:lnSpc>
@@ -4160,7 +4440,7 @@
           <a:spcPts val="0"/>
         </a:spcAft>
         <a:buNone/>
-        <a:defRPr b="0" i="0" sz="1400" u="none" cap="none" strike="noStrike">
+        <a:defRPr sz="1400" b="0" i="0" u="none" strike="noStrike" cap="none">
           <a:solidFill>
             <a:srgbClr val="000000"/>
           </a:solidFill>
@@ -4170,7 +4450,7 @@
           <a:sym typeface="Arial"/>
         </a:defRPr>
       </a:lvl7pPr>
-      <a:lvl8pPr lvl="7" marR="0" rtl="0" algn="l">
+      <a:lvl8pPr marR="0" lvl="7" algn="l" rtl="0">
         <a:lnSpc>
           <a:spcPct val="100000"/>
         </a:lnSpc>
@@ -4181,7 +4461,7 @@
           <a:spcPts val="0"/>
         </a:spcAft>
         <a:buNone/>
-        <a:defRPr b="0" i="0" sz="1400" u="none" cap="none" strike="noStrike">
+        <a:defRPr sz="1400" b="0" i="0" u="none" strike="noStrike" cap="none">
           <a:solidFill>
             <a:srgbClr val="000000"/>
           </a:solidFill>
@@ -4191,7 +4471,7 @@
           <a:sym typeface="Arial"/>
         </a:defRPr>
       </a:lvl8pPr>
-      <a:lvl9pPr lvl="8" marR="0" rtl="0" algn="l">
+      <a:lvl9pPr marR="0" lvl="8" algn="l" rtl="0">
         <a:lnSpc>
           <a:spcPct val="100000"/>
         </a:lnSpc>
@@ -4202,7 +4482,7 @@
           <a:spcPts val="0"/>
         </a:spcAft>
         <a:buNone/>
-        <a:defRPr b="0" i="0" sz="1400" u="none" cap="none" strike="noStrike">
+        <a:defRPr sz="1400" b="0" i="0" u="none" strike="noStrike" cap="none">
           <a:solidFill>
             <a:srgbClr val="000000"/>
           </a:solidFill>
@@ -4214,7 +4494,7 @@
       </a:lvl9pPr>
     </p:bodyStyle>
     <p:otherStyle>
-      <a:defPPr lvl="0" marR="0" rtl="0" algn="l">
+      <a:defPPr marR="0" lvl="0" algn="l" rtl="0">
         <a:lnSpc>
           <a:spcPct val="100000"/>
         </a:lnSpc>
@@ -4225,7 +4505,7 @@
           <a:spcPts val="0"/>
         </a:spcAft>
       </a:defPPr>
-      <a:lvl1pPr lvl="0" marR="0" rtl="0" algn="l">
+      <a:lvl1pPr marR="0" lvl="0" algn="l" rtl="0">
         <a:lnSpc>
           <a:spcPct val="100000"/>
         </a:lnSpc>
@@ -4236,7 +4516,7 @@
           <a:spcPts val="0"/>
         </a:spcAft>
         <a:buNone/>
-        <a:defRPr b="0" i="0" sz="1400" u="none" cap="none" strike="noStrike">
+        <a:defRPr sz="1400" b="0" i="0" u="none" strike="noStrike" cap="none">
           <a:solidFill>
             <a:srgbClr val="000000"/>
           </a:solidFill>
@@ -4246,7 +4526,7 @@
           <a:sym typeface="Arial"/>
         </a:defRPr>
       </a:lvl1pPr>
-      <a:lvl2pPr lvl="1" marR="0" rtl="0" algn="l">
+      <a:lvl2pPr marR="0" lvl="1" algn="l" rtl="0">
         <a:lnSpc>
           <a:spcPct val="100000"/>
         </a:lnSpc>
@@ -4257,7 +4537,7 @@
           <a:spcPts val="0"/>
         </a:spcAft>
         <a:buNone/>
-        <a:defRPr b="0" i="0" sz="1400" u="none" cap="none" strike="noStrike">
+        <a:defRPr sz="1400" b="0" i="0" u="none" strike="noStrike" cap="none">
           <a:solidFill>
             <a:srgbClr val="000000"/>
           </a:solidFill>
@@ -4267,7 +4547,7 @@
           <a:sym typeface="Arial"/>
         </a:defRPr>
       </a:lvl2pPr>
-      <a:lvl3pPr lvl="2" marR="0" rtl="0" algn="l">
+      <a:lvl3pPr marR="0" lvl="2" algn="l" rtl="0">
         <a:lnSpc>
           <a:spcPct val="100000"/>
         </a:lnSpc>
@@ -4278,7 +4558,7 @@
           <a:spcPts val="0"/>
         </a:spcAft>
         <a:buNone/>
-        <a:defRPr b="0" i="0" sz="1400" u="none" cap="none" strike="noStrike">
+        <a:defRPr sz="1400" b="0" i="0" u="none" strike="noStrike" cap="none">
           <a:solidFill>
             <a:srgbClr val="000000"/>
           </a:solidFill>
@@ -4288,7 +4568,7 @@
           <a:sym typeface="Arial"/>
         </a:defRPr>
       </a:lvl3pPr>
-      <a:lvl4pPr lvl="3" marR="0" rtl="0" algn="l">
+      <a:lvl4pPr marR="0" lvl="3" algn="l" rtl="0">
         <a:lnSpc>
           <a:spcPct val="100000"/>
         </a:lnSpc>
@@ -4299,7 +4579,7 @@
           <a:spcPts val="0"/>
         </a:spcAft>
         <a:buNone/>
-        <a:defRPr b="0" i="0" sz="1400" u="none" cap="none" strike="noStrike">
+        <a:defRPr sz="1400" b="0" i="0" u="none" strike="noStrike" cap="none">
           <a:solidFill>
             <a:srgbClr val="000000"/>
           </a:solidFill>
@@ -4309,7 +4589,7 @@
           <a:sym typeface="Arial"/>
         </a:defRPr>
       </a:lvl4pPr>
-      <a:lvl5pPr lvl="4" marR="0" rtl="0" algn="l">
+      <a:lvl5pPr marR="0" lvl="4" algn="l" rtl="0">
         <a:lnSpc>
           <a:spcPct val="100000"/>
         </a:lnSpc>
@@ -4320,7 +4600,7 @@
           <a:spcPts val="0"/>
         </a:spcAft>
         <a:buNone/>
-        <a:defRPr b="0" i="0" sz="1400" u="none" cap="none" strike="noStrike">
+        <a:defRPr sz="1400" b="0" i="0" u="none" strike="noStrike" cap="none">
           <a:solidFill>
             <a:srgbClr val="000000"/>
           </a:solidFill>
@@ -4330,7 +4610,7 @@
           <a:sym typeface="Arial"/>
         </a:defRPr>
       </a:lvl5pPr>
-      <a:lvl6pPr lvl="5" marR="0" rtl="0" algn="l">
+      <a:lvl6pPr marR="0" lvl="5" algn="l" rtl="0">
         <a:lnSpc>
           <a:spcPct val="100000"/>
         </a:lnSpc>
@@ -4341,7 +4621,7 @@
           <a:spcPts val="0"/>
         </a:spcAft>
         <a:buNone/>
-        <a:defRPr b="0" i="0" sz="1400" u="none" cap="none" strike="noStrike">
+        <a:defRPr sz="1400" b="0" i="0" u="none" strike="noStrike" cap="none">
           <a:solidFill>
             <a:srgbClr val="000000"/>
           </a:solidFill>
@@ -4351,7 +4631,7 @@
           <a:sym typeface="Arial"/>
         </a:defRPr>
       </a:lvl6pPr>
-      <a:lvl7pPr lvl="6" marR="0" rtl="0" algn="l">
+      <a:lvl7pPr marR="0" lvl="6" algn="l" rtl="0">
         <a:lnSpc>
           <a:spcPct val="100000"/>
         </a:lnSpc>
@@ -4362,7 +4642,7 @@
           <a:spcPts val="0"/>
         </a:spcAft>
         <a:buNone/>
-        <a:defRPr b="0" i="0" sz="1400" u="none" cap="none" strike="noStrike">
+        <a:defRPr sz="1400" b="0" i="0" u="none" strike="noStrike" cap="none">
           <a:solidFill>
             <a:srgbClr val="000000"/>
           </a:solidFill>
@@ -4372,7 +4652,7 @@
           <a:sym typeface="Arial"/>
         </a:defRPr>
       </a:lvl7pPr>
-      <a:lvl8pPr lvl="7" marR="0" rtl="0" algn="l">
+      <a:lvl8pPr marR="0" lvl="7" algn="l" rtl="0">
         <a:lnSpc>
           <a:spcPct val="100000"/>
         </a:lnSpc>
@@ -4383,7 +4663,7 @@
           <a:spcPts val="0"/>
         </a:spcAft>
         <a:buNone/>
-        <a:defRPr b="0" i="0" sz="1400" u="none" cap="none" strike="noStrike">
+        <a:defRPr sz="1400" b="0" i="0" u="none" strike="noStrike" cap="none">
           <a:solidFill>
             <a:srgbClr val="000000"/>
           </a:solidFill>
@@ -4393,7 +4673,7 @@
           <a:sym typeface="Arial"/>
         </a:defRPr>
       </a:lvl8pPr>
-      <a:lvl9pPr lvl="8" marR="0" rtl="0" algn="l">
+      <a:lvl9pPr marR="0" lvl="8" algn="l" rtl="0">
         <a:lnSpc>
           <a:spcPct val="100000"/>
         </a:lnSpc>
@@ -4404,7 +4684,7 @@
           <a:spcPts val="0"/>
         </a:spcAft>
         <a:buNone/>
-        <a:defRPr b="0" i="0" sz="1400" u="none" cap="none" strike="noStrike">
+        <a:defRPr sz="1400" b="0" i="0" u="none" strike="noStrike" cap="none">
           <a:solidFill>
             <a:srgbClr val="000000"/>
           </a:solidFill>
@@ -4420,11 +4700,11 @@
 </file>
 
 <file path=ppt/slides/slide1.xml><?xml version="1.0" encoding="utf-8"?>
-<p:sld xmlns:a="http://schemas.openxmlformats.org/drawingml/2006/main" xmlns:r="http://schemas.openxmlformats.org/officeDocument/2006/relationships" xmlns:mc="http://schemas.openxmlformats.org/markup-compatibility/2006" xmlns:mv="urn:schemas-microsoft-com:mac:vml" xmlns:p="http://schemas.openxmlformats.org/presentationml/2006/main" xmlns:c="http://schemas.openxmlformats.org/drawingml/2006/chart" xmlns:dgm="http://schemas.openxmlformats.org/drawingml/2006/diagram" xmlns:o="urn:schemas-microsoft-com:office:office" xmlns:v="urn:schemas-microsoft-com:vml" xmlns:pvml="urn:schemas-microsoft-com:office:powerpoint" xmlns:com="http://schemas.openxmlformats.org/drawingml/2006/compatibility" xmlns:p14="http://schemas.microsoft.com/office/powerpoint/2010/main">
+<p:sld xmlns:a="http://schemas.openxmlformats.org/drawingml/2006/main" xmlns:r="http://schemas.openxmlformats.org/officeDocument/2006/relationships" xmlns:p="http://schemas.openxmlformats.org/presentationml/2006/main">
   <p:cSld>
     <p:spTree>
       <p:nvGrpSpPr>
-        <p:cNvPr id="53" name="Shape 53"/>
+        <p:cNvPr id="1" name="Shape 53"/>
         <p:cNvGrpSpPr/>
         <p:nvPr/>
       </p:nvGrpSpPr>
@@ -4439,7 +4719,9 @@
       <p:sp>
         <p:nvSpPr>
           <p:cNvPr id="54" name="Shape 54"/>
-          <p:cNvSpPr txBox="1"/>
+          <p:cNvSpPr txBox="1">
+            <a:spLocks noGrp="1"/>
+          </p:cNvSpPr>
           <p:nvPr>
             <p:ph type="ctrTitle"/>
           </p:nvPr>
@@ -4454,7 +4736,7 @@
           </a:prstGeom>
         </p:spPr>
         <p:txBody>
-          <a:bodyPr anchorCtr="0" anchor="b" bIns="91425" lIns="91425" rIns="91425" tIns="91425">
+          <a:bodyPr lIns="91425" tIns="91425" rIns="91425" bIns="91425" anchor="b" anchorCtr="0">
             <a:noAutofit/>
           </a:bodyPr>
           <a:lstStyle/>
@@ -4475,9 +4757,11 @@
       <p:sp>
         <p:nvSpPr>
           <p:cNvPr id="55" name="Shape 55"/>
-          <p:cNvSpPr txBox="1"/>
-          <p:nvPr>
-            <p:ph idx="1" type="subTitle"/>
+          <p:cNvSpPr txBox="1">
+            <a:spLocks noGrp="1"/>
+          </p:cNvSpPr>
+          <p:nvPr>
+            <p:ph type="subTitle" idx="1"/>
           </p:nvPr>
         </p:nvSpPr>
         <p:spPr>
@@ -4490,7 +4774,7 @@
           </a:prstGeom>
         </p:spPr>
         <p:txBody>
-          <a:bodyPr anchorCtr="0" anchor="t" bIns="91425" lIns="91425" rIns="91425" tIns="91425">
+          <a:bodyPr lIns="91425" tIns="91425" rIns="91425" bIns="91425" anchor="t" anchorCtr="0">
             <a:noAutofit/>
           </a:bodyPr>
           <a:lstStyle/>
@@ -4553,11 +4837,11 @@
 </file>
 
 <file path=ppt/slides/slide2.xml><?xml version="1.0" encoding="utf-8"?>
-<p:sld xmlns:a="http://schemas.openxmlformats.org/drawingml/2006/main" xmlns:r="http://schemas.openxmlformats.org/officeDocument/2006/relationships" xmlns:mc="http://schemas.openxmlformats.org/markup-compatibility/2006" xmlns:mv="urn:schemas-microsoft-com:mac:vml" xmlns:p="http://schemas.openxmlformats.org/presentationml/2006/main" xmlns:c="http://schemas.openxmlformats.org/drawingml/2006/chart" xmlns:dgm="http://schemas.openxmlformats.org/drawingml/2006/diagram" xmlns:o="urn:schemas-microsoft-com:office:office" xmlns:v="urn:schemas-microsoft-com:vml" xmlns:pvml="urn:schemas-microsoft-com:office:powerpoint" xmlns:com="http://schemas.openxmlformats.org/drawingml/2006/compatibility" xmlns:p14="http://schemas.microsoft.com/office/powerpoint/2010/main">
+<p:sld xmlns:a="http://schemas.openxmlformats.org/drawingml/2006/main" xmlns:r="http://schemas.openxmlformats.org/officeDocument/2006/relationships" xmlns:p="http://schemas.openxmlformats.org/presentationml/2006/main">
   <p:cSld>
     <p:spTree>
       <p:nvGrpSpPr>
-        <p:cNvPr id="59" name="Shape 59"/>
+        <p:cNvPr id="1" name="Shape 59"/>
         <p:cNvGrpSpPr/>
         <p:nvPr/>
       </p:nvGrpSpPr>
@@ -4572,7 +4856,9 @@
       <p:sp>
         <p:nvSpPr>
           <p:cNvPr id="60" name="Shape 60"/>
-          <p:cNvSpPr txBox="1"/>
+          <p:cNvSpPr txBox="1">
+            <a:spLocks noGrp="1"/>
+          </p:cNvSpPr>
           <p:nvPr>
             <p:ph type="title"/>
           </p:nvPr>
@@ -4587,7 +4873,7 @@
           </a:prstGeom>
         </p:spPr>
         <p:txBody>
-          <a:bodyPr anchorCtr="0" anchor="t" bIns="91425" lIns="91425" rIns="91425" tIns="91425">
+          <a:bodyPr lIns="91425" tIns="91425" rIns="91425" bIns="91425" anchor="t" anchorCtr="0">
             <a:noAutofit/>
           </a:bodyPr>
           <a:lstStyle/>
@@ -4608,9 +4894,11 @@
       <p:sp>
         <p:nvSpPr>
           <p:cNvPr id="61" name="Shape 61"/>
-          <p:cNvSpPr txBox="1"/>
-          <p:nvPr>
-            <p:ph idx="1" type="body"/>
+          <p:cNvSpPr txBox="1">
+            <a:spLocks noGrp="1"/>
+          </p:cNvSpPr>
+          <p:nvPr>
+            <p:ph type="body" idx="1"/>
           </p:nvPr>
         </p:nvSpPr>
         <p:spPr>
@@ -4623,12 +4911,12 @@
           </a:prstGeom>
         </p:spPr>
         <p:txBody>
-          <a:bodyPr anchorCtr="0" anchor="t" bIns="91425" lIns="91425" rIns="91425" tIns="91425">
+          <a:bodyPr lIns="91425" tIns="91425" rIns="91425" bIns="91425" anchor="t" anchorCtr="0">
             <a:noAutofit/>
           </a:bodyPr>
           <a:lstStyle/>
           <a:p>
-            <a:pPr indent="-228600" lvl="0" marL="457200" rtl="0">
+            <a:pPr marL="457200" lvl="0" indent="-228600" rtl="0">
               <a:spcBef>
                 <a:spcPts val="0"/>
               </a:spcBef>
@@ -4640,7 +4928,7 @@
             </a:r>
           </a:p>
           <a:p>
-            <a:pPr indent="-228600" lvl="0" marL="457200" rtl="0">
+            <a:pPr marL="457200" lvl="0" indent="-228600" rtl="0">
               <a:spcBef>
                 <a:spcPts val="0"/>
               </a:spcBef>
@@ -4662,11 +4950,11 @@
 </file>
 
 <file path=ppt/slides/slide3.xml><?xml version="1.0" encoding="utf-8"?>
-<p:sld xmlns:a="http://schemas.openxmlformats.org/drawingml/2006/main" xmlns:r="http://schemas.openxmlformats.org/officeDocument/2006/relationships" xmlns:mc="http://schemas.openxmlformats.org/markup-compatibility/2006" xmlns:mv="urn:schemas-microsoft-com:mac:vml" xmlns:p="http://schemas.openxmlformats.org/presentationml/2006/main" xmlns:c="http://schemas.openxmlformats.org/drawingml/2006/chart" xmlns:dgm="http://schemas.openxmlformats.org/drawingml/2006/diagram" xmlns:o="urn:schemas-microsoft-com:office:office" xmlns:v="urn:schemas-microsoft-com:vml" xmlns:pvml="urn:schemas-microsoft-com:office:powerpoint" xmlns:com="http://schemas.openxmlformats.org/drawingml/2006/compatibility" xmlns:p14="http://schemas.microsoft.com/office/powerpoint/2010/main">
+<p:sld xmlns:a="http://schemas.openxmlformats.org/drawingml/2006/main" xmlns:r="http://schemas.openxmlformats.org/officeDocument/2006/relationships" xmlns:p="http://schemas.openxmlformats.org/presentationml/2006/main">
   <p:cSld>
     <p:spTree>
       <p:nvGrpSpPr>
-        <p:cNvPr id="65" name="Shape 65"/>
+        <p:cNvPr id="1" name="Shape 65"/>
         <p:cNvGrpSpPr/>
         <p:nvPr/>
       </p:nvGrpSpPr>
@@ -4681,7 +4969,9 @@
       <p:sp>
         <p:nvSpPr>
           <p:cNvPr id="66" name="Shape 66"/>
-          <p:cNvSpPr txBox="1"/>
+          <p:cNvSpPr txBox="1">
+            <a:spLocks noGrp="1"/>
+          </p:cNvSpPr>
           <p:nvPr>
             <p:ph type="title"/>
           </p:nvPr>
@@ -4696,7 +4986,7 @@
           </a:prstGeom>
         </p:spPr>
         <p:txBody>
-          <a:bodyPr anchorCtr="0" anchor="t" bIns="91425" lIns="91425" rIns="91425" tIns="91425">
+          <a:bodyPr lIns="91425" tIns="91425" rIns="91425" bIns="91425" anchor="t" anchorCtr="0">
             <a:noAutofit/>
           </a:bodyPr>
           <a:lstStyle/>
@@ -4716,37 +5006,85 @@
       </p:sp>
       <p:sp>
         <p:nvSpPr>
-          <p:cNvPr id="67" name="Shape 67"/>
-          <p:cNvSpPr txBox="1"/>
-          <p:nvPr>
-            <p:ph idx="1" type="body"/>
-          </p:nvPr>
-        </p:nvSpPr>
-        <p:spPr>
-          <a:xfrm>
-            <a:off x="311700" y="1152475"/>
-            <a:ext cx="8520600" cy="3416400"/>
-          </a:xfrm>
-          <a:prstGeom prst="rect">
-            <a:avLst/>
-          </a:prstGeom>
-        </p:spPr>
+          <p:cNvPr id="2" name="Text Placeholder 1"/>
+          <p:cNvSpPr>
+            <a:spLocks noGrp="1"/>
+          </p:cNvSpPr>
+          <p:nvPr>
+            <p:ph type="body" idx="1"/>
+          </p:nvPr>
+        </p:nvSpPr>
+        <p:spPr/>
         <p:txBody>
-          <a:bodyPr anchorCtr="0" anchor="t" bIns="91425" lIns="91425" rIns="91425" tIns="91425">
-            <a:noAutofit/>
-          </a:bodyPr>
+          <a:bodyPr/>
           <a:lstStyle/>
           <a:p>
-            <a:pPr lvl="0">
-              <a:spcBef>
-                <a:spcPts val="0"/>
-              </a:spcBef>
-              <a:buNone/>
+            <a:pPr marL="285750" lvl="0" indent="-285750">
+              <a:buFont typeface="Arial" panose="020B0604020202020204" pitchFamily="34" charset="0"/>
+              <a:buChar char="•"/>
             </a:pPr>
             <a:r>
-              <a:t/>
+              <a:rPr lang="en-US" dirty="0"/>
+              <a:t>Rate/Review </a:t>
             </a:r>
-            <a:endParaRPr/>
+            <a:r>
+              <a:rPr lang="en-US" dirty="0" smtClean="0"/>
+              <a:t>Movie</a:t>
+            </a:r>
+            <a:endParaRPr lang="en-US" dirty="0"/>
+          </a:p>
+          <a:p>
+            <a:pPr marL="285750" lvl="0" indent="-285750">
+              <a:buFont typeface="Arial" panose="020B0604020202020204" pitchFamily="34" charset="0"/>
+              <a:buChar char="•"/>
+            </a:pPr>
+            <a:r>
+              <a:rPr lang="en-US" dirty="0"/>
+              <a:t>Request to Add a New Movie</a:t>
+            </a:r>
+          </a:p>
+          <a:p>
+            <a:pPr marL="285750" lvl="0" indent="-285750">
+              <a:buFont typeface="Arial" panose="020B0604020202020204" pitchFamily="34" charset="0"/>
+              <a:buChar char="•"/>
+            </a:pPr>
+            <a:r>
+              <a:rPr lang="en-US" dirty="0"/>
+              <a:t>Add a New Movie</a:t>
+            </a:r>
+          </a:p>
+          <a:p>
+            <a:pPr marL="285750" lvl="0" indent="-285750">
+              <a:buFont typeface="Arial" panose="020B0604020202020204" pitchFamily="34" charset="0"/>
+              <a:buChar char="•"/>
+            </a:pPr>
+            <a:r>
+              <a:rPr lang="en-US" dirty="0"/>
+              <a:t>Delete a </a:t>
+            </a:r>
+            <a:r>
+              <a:rPr lang="en-US" dirty="0" smtClean="0"/>
+              <a:t>Review by the User</a:t>
+            </a:r>
+            <a:endParaRPr lang="en-US" dirty="0"/>
+          </a:p>
+          <a:p>
+            <a:pPr marL="285750" lvl="0" indent="-285750">
+              <a:buFont typeface="Arial" panose="020B0604020202020204" pitchFamily="34" charset="0"/>
+              <a:buChar char="•"/>
+            </a:pPr>
+            <a:r>
+              <a:rPr lang="en-US" dirty="0"/>
+              <a:t>Flag a </a:t>
+            </a:r>
+            <a:r>
+              <a:rPr lang="en-US" dirty="0" smtClean="0"/>
+              <a:t>Review</a:t>
+            </a:r>
+            <a:endParaRPr lang="en-US" dirty="0"/>
+          </a:p>
+          <a:p>
+            <a:endParaRPr lang="en-US" dirty="0"/>
           </a:p>
         </p:txBody>
       </p:sp>
@@ -4759,11 +5097,11 @@
 </file>
 
 <file path=ppt/slides/slide4.xml><?xml version="1.0" encoding="utf-8"?>
-<p:sld xmlns:a="http://schemas.openxmlformats.org/drawingml/2006/main" xmlns:r="http://schemas.openxmlformats.org/officeDocument/2006/relationships" xmlns:mc="http://schemas.openxmlformats.org/markup-compatibility/2006" xmlns:mv="urn:schemas-microsoft-com:mac:vml" xmlns:p="http://schemas.openxmlformats.org/presentationml/2006/main" xmlns:c="http://schemas.openxmlformats.org/drawingml/2006/chart" xmlns:dgm="http://schemas.openxmlformats.org/drawingml/2006/diagram" xmlns:o="urn:schemas-microsoft-com:office:office" xmlns:v="urn:schemas-microsoft-com:vml" xmlns:pvml="urn:schemas-microsoft-com:office:powerpoint" xmlns:com="http://schemas.openxmlformats.org/drawingml/2006/compatibility" xmlns:p14="http://schemas.microsoft.com/office/powerpoint/2010/main">
+<p:sld xmlns:a="http://schemas.openxmlformats.org/drawingml/2006/main" xmlns:r="http://schemas.openxmlformats.org/officeDocument/2006/relationships" xmlns:p="http://schemas.openxmlformats.org/presentationml/2006/main">
   <p:cSld>
     <p:spTree>
       <p:nvGrpSpPr>
-        <p:cNvPr id="71" name="Shape 71"/>
+        <p:cNvPr id="1" name="Shape 71"/>
         <p:cNvGrpSpPr/>
         <p:nvPr/>
       </p:nvGrpSpPr>
@@ -4778,7 +5116,9 @@
       <p:sp>
         <p:nvSpPr>
           <p:cNvPr id="72" name="Shape 72"/>
-          <p:cNvSpPr txBox="1"/>
+          <p:cNvSpPr txBox="1">
+            <a:spLocks noGrp="1"/>
+          </p:cNvSpPr>
           <p:nvPr>
             <p:ph type="title"/>
           </p:nvPr>
@@ -4793,7 +5133,7 @@
           </a:prstGeom>
         </p:spPr>
         <p:txBody>
-          <a:bodyPr anchorCtr="0" anchor="t" bIns="91425" lIns="91425" rIns="91425" tIns="91425">
+          <a:bodyPr lIns="91425" tIns="91425" rIns="91425" bIns="91425" anchor="t" anchorCtr="0">
             <a:noAutofit/>
           </a:bodyPr>
           <a:lstStyle/>
@@ -4814,9 +5154,11 @@
       <p:sp>
         <p:nvSpPr>
           <p:cNvPr id="73" name="Shape 73"/>
-          <p:cNvSpPr txBox="1"/>
-          <p:nvPr>
-            <p:ph idx="1" type="body"/>
+          <p:cNvSpPr txBox="1">
+            <a:spLocks noGrp="1"/>
+          </p:cNvSpPr>
+          <p:nvPr>
+            <p:ph type="body" idx="1"/>
           </p:nvPr>
         </p:nvSpPr>
         <p:spPr>
@@ -4829,7 +5171,7 @@
           </a:prstGeom>
         </p:spPr>
         <p:txBody>
-          <a:bodyPr anchorCtr="0" anchor="t" bIns="91425" lIns="91425" rIns="91425" tIns="91425">
+          <a:bodyPr lIns="91425" tIns="91425" rIns="91425" bIns="91425" anchor="t" anchorCtr="0">
             <a:noAutofit/>
           </a:bodyPr>
           <a:lstStyle/>
@@ -4840,9 +5182,6 @@
               </a:spcBef>
               <a:buNone/>
             </a:pPr>
-            <a:r>
-              <a:t/>
-            </a:r>
             <a:endParaRPr/>
           </a:p>
         </p:txBody>
@@ -4856,11 +5195,11 @@
 </file>
 
 <file path=ppt/slides/slide5.xml><?xml version="1.0" encoding="utf-8"?>
-<p:sld xmlns:a="http://schemas.openxmlformats.org/drawingml/2006/main" xmlns:r="http://schemas.openxmlformats.org/officeDocument/2006/relationships" xmlns:mc="http://schemas.openxmlformats.org/markup-compatibility/2006" xmlns:mv="urn:schemas-microsoft-com:mac:vml" xmlns:p="http://schemas.openxmlformats.org/presentationml/2006/main" xmlns:c="http://schemas.openxmlformats.org/drawingml/2006/chart" xmlns:dgm="http://schemas.openxmlformats.org/drawingml/2006/diagram" xmlns:o="urn:schemas-microsoft-com:office:office" xmlns:v="urn:schemas-microsoft-com:vml" xmlns:pvml="urn:schemas-microsoft-com:office:powerpoint" xmlns:com="http://schemas.openxmlformats.org/drawingml/2006/compatibility" xmlns:p14="http://schemas.microsoft.com/office/powerpoint/2010/main">
+<p:sld xmlns:a="http://schemas.openxmlformats.org/drawingml/2006/main" xmlns:r="http://schemas.openxmlformats.org/officeDocument/2006/relationships" xmlns:p="http://schemas.openxmlformats.org/presentationml/2006/main">
   <p:cSld>
     <p:spTree>
       <p:nvGrpSpPr>
-        <p:cNvPr id="77" name="Shape 77"/>
+        <p:cNvPr id="1" name="Shape 77"/>
         <p:cNvGrpSpPr/>
         <p:nvPr/>
       </p:nvGrpSpPr>
@@ -4875,7 +5214,9 @@
       <p:sp>
         <p:nvSpPr>
           <p:cNvPr id="78" name="Shape 78"/>
-          <p:cNvSpPr txBox="1"/>
+          <p:cNvSpPr txBox="1">
+            <a:spLocks noGrp="1"/>
+          </p:cNvSpPr>
           <p:nvPr>
             <p:ph type="title"/>
           </p:nvPr>
@@ -4890,7 +5231,7 @@
           </a:prstGeom>
         </p:spPr>
         <p:txBody>
-          <a:bodyPr anchorCtr="0" anchor="t" bIns="91425" lIns="91425" rIns="91425" tIns="91425">
+          <a:bodyPr lIns="91425" tIns="91425" rIns="91425" bIns="91425" anchor="t" anchorCtr="0">
             <a:noAutofit/>
           </a:bodyPr>
           <a:lstStyle/>
@@ -4911,9 +5252,11 @@
       <p:sp>
         <p:nvSpPr>
           <p:cNvPr id="79" name="Shape 79"/>
-          <p:cNvSpPr txBox="1"/>
-          <p:nvPr>
-            <p:ph idx="1" type="body"/>
+          <p:cNvSpPr txBox="1">
+            <a:spLocks noGrp="1"/>
+          </p:cNvSpPr>
+          <p:nvPr>
+            <p:ph type="body" idx="1"/>
           </p:nvPr>
         </p:nvSpPr>
         <p:spPr>
@@ -4926,12 +5269,12 @@
           </a:prstGeom>
         </p:spPr>
         <p:txBody>
-          <a:bodyPr anchorCtr="0" anchor="t" bIns="91425" lIns="91425" rIns="91425" tIns="91425">
+          <a:bodyPr lIns="91425" tIns="91425" rIns="91425" bIns="91425" anchor="t" anchorCtr="0">
             <a:noAutofit/>
           </a:bodyPr>
           <a:lstStyle/>
           <a:p>
-            <a:pPr indent="-228600" lvl="0" marL="457200" rtl="0">
+            <a:pPr marL="457200" lvl="0" indent="-228600" rtl="0">
               <a:spcBef>
                 <a:spcPts val="0"/>
               </a:spcBef>
@@ -4943,7 +5286,7 @@
             </a:r>
           </a:p>
           <a:p>
-            <a:pPr indent="-228600" lvl="0" marL="457200" rtl="0">
+            <a:pPr marL="457200" lvl="0" indent="-228600" rtl="0">
               <a:spcBef>
                 <a:spcPts val="0"/>
               </a:spcBef>
@@ -4955,7 +5298,7 @@
             </a:r>
           </a:p>
           <a:p>
-            <a:pPr indent="-228600" lvl="0" marL="457200" rtl="0">
+            <a:pPr marL="457200" lvl="0" indent="-228600" rtl="0">
               <a:spcBef>
                 <a:spcPts val="0"/>
               </a:spcBef>
@@ -4967,7 +5310,7 @@
             </a:r>
           </a:p>
           <a:p>
-            <a:pPr indent="-228600" lvl="0" marL="457200">
+            <a:pPr marL="457200" lvl="0" indent="-228600">
               <a:spcBef>
                 <a:spcPts val="0"/>
               </a:spcBef>
@@ -4989,11 +5332,11 @@
 </file>
 
 <file path=ppt/slides/slide6.xml><?xml version="1.0" encoding="utf-8"?>
-<p:sld xmlns:a="http://schemas.openxmlformats.org/drawingml/2006/main" xmlns:r="http://schemas.openxmlformats.org/officeDocument/2006/relationships" xmlns:mc="http://schemas.openxmlformats.org/markup-compatibility/2006" xmlns:mv="urn:schemas-microsoft-com:mac:vml" xmlns:p="http://schemas.openxmlformats.org/presentationml/2006/main" xmlns:c="http://schemas.openxmlformats.org/drawingml/2006/chart" xmlns:dgm="http://schemas.openxmlformats.org/drawingml/2006/diagram" xmlns:o="urn:schemas-microsoft-com:office:office" xmlns:v="urn:schemas-microsoft-com:vml" xmlns:pvml="urn:schemas-microsoft-com:office:powerpoint" xmlns:com="http://schemas.openxmlformats.org/drawingml/2006/compatibility" xmlns:p14="http://schemas.microsoft.com/office/powerpoint/2010/main">
+<p:sld xmlns:a="http://schemas.openxmlformats.org/drawingml/2006/main" xmlns:r="http://schemas.openxmlformats.org/officeDocument/2006/relationships" xmlns:p="http://schemas.openxmlformats.org/presentationml/2006/main">
   <p:cSld>
     <p:spTree>
       <p:nvGrpSpPr>
-        <p:cNvPr id="83" name="Shape 83"/>
+        <p:cNvPr id="1" name="Shape 83"/>
         <p:cNvGrpSpPr/>
         <p:nvPr/>
       </p:nvGrpSpPr>
@@ -5008,7 +5351,9 @@
       <p:sp>
         <p:nvSpPr>
           <p:cNvPr id="84" name="Shape 84"/>
-          <p:cNvSpPr txBox="1"/>
+          <p:cNvSpPr txBox="1">
+            <a:spLocks noGrp="1"/>
+          </p:cNvSpPr>
           <p:nvPr>
             <p:ph type="title"/>
           </p:nvPr>
@@ -5023,7 +5368,7 @@
           </a:prstGeom>
         </p:spPr>
         <p:txBody>
-          <a:bodyPr anchorCtr="0" anchor="t" bIns="91425" lIns="91425" rIns="91425" tIns="91425">
+          <a:bodyPr lIns="91425" tIns="91425" rIns="91425" bIns="91425" anchor="t" anchorCtr="0">
             <a:noAutofit/>
           </a:bodyPr>
           <a:lstStyle/>
@@ -5044,9 +5389,11 @@
       <p:sp>
         <p:nvSpPr>
           <p:cNvPr id="85" name="Shape 85"/>
-          <p:cNvSpPr txBox="1"/>
-          <p:nvPr>
-            <p:ph idx="1" type="body"/>
+          <p:cNvSpPr txBox="1">
+            <a:spLocks noGrp="1"/>
+          </p:cNvSpPr>
+          <p:nvPr>
+            <p:ph type="body" idx="1"/>
           </p:nvPr>
         </p:nvSpPr>
         <p:spPr>
@@ -5059,7 +5406,7 @@
           </a:prstGeom>
         </p:spPr>
         <p:txBody>
-          <a:bodyPr anchorCtr="0" anchor="t" bIns="91425" lIns="91425" rIns="91425" tIns="91425">
+          <a:bodyPr lIns="91425" tIns="91425" rIns="91425" bIns="91425" anchor="t" anchorCtr="0">
             <a:noAutofit/>
           </a:bodyPr>
           <a:lstStyle/>
@@ -5070,9 +5417,6 @@
               </a:spcBef>
               <a:buNone/>
             </a:pPr>
-            <a:r>
-              <a:t/>
-            </a:r>
             <a:endParaRPr/>
           </a:p>
         </p:txBody>
@@ -5086,11 +5430,11 @@
 </file>
 
 <file path=ppt/slides/slide7.xml><?xml version="1.0" encoding="utf-8"?>
-<p:sld xmlns:a="http://schemas.openxmlformats.org/drawingml/2006/main" xmlns:r="http://schemas.openxmlformats.org/officeDocument/2006/relationships" xmlns:mc="http://schemas.openxmlformats.org/markup-compatibility/2006" xmlns:mv="urn:schemas-microsoft-com:mac:vml" xmlns:p="http://schemas.openxmlformats.org/presentationml/2006/main" xmlns:c="http://schemas.openxmlformats.org/drawingml/2006/chart" xmlns:dgm="http://schemas.openxmlformats.org/drawingml/2006/diagram" xmlns:o="urn:schemas-microsoft-com:office:office" xmlns:v="urn:schemas-microsoft-com:vml" xmlns:pvml="urn:schemas-microsoft-com:office:powerpoint" xmlns:com="http://schemas.openxmlformats.org/drawingml/2006/compatibility" xmlns:p14="http://schemas.microsoft.com/office/powerpoint/2010/main">
+<p:sld xmlns:a="http://schemas.openxmlformats.org/drawingml/2006/main" xmlns:r="http://schemas.openxmlformats.org/officeDocument/2006/relationships" xmlns:p="http://schemas.openxmlformats.org/presentationml/2006/main">
   <p:cSld>
     <p:spTree>
       <p:nvGrpSpPr>
-        <p:cNvPr id="89" name="Shape 89"/>
+        <p:cNvPr id="1" name="Shape 89"/>
         <p:cNvGrpSpPr/>
         <p:nvPr/>
       </p:nvGrpSpPr>
@@ -5105,7 +5449,9 @@
       <p:sp>
         <p:nvSpPr>
           <p:cNvPr id="90" name="Shape 90"/>
-          <p:cNvSpPr txBox="1"/>
+          <p:cNvSpPr txBox="1">
+            <a:spLocks noGrp="1"/>
+          </p:cNvSpPr>
           <p:nvPr>
             <p:ph type="title"/>
           </p:nvPr>
@@ -5120,7 +5466,7 @@
           </a:prstGeom>
         </p:spPr>
         <p:txBody>
-          <a:bodyPr anchorCtr="0" anchor="t" bIns="91425" lIns="91425" rIns="91425" tIns="91425">
+          <a:bodyPr lIns="91425" tIns="91425" rIns="91425" bIns="91425" anchor="t" anchorCtr="0">
             <a:noAutofit/>
           </a:bodyPr>
           <a:lstStyle/>
@@ -5141,9 +5487,11 @@
       <p:sp>
         <p:nvSpPr>
           <p:cNvPr id="91" name="Shape 91"/>
-          <p:cNvSpPr txBox="1"/>
-          <p:nvPr>
-            <p:ph idx="1" type="body"/>
+          <p:cNvSpPr txBox="1">
+            <a:spLocks noGrp="1"/>
+          </p:cNvSpPr>
+          <p:nvPr>
+            <p:ph type="body" idx="1"/>
           </p:nvPr>
         </p:nvSpPr>
         <p:spPr>
@@ -5156,7 +5504,7 @@
           </a:prstGeom>
         </p:spPr>
         <p:txBody>
-          <a:bodyPr anchorCtr="0" anchor="t" bIns="91425" lIns="91425" rIns="91425" tIns="91425">
+          <a:bodyPr lIns="91425" tIns="91425" rIns="91425" bIns="91425" anchor="t" anchorCtr="0">
             <a:noAutofit/>
           </a:bodyPr>
           <a:lstStyle/>
@@ -5167,9 +5515,6 @@
               </a:spcBef>
               <a:buNone/>
             </a:pPr>
-            <a:r>
-              <a:t/>
-            </a:r>
             <a:endParaRPr/>
           </a:p>
         </p:txBody>
@@ -5183,11 +5528,11 @@
 </file>
 
 <file path=ppt/slides/slide8.xml><?xml version="1.0" encoding="utf-8"?>
-<p:sld xmlns:a="http://schemas.openxmlformats.org/drawingml/2006/main" xmlns:r="http://schemas.openxmlformats.org/officeDocument/2006/relationships" xmlns:mc="http://schemas.openxmlformats.org/markup-compatibility/2006" xmlns:mv="urn:schemas-microsoft-com:mac:vml" xmlns:p="http://schemas.openxmlformats.org/presentationml/2006/main" xmlns:c="http://schemas.openxmlformats.org/drawingml/2006/chart" xmlns:dgm="http://schemas.openxmlformats.org/drawingml/2006/diagram" xmlns:o="urn:schemas-microsoft-com:office:office" xmlns:v="urn:schemas-microsoft-com:vml" xmlns:pvml="urn:schemas-microsoft-com:office:powerpoint" xmlns:com="http://schemas.openxmlformats.org/drawingml/2006/compatibility" xmlns:p14="http://schemas.microsoft.com/office/powerpoint/2010/main">
+<p:sld xmlns:a="http://schemas.openxmlformats.org/drawingml/2006/main" xmlns:r="http://schemas.openxmlformats.org/officeDocument/2006/relationships" xmlns:p="http://schemas.openxmlformats.org/presentationml/2006/main">
   <p:cSld>
     <p:spTree>
       <p:nvGrpSpPr>
-        <p:cNvPr id="95" name="Shape 95"/>
+        <p:cNvPr id="1" name="Shape 95"/>
         <p:cNvGrpSpPr/>
         <p:nvPr/>
       </p:nvGrpSpPr>
@@ -5202,7 +5547,9 @@
       <p:sp>
         <p:nvSpPr>
           <p:cNvPr id="96" name="Shape 96"/>
-          <p:cNvSpPr txBox="1"/>
+          <p:cNvSpPr txBox="1">
+            <a:spLocks noGrp="1"/>
+          </p:cNvSpPr>
           <p:nvPr>
             <p:ph type="title"/>
           </p:nvPr>
@@ -5217,7 +5564,7 @@
           </a:prstGeom>
         </p:spPr>
         <p:txBody>
-          <a:bodyPr anchorCtr="0" anchor="t" bIns="91425" lIns="91425" rIns="91425" tIns="91425">
+          <a:bodyPr lIns="91425" tIns="91425" rIns="91425" bIns="91425" anchor="t" anchorCtr="0">
             <a:noAutofit/>
           </a:bodyPr>
           <a:lstStyle/>
@@ -5238,9 +5585,11 @@
       <p:sp>
         <p:nvSpPr>
           <p:cNvPr id="97" name="Shape 97"/>
-          <p:cNvSpPr txBox="1"/>
-          <p:nvPr>
-            <p:ph idx="1" type="body"/>
+          <p:cNvSpPr txBox="1">
+            <a:spLocks noGrp="1"/>
+          </p:cNvSpPr>
+          <p:nvPr>
+            <p:ph type="body" idx="1"/>
           </p:nvPr>
         </p:nvSpPr>
         <p:spPr>
@@ -5253,7 +5602,7 @@
           </a:prstGeom>
         </p:spPr>
         <p:txBody>
-          <a:bodyPr anchorCtr="0" anchor="t" bIns="91425" lIns="91425" rIns="91425" tIns="91425">
+          <a:bodyPr lIns="91425" tIns="91425" rIns="91425" bIns="91425" anchor="t" anchorCtr="0">
             <a:noAutofit/>
           </a:bodyPr>
           <a:lstStyle/>
@@ -5264,9 +5613,6 @@
               </a:spcBef>
               <a:buNone/>
             </a:pPr>
-            <a:r>
-              <a:t/>
-            </a:r>
             <a:endParaRPr/>
           </a:p>
         </p:txBody>
@@ -5280,11 +5626,11 @@
 </file>
 
 <file path=ppt/slides/slide9.xml><?xml version="1.0" encoding="utf-8"?>
-<p:sld xmlns:a="http://schemas.openxmlformats.org/drawingml/2006/main" xmlns:r="http://schemas.openxmlformats.org/officeDocument/2006/relationships" xmlns:mc="http://schemas.openxmlformats.org/markup-compatibility/2006" xmlns:mv="urn:schemas-microsoft-com:mac:vml" xmlns:p="http://schemas.openxmlformats.org/presentationml/2006/main" xmlns:c="http://schemas.openxmlformats.org/drawingml/2006/chart" xmlns:dgm="http://schemas.openxmlformats.org/drawingml/2006/diagram" xmlns:o="urn:schemas-microsoft-com:office:office" xmlns:v="urn:schemas-microsoft-com:vml" xmlns:pvml="urn:schemas-microsoft-com:office:powerpoint" xmlns:com="http://schemas.openxmlformats.org/drawingml/2006/compatibility" xmlns:p14="http://schemas.microsoft.com/office/powerpoint/2010/main">
+<p:sld xmlns:a="http://schemas.openxmlformats.org/drawingml/2006/main" xmlns:r="http://schemas.openxmlformats.org/officeDocument/2006/relationships" xmlns:p="http://schemas.openxmlformats.org/presentationml/2006/main">
   <p:cSld>
     <p:spTree>
       <p:nvGrpSpPr>
-        <p:cNvPr id="101" name="Shape 101"/>
+        <p:cNvPr id="1" name="Shape 101"/>
         <p:cNvGrpSpPr/>
         <p:nvPr/>
       </p:nvGrpSpPr>
@@ -5299,7 +5645,9 @@
       <p:sp>
         <p:nvSpPr>
           <p:cNvPr id="102" name="Shape 102"/>
-          <p:cNvSpPr txBox="1"/>
+          <p:cNvSpPr txBox="1">
+            <a:spLocks noGrp="1"/>
+          </p:cNvSpPr>
           <p:nvPr>
             <p:ph type="title"/>
           </p:nvPr>
@@ -5314,7 +5662,7 @@
           </a:prstGeom>
         </p:spPr>
         <p:txBody>
-          <a:bodyPr anchorCtr="0" anchor="t" bIns="91425" lIns="91425" rIns="91425" tIns="91425">
+          <a:bodyPr lIns="91425" tIns="91425" rIns="91425" bIns="91425" anchor="t" anchorCtr="0">
             <a:noAutofit/>
           </a:bodyPr>
           <a:lstStyle/>
@@ -5335,9 +5683,11 @@
       <p:sp>
         <p:nvSpPr>
           <p:cNvPr id="103" name="Shape 103"/>
-          <p:cNvSpPr txBox="1"/>
-          <p:nvPr>
-            <p:ph idx="1" type="body"/>
+          <p:cNvSpPr txBox="1">
+            <a:spLocks noGrp="1"/>
+          </p:cNvSpPr>
+          <p:nvPr>
+            <p:ph type="body" idx="1"/>
           </p:nvPr>
         </p:nvSpPr>
         <p:spPr>
@@ -5350,7 +5700,7 @@
           </a:prstGeom>
         </p:spPr>
         <p:txBody>
-          <a:bodyPr anchorCtr="0" anchor="t" bIns="91425" lIns="91425" rIns="91425" tIns="91425">
+          <a:bodyPr lIns="91425" tIns="91425" rIns="91425" bIns="91425" anchor="t" anchorCtr="0">
             <a:noAutofit/>
           </a:bodyPr>
           <a:lstStyle/>
@@ -5361,9 +5711,6 @@
               </a:spcBef>
               <a:buNone/>
             </a:pPr>
-            <a:r>
-              <a:t/>
-            </a:r>
             <a:endParaRPr/>
           </a:p>
         </p:txBody>
@@ -5377,7 +5724,288 @@
 </file>
 
 <file path=ppt/theme/theme1.xml><?xml version="1.0" encoding="utf-8"?>
-<a:theme xmlns:a="http://schemas.openxmlformats.org/drawingml/2006/main" xmlns:r="http://schemas.openxmlformats.org/officeDocument/2006/relationships" name="Custom Theme">
+<a:theme xmlns:a="http://schemas.openxmlformats.org/drawingml/2006/main" name="simple-light-2">
+  <a:themeElements>
+    <a:clrScheme name="Simple Light">
+      <a:dk1>
+        <a:srgbClr val="000000"/>
+      </a:dk1>
+      <a:lt1>
+        <a:srgbClr val="FFFFFF"/>
+      </a:lt1>
+      <a:dk2>
+        <a:srgbClr val="595959"/>
+      </a:dk2>
+      <a:lt2>
+        <a:srgbClr val="EEEEEE"/>
+      </a:lt2>
+      <a:accent1>
+        <a:srgbClr val="FFAB40"/>
+      </a:accent1>
+      <a:accent2>
+        <a:srgbClr val="212121"/>
+      </a:accent2>
+      <a:accent3>
+        <a:srgbClr val="78909C"/>
+      </a:accent3>
+      <a:accent4>
+        <a:srgbClr val="FFAB40"/>
+      </a:accent4>
+      <a:accent5>
+        <a:srgbClr val="0097A7"/>
+      </a:accent5>
+      <a:accent6>
+        <a:srgbClr val="EEFF41"/>
+      </a:accent6>
+      <a:hlink>
+        <a:srgbClr val="0097A7"/>
+      </a:hlink>
+      <a:folHlink>
+        <a:srgbClr val="0097A7"/>
+      </a:folHlink>
+    </a:clrScheme>
+    <a:fontScheme name="Office">
+      <a:majorFont>
+        <a:latin typeface="Arial"/>
+        <a:ea typeface=""/>
+        <a:cs typeface=""/>
+        <a:font script="Jpan" typeface="ＭＳ Ｐゴシック"/>
+        <a:font script="Hang" typeface="맑은 고딕"/>
+        <a:font script="Hans" typeface="宋体"/>
+        <a:font script="Hant" typeface="新細明體"/>
+        <a:font script="Arab" typeface="Times New Roman"/>
+        <a:font script="Hebr" typeface="Times New Roman"/>
+        <a:font script="Thai" typeface="Angsana New"/>
+        <a:font script="Ethi" typeface="Nyala"/>
+        <a:font script="Beng" typeface="Vrinda"/>
+        <a:font script="Gujr" typeface="Shruti"/>
+        <a:font script="Khmr" typeface="MoolBoran"/>
+        <a:font script="Knda" typeface="Tunga"/>
+        <a:font script="Guru" typeface="Raavi"/>
+        <a:font script="Cans" typeface="Euphemia"/>
+        <a:font script="Cher" typeface="Plantagenet Cherokee"/>
+        <a:font script="Yiii" typeface="Microsoft Yi Baiti"/>
+        <a:font script="Tibt" typeface="Microsoft Himalaya"/>
+        <a:font script="Thaa" typeface="MV Boli"/>
+        <a:font script="Deva" typeface="Mangal"/>
+        <a:font script="Telu" typeface="Gautami"/>
+        <a:font script="Taml" typeface="Latha"/>
+        <a:font script="Syrc" typeface="Estrangelo Edessa"/>
+        <a:font script="Orya" typeface="Kalinga"/>
+        <a:font script="Mlym" typeface="Kartika"/>
+        <a:font script="Laoo" typeface="DokChampa"/>
+        <a:font script="Sinh" typeface="Iskoola Pota"/>
+        <a:font script="Mong" typeface="Mongolian Baiti"/>
+        <a:font script="Viet" typeface="Times New Roman"/>
+        <a:font script="Uigh" typeface="Microsoft Uighur"/>
+        <a:font script="Geor" typeface="Sylfaen"/>
+      </a:majorFont>
+      <a:minorFont>
+        <a:latin typeface="Arial"/>
+        <a:ea typeface=""/>
+        <a:cs typeface=""/>
+        <a:font script="Jpan" typeface="ＭＳ Ｐゴシック"/>
+        <a:font script="Hang" typeface="맑은 고딕"/>
+        <a:font script="Hans" typeface="宋体"/>
+        <a:font script="Hant" typeface="新細明體"/>
+        <a:font script="Arab" typeface="Arial"/>
+        <a:font script="Hebr" typeface="Arial"/>
+        <a:font script="Thai" typeface="Cordia New"/>
+        <a:font script="Ethi" typeface="Nyala"/>
+        <a:font script="Beng" typeface="Vrinda"/>
+        <a:font script="Gujr" typeface="Shruti"/>
+        <a:font script="Khmr" typeface="DaunPenh"/>
+        <a:font script="Knda" typeface="Tunga"/>
+        <a:font script="Guru" typeface="Raavi"/>
+        <a:font script="Cans" typeface="Euphemia"/>
+        <a:font script="Cher" typeface="Plantagenet Cherokee"/>
+        <a:font script="Yiii" typeface="Microsoft Yi Baiti"/>
+        <a:font script="Tibt" typeface="Microsoft Himalaya"/>
+        <a:font script="Thaa" typeface="MV Boli"/>
+        <a:font script="Deva" typeface="Mangal"/>
+        <a:font script="Telu" typeface="Gautami"/>
+        <a:font script="Taml" typeface="Latha"/>
+        <a:font script="Syrc" typeface="Estrangelo Edessa"/>
+        <a:font script="Orya" typeface="Kalinga"/>
+        <a:font script="Mlym" typeface="Kartika"/>
+        <a:font script="Laoo" typeface="DokChampa"/>
+        <a:font script="Sinh" typeface="Iskoola Pota"/>
+        <a:font script="Mong" typeface="Mongolian Baiti"/>
+        <a:font script="Viet" typeface="Arial"/>
+        <a:font script="Uigh" typeface="Microsoft Uighur"/>
+        <a:font script="Geor" typeface="Sylfaen"/>
+      </a:minorFont>
+    </a:fontScheme>
+    <a:fmtScheme name="Office">
+      <a:fillStyleLst>
+        <a:solidFill>
+          <a:schemeClr val="phClr"/>
+        </a:solidFill>
+        <a:gradFill rotWithShape="1">
+          <a:gsLst>
+            <a:gs pos="0">
+              <a:schemeClr val="phClr">
+                <a:tint val="50000"/>
+                <a:satMod val="300000"/>
+              </a:schemeClr>
+            </a:gs>
+            <a:gs pos="35000">
+              <a:schemeClr val="phClr">
+                <a:tint val="37000"/>
+                <a:satMod val="300000"/>
+              </a:schemeClr>
+            </a:gs>
+            <a:gs pos="100000">
+              <a:schemeClr val="phClr">
+                <a:tint val="15000"/>
+                <a:satMod val="350000"/>
+              </a:schemeClr>
+            </a:gs>
+          </a:gsLst>
+          <a:lin ang="16200000" scaled="1"/>
+        </a:gradFill>
+        <a:gradFill rotWithShape="1">
+          <a:gsLst>
+            <a:gs pos="0">
+              <a:schemeClr val="phClr">
+                <a:tint val="100000"/>
+                <a:shade val="100000"/>
+                <a:satMod val="130000"/>
+              </a:schemeClr>
+            </a:gs>
+            <a:gs pos="100000">
+              <a:schemeClr val="phClr">
+                <a:tint val="50000"/>
+                <a:shade val="100000"/>
+                <a:satMod val="350000"/>
+              </a:schemeClr>
+            </a:gs>
+          </a:gsLst>
+          <a:lin ang="16200000" scaled="0"/>
+        </a:gradFill>
+      </a:fillStyleLst>
+      <a:lnStyleLst>
+        <a:ln w="9525" cap="flat" cmpd="sng" algn="ctr">
+          <a:solidFill>
+            <a:schemeClr val="phClr">
+              <a:shade val="95000"/>
+              <a:satMod val="105000"/>
+            </a:schemeClr>
+          </a:solidFill>
+          <a:prstDash val="solid"/>
+        </a:ln>
+        <a:ln w="25400" cap="flat" cmpd="sng" algn="ctr">
+          <a:solidFill>
+            <a:schemeClr val="phClr"/>
+          </a:solidFill>
+          <a:prstDash val="solid"/>
+        </a:ln>
+        <a:ln w="38100" cap="flat" cmpd="sng" algn="ctr">
+          <a:solidFill>
+            <a:schemeClr val="phClr"/>
+          </a:solidFill>
+          <a:prstDash val="solid"/>
+        </a:ln>
+      </a:lnStyleLst>
+      <a:effectStyleLst>
+        <a:effectStyle>
+          <a:effectLst>
+            <a:outerShdw blurRad="40000" dist="20000" dir="5400000" rotWithShape="0">
+              <a:srgbClr val="000000">
+                <a:alpha val="38000"/>
+              </a:srgbClr>
+            </a:outerShdw>
+          </a:effectLst>
+        </a:effectStyle>
+        <a:effectStyle>
+          <a:effectLst>
+            <a:outerShdw blurRad="40000" dist="23000" dir="5400000" rotWithShape="0">
+              <a:srgbClr val="000000">
+                <a:alpha val="35000"/>
+              </a:srgbClr>
+            </a:outerShdw>
+          </a:effectLst>
+        </a:effectStyle>
+        <a:effectStyle>
+          <a:effectLst>
+            <a:outerShdw blurRad="40000" dist="23000" dir="5400000" rotWithShape="0">
+              <a:srgbClr val="000000">
+                <a:alpha val="35000"/>
+              </a:srgbClr>
+            </a:outerShdw>
+          </a:effectLst>
+          <a:scene3d>
+            <a:camera prst="orthographicFront">
+              <a:rot lat="0" lon="0" rev="0"/>
+            </a:camera>
+            <a:lightRig rig="threePt" dir="t">
+              <a:rot lat="0" lon="0" rev="1200000"/>
+            </a:lightRig>
+          </a:scene3d>
+          <a:sp3d>
+            <a:bevelT w="63500" h="25400"/>
+          </a:sp3d>
+        </a:effectStyle>
+      </a:effectStyleLst>
+      <a:bgFillStyleLst>
+        <a:solidFill>
+          <a:schemeClr val="phClr"/>
+        </a:solidFill>
+        <a:gradFill rotWithShape="1">
+          <a:gsLst>
+            <a:gs pos="0">
+              <a:schemeClr val="phClr">
+                <a:tint val="40000"/>
+                <a:satMod val="350000"/>
+              </a:schemeClr>
+            </a:gs>
+            <a:gs pos="40000">
+              <a:schemeClr val="phClr">
+                <a:tint val="45000"/>
+                <a:shade val="99000"/>
+                <a:satMod val="350000"/>
+              </a:schemeClr>
+            </a:gs>
+            <a:gs pos="100000">
+              <a:schemeClr val="phClr">
+                <a:shade val="20000"/>
+                <a:satMod val="255000"/>
+              </a:schemeClr>
+            </a:gs>
+          </a:gsLst>
+          <a:path path="circle">
+            <a:fillToRect l="50000" t="-80000" r="50000" b="180000"/>
+          </a:path>
+        </a:gradFill>
+        <a:gradFill rotWithShape="1">
+          <a:gsLst>
+            <a:gs pos="0">
+              <a:schemeClr val="phClr">
+                <a:tint val="80000"/>
+                <a:satMod val="300000"/>
+              </a:schemeClr>
+            </a:gs>
+            <a:gs pos="100000">
+              <a:schemeClr val="phClr">
+                <a:shade val="30000"/>
+                <a:satMod val="200000"/>
+              </a:schemeClr>
+            </a:gs>
+          </a:gsLst>
+          <a:path path="circle">
+            <a:fillToRect l="50000" t="50000" r="50000" b="50000"/>
+          </a:path>
+        </a:gradFill>
+      </a:bgFillStyleLst>
+    </a:fmtScheme>
+  </a:themeElements>
+  <a:objectDefaults/>
+  <a:extraClrSchemeLst/>
+</a:theme>
+</file>
+
+<file path=ppt/theme/theme2.xml><?xml version="1.0" encoding="utf-8"?>
+<a:theme xmlns:a="http://schemas.openxmlformats.org/drawingml/2006/main" name="Custom Theme">
   <a:themeElements>
     <a:clrScheme name="Default">
       <a:dk1>
@@ -5652,284 +6280,7 @@
       </a:bgFillStyleLst>
     </a:fmtScheme>
   </a:themeElements>
-</a:theme>
-</file>
-
-<file path=ppt/theme/theme2.xml><?xml version="1.0" encoding="utf-8"?>
-<a:theme xmlns:a="http://schemas.openxmlformats.org/drawingml/2006/main" xmlns:r="http://schemas.openxmlformats.org/officeDocument/2006/relationships" name="simple-light-2">
-  <a:themeElements>
-    <a:clrScheme name="Simple Light">
-      <a:dk1>
-        <a:srgbClr val="000000"/>
-      </a:dk1>
-      <a:lt1>
-        <a:srgbClr val="FFFFFF"/>
-      </a:lt1>
-      <a:dk2>
-        <a:srgbClr val="595959"/>
-      </a:dk2>
-      <a:lt2>
-        <a:srgbClr val="EEEEEE"/>
-      </a:lt2>
-      <a:accent1>
-        <a:srgbClr val="FFAB40"/>
-      </a:accent1>
-      <a:accent2>
-        <a:srgbClr val="212121"/>
-      </a:accent2>
-      <a:accent3>
-        <a:srgbClr val="78909C"/>
-      </a:accent3>
-      <a:accent4>
-        <a:srgbClr val="FFAB40"/>
-      </a:accent4>
-      <a:accent5>
-        <a:srgbClr val="0097A7"/>
-      </a:accent5>
-      <a:accent6>
-        <a:srgbClr val="EEFF41"/>
-      </a:accent6>
-      <a:hlink>
-        <a:srgbClr val="0097A7"/>
-      </a:hlink>
-      <a:folHlink>
-        <a:srgbClr val="0097A7"/>
-      </a:folHlink>
-    </a:clrScheme>
-    <a:fontScheme name="Office">
-      <a:majorFont>
-        <a:latin typeface="Arial"/>
-        <a:ea typeface=""/>
-        <a:cs typeface=""/>
-        <a:font script="Jpan" typeface="ＭＳ Ｐゴシック"/>
-        <a:font script="Hang" typeface="맑은 고딕"/>
-        <a:font script="Hans" typeface="宋体"/>
-        <a:font script="Hant" typeface="新細明體"/>
-        <a:font script="Arab" typeface="Times New Roman"/>
-        <a:font script="Hebr" typeface="Times New Roman"/>
-        <a:font script="Thai" typeface="Angsana New"/>
-        <a:font script="Ethi" typeface="Nyala"/>
-        <a:font script="Beng" typeface="Vrinda"/>
-        <a:font script="Gujr" typeface="Shruti"/>
-        <a:font script="Khmr" typeface="MoolBoran"/>
-        <a:font script="Knda" typeface="Tunga"/>
-        <a:font script="Guru" typeface="Raavi"/>
-        <a:font script="Cans" typeface="Euphemia"/>
-        <a:font script="Cher" typeface="Plantagenet Cherokee"/>
-        <a:font script="Yiii" typeface="Microsoft Yi Baiti"/>
-        <a:font script="Tibt" typeface="Microsoft Himalaya"/>
-        <a:font script="Thaa" typeface="MV Boli"/>
-        <a:font script="Deva" typeface="Mangal"/>
-        <a:font script="Telu" typeface="Gautami"/>
-        <a:font script="Taml" typeface="Latha"/>
-        <a:font script="Syrc" typeface="Estrangelo Edessa"/>
-        <a:font script="Orya" typeface="Kalinga"/>
-        <a:font script="Mlym" typeface="Kartika"/>
-        <a:font script="Laoo" typeface="DokChampa"/>
-        <a:font script="Sinh" typeface="Iskoola Pota"/>
-        <a:font script="Mong" typeface="Mongolian Baiti"/>
-        <a:font script="Viet" typeface="Times New Roman"/>
-        <a:font script="Uigh" typeface="Microsoft Uighur"/>
-        <a:font script="Geor" typeface="Sylfaen"/>
-      </a:majorFont>
-      <a:minorFont>
-        <a:latin typeface="Arial"/>
-        <a:ea typeface=""/>
-        <a:cs typeface=""/>
-        <a:font script="Jpan" typeface="ＭＳ Ｐゴシック"/>
-        <a:font script="Hang" typeface="맑은 고딕"/>
-        <a:font script="Hans" typeface="宋体"/>
-        <a:font script="Hant" typeface="新細明體"/>
-        <a:font script="Arab" typeface="Arial"/>
-        <a:font script="Hebr" typeface="Arial"/>
-        <a:font script="Thai" typeface="Cordia New"/>
-        <a:font script="Ethi" typeface="Nyala"/>
-        <a:font script="Beng" typeface="Vrinda"/>
-        <a:font script="Gujr" typeface="Shruti"/>
-        <a:font script="Khmr" typeface="DaunPenh"/>
-        <a:font script="Knda" typeface="Tunga"/>
-        <a:font script="Guru" typeface="Raavi"/>
-        <a:font script="Cans" typeface="Euphemia"/>
-        <a:font script="Cher" typeface="Plantagenet Cherokee"/>
-        <a:font script="Yiii" typeface="Microsoft Yi Baiti"/>
-        <a:font script="Tibt" typeface="Microsoft Himalaya"/>
-        <a:font script="Thaa" typeface="MV Boli"/>
-        <a:font script="Deva" typeface="Mangal"/>
-        <a:font script="Telu" typeface="Gautami"/>
-        <a:font script="Taml" typeface="Latha"/>
-        <a:font script="Syrc" typeface="Estrangelo Edessa"/>
-        <a:font script="Orya" typeface="Kalinga"/>
-        <a:font script="Mlym" typeface="Kartika"/>
-        <a:font script="Laoo" typeface="DokChampa"/>
-        <a:font script="Sinh" typeface="Iskoola Pota"/>
-        <a:font script="Mong" typeface="Mongolian Baiti"/>
-        <a:font script="Viet" typeface="Arial"/>
-        <a:font script="Uigh" typeface="Microsoft Uighur"/>
-        <a:font script="Geor" typeface="Sylfaen"/>
-      </a:minorFont>
-    </a:fontScheme>
-    <a:fmtScheme name="Office">
-      <a:fillStyleLst>
-        <a:solidFill>
-          <a:schemeClr val="phClr"/>
-        </a:solidFill>
-        <a:gradFill rotWithShape="1">
-          <a:gsLst>
-            <a:gs pos="0">
-              <a:schemeClr val="phClr">
-                <a:tint val="50000"/>
-                <a:satMod val="300000"/>
-              </a:schemeClr>
-            </a:gs>
-            <a:gs pos="35000">
-              <a:schemeClr val="phClr">
-                <a:tint val="37000"/>
-                <a:satMod val="300000"/>
-              </a:schemeClr>
-            </a:gs>
-            <a:gs pos="100000">
-              <a:schemeClr val="phClr">
-                <a:tint val="15000"/>
-                <a:satMod val="350000"/>
-              </a:schemeClr>
-            </a:gs>
-          </a:gsLst>
-          <a:lin ang="16200000" scaled="1"/>
-        </a:gradFill>
-        <a:gradFill rotWithShape="1">
-          <a:gsLst>
-            <a:gs pos="0">
-              <a:schemeClr val="phClr">
-                <a:tint val="100000"/>
-                <a:shade val="100000"/>
-                <a:satMod val="130000"/>
-              </a:schemeClr>
-            </a:gs>
-            <a:gs pos="100000">
-              <a:schemeClr val="phClr">
-                <a:tint val="50000"/>
-                <a:shade val="100000"/>
-                <a:satMod val="350000"/>
-              </a:schemeClr>
-            </a:gs>
-          </a:gsLst>
-          <a:lin ang="16200000" scaled="0"/>
-        </a:gradFill>
-      </a:fillStyleLst>
-      <a:lnStyleLst>
-        <a:ln w="9525" cap="flat" cmpd="sng" algn="ctr">
-          <a:solidFill>
-            <a:schemeClr val="phClr">
-              <a:shade val="95000"/>
-              <a:satMod val="105000"/>
-            </a:schemeClr>
-          </a:solidFill>
-          <a:prstDash val="solid"/>
-        </a:ln>
-        <a:ln w="25400" cap="flat" cmpd="sng" algn="ctr">
-          <a:solidFill>
-            <a:schemeClr val="phClr"/>
-          </a:solidFill>
-          <a:prstDash val="solid"/>
-        </a:ln>
-        <a:ln w="38100" cap="flat" cmpd="sng" algn="ctr">
-          <a:solidFill>
-            <a:schemeClr val="phClr"/>
-          </a:solidFill>
-          <a:prstDash val="solid"/>
-        </a:ln>
-      </a:lnStyleLst>
-      <a:effectStyleLst>
-        <a:effectStyle>
-          <a:effectLst>
-            <a:outerShdw blurRad="40000" dist="20000" dir="5400000" rotWithShape="0">
-              <a:srgbClr val="000000">
-                <a:alpha val="38000"/>
-              </a:srgbClr>
-            </a:outerShdw>
-          </a:effectLst>
-        </a:effectStyle>
-        <a:effectStyle>
-          <a:effectLst>
-            <a:outerShdw blurRad="40000" dist="23000" dir="5400000" rotWithShape="0">
-              <a:srgbClr val="000000">
-                <a:alpha val="35000"/>
-              </a:srgbClr>
-            </a:outerShdw>
-          </a:effectLst>
-        </a:effectStyle>
-        <a:effectStyle>
-          <a:effectLst>
-            <a:outerShdw blurRad="40000" dist="23000" dir="5400000" rotWithShape="0">
-              <a:srgbClr val="000000">
-                <a:alpha val="35000"/>
-              </a:srgbClr>
-            </a:outerShdw>
-          </a:effectLst>
-          <a:scene3d>
-            <a:camera prst="orthographicFront">
-              <a:rot lat="0" lon="0" rev="0"/>
-            </a:camera>
-            <a:lightRig rig="threePt" dir="t">
-              <a:rot lat="0" lon="0" rev="1200000"/>
-            </a:lightRig>
-          </a:scene3d>
-          <a:sp3d>
-            <a:bevelT w="63500" h="25400"/>
-          </a:sp3d>
-        </a:effectStyle>
-      </a:effectStyleLst>
-      <a:bgFillStyleLst>
-        <a:solidFill>
-          <a:schemeClr val="phClr"/>
-        </a:solidFill>
-        <a:gradFill rotWithShape="1">
-          <a:gsLst>
-            <a:gs pos="0">
-              <a:schemeClr val="phClr">
-                <a:tint val="40000"/>
-                <a:satMod val="350000"/>
-              </a:schemeClr>
-            </a:gs>
-            <a:gs pos="40000">
-              <a:schemeClr val="phClr">
-                <a:tint val="45000"/>
-                <a:shade val="99000"/>
-                <a:satMod val="350000"/>
-              </a:schemeClr>
-            </a:gs>
-            <a:gs pos="100000">
-              <a:schemeClr val="phClr">
-                <a:shade val="20000"/>
-                <a:satMod val="255000"/>
-              </a:schemeClr>
-            </a:gs>
-          </a:gsLst>
-          <a:path path="circle">
-            <a:fillToRect l="50000" t="-80000" r="50000" b="180000"/>
-          </a:path>
-        </a:gradFill>
-        <a:gradFill rotWithShape="1">
-          <a:gsLst>
-            <a:gs pos="0">
-              <a:schemeClr val="phClr">
-                <a:tint val="80000"/>
-                <a:satMod val="300000"/>
-              </a:schemeClr>
-            </a:gs>
-            <a:gs pos="100000">
-              <a:schemeClr val="phClr">
-                <a:shade val="30000"/>
-                <a:satMod val="200000"/>
-              </a:schemeClr>
-            </a:gs>
-          </a:gsLst>
-          <a:path path="circle">
-            <a:fillToRect l="50000" t="50000" r="50000" b="50000"/>
-          </a:path>
-        </a:gradFill>
-      </a:bgFillStyleLst>
-    </a:fmtScheme>
-  </a:themeElements>
+  <a:objectDefaults/>
+  <a:extraClrSchemeLst/>
 </a:theme>
 </file>
</xml_diff>

<commit_message>
updated presentation except for DP#1 and DP#2
</commit_message>
<xml_diff>
--- a/39_Rated-MovieRatingSystem.pptx
+++ b/39_Rated-MovieRatingSystem.pptx
@@ -5,7 +5,7 @@
     <p:sldMasterId id="2147483659" r:id="rId1"/>
   </p:sldMasterIdLst>
   <p:notesMasterIdLst>
-    <p:notesMasterId r:id="rId11"/>
+    <p:notesMasterId r:id="rId12"/>
   </p:notesMasterIdLst>
   <p:sldIdLst>
     <p:sldId id="256" r:id="rId2"/>
@@ -17,6 +17,7 @@
     <p:sldId id="262" r:id="rId8"/>
     <p:sldId id="263" r:id="rId9"/>
     <p:sldId id="264" r:id="rId10"/>
+    <p:sldId id="265" r:id="rId11"/>
   </p:sldIdLst>
   <p:sldSz cx="9144000" cy="5143500" type="screen16x9"/>
   <p:notesSz cx="6858000" cy="9144000"/>
@@ -1290,107 +1291,6 @@
 </p:notes>
 </file>
 
-<file path=ppt/notesSlides/notesSlide9.xml><?xml version="1.0" encoding="utf-8"?>
-<p:notes xmlns:a="http://schemas.openxmlformats.org/drawingml/2006/main" xmlns:r="http://schemas.openxmlformats.org/officeDocument/2006/relationships" xmlns:p="http://schemas.openxmlformats.org/presentationml/2006/main" showMasterSp="0" showMasterPhAnim="0">
-  <p:cSld>
-    <p:spTree>
-      <p:nvGrpSpPr>
-        <p:cNvPr id="1" name="Shape 98"/>
-        <p:cNvGrpSpPr/>
-        <p:nvPr/>
-      </p:nvGrpSpPr>
-      <p:grpSpPr>
-        <a:xfrm>
-          <a:off x="0" y="0"/>
-          <a:ext cx="0" cy="0"/>
-          <a:chOff x="0" y="0"/>
-          <a:chExt cx="0" cy="0"/>
-        </a:xfrm>
-      </p:grpSpPr>
-      <p:sp>
-        <p:nvSpPr>
-          <p:cNvPr id="99" name="Shape 99"/>
-          <p:cNvSpPr>
-            <a:spLocks noGrp="1" noRot="1" noChangeAspect="1"/>
-          </p:cNvSpPr>
-          <p:nvPr>
-            <p:ph type="sldImg" idx="2"/>
-          </p:nvPr>
-        </p:nvSpPr>
-        <p:spPr>
-          <a:xfrm>
-            <a:off x="381000" y="685800"/>
-            <a:ext cx="6096000" cy="3429000"/>
-          </a:xfrm>
-          <a:custGeom>
-            <a:avLst/>
-            <a:gdLst/>
-            <a:ahLst/>
-            <a:cxnLst/>
-            <a:rect l="0" t="0" r="0" b="0"/>
-            <a:pathLst>
-              <a:path w="120000" h="120000" extrusionOk="0">
-                <a:moveTo>
-                  <a:pt x="0" y="0"/>
-                </a:moveTo>
-                <a:lnTo>
-                  <a:pt x="120000" y="0"/>
-                </a:lnTo>
-                <a:lnTo>
-                  <a:pt x="120000" y="120000"/>
-                </a:lnTo>
-                <a:lnTo>
-                  <a:pt x="0" y="120000"/>
-                </a:lnTo>
-                <a:close/>
-              </a:path>
-            </a:pathLst>
-          </a:custGeom>
-        </p:spPr>
-      </p:sp>
-      <p:sp>
-        <p:nvSpPr>
-          <p:cNvPr id="100" name="Shape 100"/>
-          <p:cNvSpPr txBox="1">
-            <a:spLocks noGrp="1"/>
-          </p:cNvSpPr>
-          <p:nvPr>
-            <p:ph type="body" idx="1"/>
-          </p:nvPr>
-        </p:nvSpPr>
-        <p:spPr>
-          <a:xfrm>
-            <a:off x="685800" y="4343400"/>
-            <a:ext cx="5486400" cy="4114800"/>
-          </a:xfrm>
-          <a:prstGeom prst="rect">
-            <a:avLst/>
-          </a:prstGeom>
-        </p:spPr>
-        <p:txBody>
-          <a:bodyPr lIns="91425" tIns="91425" rIns="91425" bIns="91425" anchor="t" anchorCtr="0">
-            <a:noAutofit/>
-          </a:bodyPr>
-          <a:lstStyle/>
-          <a:p>
-            <a:pPr lvl="0">
-              <a:spcBef>
-                <a:spcPts val="0"/>
-              </a:spcBef>
-              <a:buNone/>
-            </a:pPr>
-            <a:endParaRPr/>
-          </a:p>
-        </p:txBody>
-      </p:sp>
-    </p:spTree>
-  </p:cSld>
-  <p:clrMapOvr>
-    <a:masterClrMapping/>
-  </p:clrMapOvr>
-</p:notes>
-</file>
-
 <file path=ppt/slideLayouts/slideLayout1.xml><?xml version="1.0" encoding="utf-8"?>
 <p:sldLayout xmlns:a="http://schemas.openxmlformats.org/drawingml/2006/main" xmlns:r="http://schemas.openxmlformats.org/officeDocument/2006/relationships" xmlns:p="http://schemas.openxmlformats.org/presentationml/2006/main" type="title">
   <p:cSld name="Title slide">
@@ -1893,70 +1793,6 @@
       <p:sp>
         <p:nvSpPr>
           <p:cNvPr id="47" name="Shape 47"/>
-          <p:cNvSpPr txBox="1">
-            <a:spLocks noGrp="1"/>
-          </p:cNvSpPr>
-          <p:nvPr>
-            <p:ph type="sldNum" idx="12"/>
-          </p:nvPr>
-        </p:nvSpPr>
-        <p:spPr>
-          <a:xfrm>
-            <a:off x="8472457" y="4663216"/>
-            <a:ext cx="548700" cy="393600"/>
-          </a:xfrm>
-          <a:prstGeom prst="rect">
-            <a:avLst/>
-          </a:prstGeom>
-        </p:spPr>
-        <p:txBody>
-          <a:bodyPr lIns="91425" tIns="91425" rIns="91425" bIns="91425" anchor="ctr" anchorCtr="0">
-            <a:noAutofit/>
-          </a:bodyPr>
-          <a:lstStyle/>
-          <a:p>
-            <a:pPr lvl="0">
-              <a:spcBef>
-                <a:spcPts val="0"/>
-              </a:spcBef>
-              <a:buNone/>
-            </a:pPr>
-            <a:fld id="{00000000-1234-1234-1234-123412341234}" type="slidenum">
-              <a:rPr lang="en"/>
-              <a:t>‹#›</a:t>
-            </a:fld>
-            <a:endParaRPr lang="en"/>
-          </a:p>
-        </p:txBody>
-      </p:sp>
-    </p:spTree>
-  </p:cSld>
-  <p:clrMapOvr>
-    <a:masterClrMapping/>
-  </p:clrMapOvr>
-</p:sldLayout>
-</file>
-
-<file path=ppt/slideLayouts/slideLayout11.xml><?xml version="1.0" encoding="utf-8"?>
-<p:sldLayout xmlns:a="http://schemas.openxmlformats.org/drawingml/2006/main" xmlns:r="http://schemas.openxmlformats.org/officeDocument/2006/relationships" xmlns:p="http://schemas.openxmlformats.org/presentationml/2006/main" type="blank">
-  <p:cSld name="Blank">
-    <p:spTree>
-      <p:nvGrpSpPr>
-        <p:cNvPr id="1" name="Shape 48"/>
-        <p:cNvGrpSpPr/>
-        <p:nvPr/>
-      </p:nvGrpSpPr>
-      <p:grpSpPr>
-        <a:xfrm>
-          <a:off x="0" y="0"/>
-          <a:ext cx="0" cy="0"/>
-          <a:chOff x="0" y="0"/>
-          <a:chExt cx="0" cy="0"/>
-        </a:xfrm>
-      </p:grpSpPr>
-      <p:sp>
-        <p:nvSpPr>
-          <p:cNvPr id="49" name="Shape 49"/>
           <p:cNvSpPr txBox="1">
             <a:spLocks noGrp="1"/>
           </p:cNvSpPr>
@@ -4253,7 +4089,6 @@
     <p:sldLayoutId id="2147483655" r:id="rId8"/>
     <p:sldLayoutId id="2147483656" r:id="rId9"/>
     <p:sldLayoutId id="2147483657" r:id="rId10"/>
-    <p:sldLayoutId id="2147483658" r:id="rId11"/>
   </p:sldLayoutIdLst>
   <p:hf sldNum="0" hdr="0" ftr="0" dt="0"/>
   <p:txStyles>
@@ -4786,9 +4621,10 @@
               <a:buNone/>
             </a:pPr>
             <a:r>
-              <a:rPr lang="en"/>
-              <a:t>Presented by:</a:t>
+              <a:rPr lang="en" dirty="0" smtClean="0"/>
+              <a:t>PRESENTED BY:</a:t>
             </a:r>
+            <a:endParaRPr lang="en" dirty="0"/>
           </a:p>
           <a:p>
             <a:pPr lvl="0">
@@ -4798,7 +4634,7 @@
               <a:buNone/>
             </a:pPr>
             <a:r>
-              <a:rPr lang="en"/>
+              <a:rPr lang="en" dirty="0"/>
               <a:t>Omkar Reddy Seelam</a:t>
             </a:r>
           </a:p>
@@ -4810,7 +4646,7 @@
               <a:buNone/>
             </a:pPr>
             <a:r>
-              <a:rPr lang="en"/>
+              <a:rPr lang="en" dirty="0"/>
               <a:t>Rishabh Berlia</a:t>
             </a:r>
           </a:p>
@@ -4822,13 +4658,101 @@
               <a:buNone/>
             </a:pPr>
             <a:r>
-              <a:rPr lang="en"/>
+              <a:rPr lang="en" dirty="0"/>
               <a:t>Shivasankar Gunasekaran</a:t>
             </a:r>
           </a:p>
         </p:txBody>
       </p:sp>
     </p:spTree>
+  </p:cSld>
+  <p:clrMapOvr>
+    <a:masterClrMapping/>
+  </p:clrMapOvr>
+</p:sld>
+</file>
+
+<file path=ppt/slides/slide10.xml><?xml version="1.0" encoding="utf-8"?>
+<p:sld xmlns:a="http://schemas.openxmlformats.org/drawingml/2006/main" xmlns:r="http://schemas.openxmlformats.org/officeDocument/2006/relationships" xmlns:p="http://schemas.openxmlformats.org/presentationml/2006/main">
+  <p:cSld>
+    <p:spTree>
+      <p:nvGrpSpPr>
+        <p:cNvPr id="1" name=""/>
+        <p:cNvGrpSpPr/>
+        <p:nvPr/>
+      </p:nvGrpSpPr>
+      <p:grpSpPr>
+        <a:xfrm>
+          <a:off x="0" y="0"/>
+          <a:ext cx="0" cy="0"/>
+          <a:chOff x="0" y="0"/>
+          <a:chExt cx="0" cy="0"/>
+        </a:xfrm>
+      </p:grpSpPr>
+      <p:sp>
+        <p:nvSpPr>
+          <p:cNvPr id="2" name="Title 1"/>
+          <p:cNvSpPr>
+            <a:spLocks noGrp="1"/>
+          </p:cNvSpPr>
+          <p:nvPr>
+            <p:ph type="title"/>
+          </p:nvPr>
+        </p:nvSpPr>
+        <p:spPr>
+          <a:xfrm>
+            <a:off x="311700" y="529314"/>
+            <a:ext cx="8520600" cy="841800"/>
+          </a:xfrm>
+        </p:spPr>
+        <p:txBody>
+          <a:bodyPr/>
+          <a:lstStyle/>
+          <a:p>
+            <a:r>
+              <a:rPr lang="en-US" dirty="0" smtClean="0"/>
+              <a:t>THANK YOU</a:t>
+            </a:r>
+            <a:endParaRPr lang="en-US" dirty="0"/>
+          </a:p>
+        </p:txBody>
+      </p:sp>
+      <p:pic>
+        <p:nvPicPr>
+          <p:cNvPr id="3" name="Picture 2"/>
+          <p:cNvPicPr>
+            <a:picLocks noChangeAspect="1"/>
+          </p:cNvPicPr>
+          <p:nvPr/>
+        </p:nvPicPr>
+        <p:blipFill>
+          <a:blip r:embed="rId2">
+            <a:extLst>
+              <a:ext uri="{28A0092B-C50C-407E-A947-70E740481C1C}">
+                <a14:useLocalDpi xmlns:a14="http://schemas.microsoft.com/office/drawing/2010/main" val="0"/>
+              </a:ext>
+            </a:extLst>
+          </a:blip>
+          <a:stretch>
+            <a:fillRect/>
+          </a:stretch>
+        </p:blipFill>
+        <p:spPr>
+          <a:xfrm>
+            <a:off x="2286000" y="1371114"/>
+            <a:ext cx="4572000" cy="3543300"/>
+          </a:xfrm>
+          <a:prstGeom prst="rect">
+            <a:avLst/>
+          </a:prstGeom>
+        </p:spPr>
+      </p:pic>
+    </p:spTree>
+    <p:extLst>
+      <p:ext uri="{BB962C8B-B14F-4D97-AF65-F5344CB8AC3E}">
+        <p14:creationId xmlns:p14="http://schemas.microsoft.com/office/powerpoint/2010/main" val="1769566907"/>
+      </p:ext>
+    </p:extLst>
   </p:cSld>
   <p:clrMapOvr>
     <a:masterClrMapping/>
@@ -4923,9 +4847,14 @@
               <a:buChar char="●"/>
             </a:pPr>
             <a:r>
-              <a:rPr lang="en"/>
-              <a:t>An online Movie Rating System</a:t>
+              <a:rPr lang="en" dirty="0"/>
+              <a:t>An online Movie Rating </a:t>
             </a:r>
+            <a:r>
+              <a:rPr lang="en" dirty="0" smtClean="0"/>
+              <a:t>System as a web-application using Spring MVC</a:t>
+            </a:r>
+            <a:endParaRPr lang="en" dirty="0"/>
           </a:p>
           <a:p>
             <a:pPr marL="457200" lvl="0" indent="-228600" rtl="0">
@@ -4935,8 +4864,24 @@
               <a:buChar char="●"/>
             </a:pPr>
             <a:r>
-              <a:rPr lang="en"/>
-              <a:t>Users can view and give ratings and reviews to movies.</a:t>
+              <a:rPr lang="en" dirty="0"/>
+              <a:t>Users can view </a:t>
+            </a:r>
+            <a:r>
+              <a:rPr lang="en" dirty="0" smtClean="0"/>
+              <a:t>&amp; </a:t>
+            </a:r>
+            <a:r>
+              <a:rPr lang="en" dirty="0"/>
+              <a:t>give ratings </a:t>
+            </a:r>
+            <a:r>
+              <a:rPr lang="en" dirty="0" smtClean="0"/>
+              <a:t>&amp; </a:t>
+            </a:r>
+            <a:r>
+              <a:rPr lang="en" dirty="0"/>
+              <a:t>reviews to movies.</a:t>
             </a:r>
           </a:p>
         </p:txBody>
@@ -5024,14 +4969,9 @@
               <a:buChar char="•"/>
             </a:pPr>
             <a:r>
-              <a:rPr lang="en-US" dirty="0"/>
-              <a:t>Rate/Review </a:t>
+              <a:rPr lang="en-US" dirty="0" smtClean="0"/>
+              <a:t>User can Sign-up in the system depending on his/her role</a:t>
             </a:r>
-            <a:r>
-              <a:rPr lang="en-US" dirty="0" smtClean="0"/>
-              <a:t>Movie</a:t>
-            </a:r>
-            <a:endParaRPr lang="en-US" dirty="0"/>
           </a:p>
           <a:p>
             <a:pPr marL="285750" lvl="0" indent="-285750">
@@ -5039,8 +4979,8 @@
               <a:buChar char="•"/>
             </a:pPr>
             <a:r>
-              <a:rPr lang="en-US" dirty="0"/>
-              <a:t>Request to Add a New Movie</a:t>
+              <a:rPr lang="en-US" dirty="0" smtClean="0"/>
+              <a:t>User can log-in/log-out to/from system</a:t>
             </a:r>
           </a:p>
           <a:p>
@@ -5049,9 +4989,10 @@
               <a:buChar char="•"/>
             </a:pPr>
             <a:r>
-              <a:rPr lang="en-US" dirty="0"/>
-              <a:t>Add a New Movie</a:t>
+              <a:rPr lang="en-US" dirty="0" smtClean="0"/>
+              <a:t>The User can Rate/Review a Movie</a:t>
             </a:r>
+            <a:endParaRPr lang="en-US" dirty="0"/>
           </a:p>
           <a:p>
             <a:pPr marL="285750" lvl="0" indent="-285750">
@@ -5059,14 +5000,21 @@
               <a:buChar char="•"/>
             </a:pPr>
             <a:r>
+              <a:rPr lang="en-US" dirty="0" smtClean="0"/>
+              <a:t>The Critic can Request </a:t>
+            </a:r>
+            <a:r>
               <a:rPr lang="en-US" dirty="0"/>
-              <a:t>Delete a </a:t>
+              <a:t>to Add a </a:t>
             </a:r>
             <a:r>
               <a:rPr lang="en-US" dirty="0" smtClean="0"/>
-              <a:t>Review by the User</a:t>
+              <a:t>new </a:t>
             </a:r>
-            <a:endParaRPr lang="en-US" dirty="0"/>
+            <a:r>
+              <a:rPr lang="en-US" dirty="0"/>
+              <a:t>Movie</a:t>
+            </a:r>
           </a:p>
           <a:p>
             <a:pPr marL="285750" lvl="0" indent="-285750">
@@ -5074,12 +5022,64 @@
               <a:buChar char="•"/>
             </a:pPr>
             <a:r>
+              <a:rPr lang="en-US" dirty="0" smtClean="0"/>
+              <a:t>The Admin/Moderator can Add </a:t>
+            </a:r>
+            <a:r>
               <a:rPr lang="en-US" dirty="0"/>
-              <a:t>Flag a </a:t>
+              <a:t>a </a:t>
             </a:r>
             <a:r>
               <a:rPr lang="en-US" dirty="0" smtClean="0"/>
-              <a:t>Review</a:t>
+              <a:t>new Movie or approve a Critic’s request</a:t>
+            </a:r>
+            <a:endParaRPr lang="en-US" dirty="0"/>
+          </a:p>
+          <a:p>
+            <a:pPr marL="285750" lvl="0" indent="-285750">
+              <a:buFont typeface="Arial" panose="020B0604020202020204" pitchFamily="34" charset="0"/>
+              <a:buChar char="•"/>
+            </a:pPr>
+            <a:r>
+              <a:rPr lang="en-US" dirty="0" smtClean="0"/>
+              <a:t>The </a:t>
+            </a:r>
+            <a:r>
+              <a:rPr lang="en-US" dirty="0"/>
+              <a:t>U</a:t>
+            </a:r>
+            <a:r>
+              <a:rPr lang="en-US" dirty="0" smtClean="0"/>
+              <a:t>ser can Delete their own review</a:t>
+            </a:r>
+            <a:endParaRPr lang="en-US" dirty="0"/>
+          </a:p>
+          <a:p>
+            <a:pPr marL="285750" lvl="0" indent="-285750">
+              <a:buFont typeface="Arial" panose="020B0604020202020204" pitchFamily="34" charset="0"/>
+              <a:buChar char="•"/>
+            </a:pPr>
+            <a:r>
+              <a:rPr lang="en-US" dirty="0" smtClean="0"/>
+              <a:t>The User can Flag </a:t>
+            </a:r>
+            <a:r>
+              <a:rPr lang="en-US" dirty="0"/>
+              <a:t>a </a:t>
+            </a:r>
+            <a:r>
+              <a:rPr lang="en-US" dirty="0" smtClean="0"/>
+              <a:t>Review </a:t>
+            </a:r>
+          </a:p>
+          <a:p>
+            <a:pPr marL="285750" lvl="0" indent="-285750">
+              <a:buFont typeface="Arial" panose="020B0604020202020204" pitchFamily="34" charset="0"/>
+              <a:buChar char="•"/>
+            </a:pPr>
+            <a:r>
+              <a:rPr lang="en-US" dirty="0" smtClean="0"/>
+              <a:t>The User can Delete the flagged review</a:t>
             </a:r>
             <a:endParaRPr lang="en-US" dirty="0"/>
           </a:p>
@@ -5281,7 +5281,7 @@
               <a:buChar char="●"/>
             </a:pPr>
             <a:r>
-              <a:rPr lang="en"/>
+              <a:rPr lang="en" dirty="0"/>
               <a:t>Factory Method</a:t>
             </a:r>
           </a:p>
@@ -5293,7 +5293,7 @@
               <a:buChar char="●"/>
             </a:pPr>
             <a:r>
-              <a:rPr lang="en"/>
+              <a:rPr lang="en" dirty="0"/>
               <a:t>Proxy</a:t>
             </a:r>
           </a:p>
@@ -5305,7 +5305,7 @@
               <a:buChar char="●"/>
             </a:pPr>
             <a:r>
-              <a:rPr lang="en"/>
+              <a:rPr lang="en" dirty="0"/>
               <a:t>Singleton</a:t>
             </a:r>
           </a:p>
@@ -5317,7 +5317,7 @@
               <a:buChar char="●"/>
             </a:pPr>
             <a:r>
-              <a:rPr lang="en"/>
+              <a:rPr lang="en" dirty="0"/>
               <a:t>MVC (Architectural Pattern)</a:t>
             </a:r>
           </a:p>
@@ -5607,13 +5607,30 @@
           </a:bodyPr>
           <a:lstStyle/>
           <a:p>
-            <a:pPr lvl="0">
-              <a:spcBef>
-                <a:spcPts val="0"/>
-              </a:spcBef>
-              <a:buNone/>
+            <a:pPr marL="285750" lvl="0" indent="-285750">
+              <a:spcBef>
+                <a:spcPts val="0"/>
+              </a:spcBef>
+              <a:buFont typeface="Arial" panose="020B0604020202020204" pitchFamily="34" charset="0"/>
+              <a:buChar char="•"/>
             </a:pPr>
-            <a:endParaRPr/>
+            <a:r>
+              <a:rPr lang="en-US" dirty="0" smtClean="0"/>
+              <a:t>Memento : To save user preferences</a:t>
+            </a:r>
+          </a:p>
+          <a:p>
+            <a:pPr marL="285750" lvl="0" indent="-285750">
+              <a:spcBef>
+                <a:spcPts val="0"/>
+              </a:spcBef>
+              <a:buFont typeface="Arial" panose="020B0604020202020204" pitchFamily="34" charset="0"/>
+              <a:buChar char="•"/>
+            </a:pPr>
+            <a:r>
+              <a:rPr lang="en-US" dirty="0" smtClean="0"/>
+              <a:t>Flyweight : To store pictures of movie items as flyweight objects.</a:t>
+            </a:r>
           </a:p>
         </p:txBody>
       </p:sp>
@@ -5630,7 +5647,7 @@
   <p:cSld>
     <p:spTree>
       <p:nvGrpSpPr>
-        <p:cNvPr id="1" name="Shape 101"/>
+        <p:cNvPr id="1" name=""/>
         <p:cNvGrpSpPr/>
         <p:nvPr/>
       </p:nvGrpSpPr>
@@ -5644,78 +5661,79 @@
       </p:grpSpPr>
       <p:sp>
         <p:nvSpPr>
-          <p:cNvPr id="102" name="Shape 102"/>
-          <p:cNvSpPr txBox="1">
+          <p:cNvPr id="2" name="Title 1"/>
+          <p:cNvSpPr>
             <a:spLocks noGrp="1"/>
           </p:cNvSpPr>
           <p:nvPr>
             <p:ph type="title"/>
           </p:nvPr>
         </p:nvSpPr>
-        <p:spPr>
-          <a:xfrm>
-            <a:off x="311700" y="445025"/>
-            <a:ext cx="8520600" cy="572700"/>
-          </a:xfrm>
-          <a:prstGeom prst="rect">
-            <a:avLst/>
-          </a:prstGeom>
-        </p:spPr>
+        <p:spPr/>
         <p:txBody>
-          <a:bodyPr lIns="91425" tIns="91425" rIns="91425" bIns="91425" anchor="t" anchorCtr="0">
-            <a:noAutofit/>
-          </a:bodyPr>
+          <a:bodyPr/>
           <a:lstStyle/>
           <a:p>
-            <a:pPr lvl="0">
-              <a:spcBef>
-                <a:spcPts val="0"/>
-              </a:spcBef>
-              <a:buNone/>
+            <a:r>
+              <a:rPr lang="en-US" dirty="0" smtClean="0"/>
+              <a:t>ANTI PATTERNS</a:t>
+            </a:r>
+            <a:endParaRPr lang="en-US" dirty="0"/>
+          </a:p>
+        </p:txBody>
+      </p:sp>
+      <p:sp>
+        <p:nvSpPr>
+          <p:cNvPr id="3" name="Text Placeholder 2"/>
+          <p:cNvSpPr>
+            <a:spLocks noGrp="1"/>
+          </p:cNvSpPr>
+          <p:nvPr>
+            <p:ph type="body" idx="1"/>
+          </p:nvPr>
+        </p:nvSpPr>
+        <p:spPr/>
+        <p:txBody>
+          <a:bodyPr/>
+          <a:lstStyle/>
+          <a:p>
+            <a:pPr marL="285750" indent="-285750">
+              <a:buFont typeface="Arial" panose="020B0604020202020204" pitchFamily="34" charset="0"/>
+              <a:buChar char="•"/>
             </a:pPr>
             <a:r>
-              <a:rPr lang="en"/>
-              <a:t>ANTI-PATTERNS</a:t>
+              <a:rPr lang="en-US" dirty="0" smtClean="0"/>
+              <a:t>BLOB</a:t>
             </a:r>
           </a:p>
+          <a:p>
+            <a:pPr marL="285750" lvl="1" indent="-285750">
+              <a:buFont typeface="Arial" panose="020B0604020202020204" pitchFamily="34" charset="0"/>
+              <a:buChar char="•"/>
+            </a:pPr>
+            <a:r>
+              <a:rPr lang="en-US" dirty="0" smtClean="0"/>
+              <a:t>Initially had a Single Controller in the Class Diagram</a:t>
+            </a:r>
+          </a:p>
+          <a:p>
+            <a:pPr marL="285750" lvl="1" indent="-285750">
+              <a:buFont typeface="Arial" panose="020B0604020202020204" pitchFamily="34" charset="0"/>
+              <a:buChar char="•"/>
+            </a:pPr>
+            <a:r>
+              <a:rPr lang="en-US" dirty="0" smtClean="0"/>
+              <a:t>Separated the controller into different controllers related to specific class/task.</a:t>
+            </a:r>
+          </a:p>
         </p:txBody>
       </p:sp>
-      <p:sp>
-        <p:nvSpPr>
-          <p:cNvPr id="103" name="Shape 103"/>
-          <p:cNvSpPr txBox="1">
-            <a:spLocks noGrp="1"/>
-          </p:cNvSpPr>
-          <p:nvPr>
-            <p:ph type="body" idx="1"/>
-          </p:nvPr>
-        </p:nvSpPr>
-        <p:spPr>
-          <a:xfrm>
-            <a:off x="311700" y="1152475"/>
-            <a:ext cx="8520600" cy="3416400"/>
-          </a:xfrm>
-          <a:prstGeom prst="rect">
-            <a:avLst/>
-          </a:prstGeom>
-        </p:spPr>
-        <p:txBody>
-          <a:bodyPr lIns="91425" tIns="91425" rIns="91425" bIns="91425" anchor="t" anchorCtr="0">
-            <a:noAutofit/>
-          </a:bodyPr>
-          <a:lstStyle/>
-          <a:p>
-            <a:pPr lvl="0">
-              <a:spcBef>
-                <a:spcPts val="0"/>
-              </a:spcBef>
-              <a:buNone/>
-            </a:pPr>
-            <a:endParaRPr/>
-          </a:p>
-        </p:txBody>
-      </p:sp>
     </p:spTree>
+    <p:extLst>
+      <p:ext uri="{BB962C8B-B14F-4D97-AF65-F5344CB8AC3E}">
+        <p14:creationId xmlns:p14="http://schemas.microsoft.com/office/powerpoint/2010/main" val="3517690399"/>
+      </p:ext>
+    </p:extLst>
   </p:cSld>
   <p:clrMapOvr>
     <a:masterClrMapping/>

</xml_diff>